<commit_message>
more stuff added to the challenges
</commit_message>
<xml_diff>
--- a/plan/challenges.pptx
+++ b/plan/challenges.pptx
@@ -9,12 +9,15 @@
     <p:sldId id="257" r:id="rId3"/>
     <p:sldId id="258" r:id="rId4"/>
     <p:sldId id="259" r:id="rId5"/>
-    <p:sldId id="260" r:id="rId6"/>
-    <p:sldId id="261" r:id="rId7"/>
-    <p:sldId id="262" r:id="rId8"/>
-    <p:sldId id="263" r:id="rId9"/>
-    <p:sldId id="264" r:id="rId10"/>
-    <p:sldId id="265" r:id="rId11"/>
+    <p:sldId id="268" r:id="rId6"/>
+    <p:sldId id="260" r:id="rId7"/>
+    <p:sldId id="261" r:id="rId8"/>
+    <p:sldId id="262" r:id="rId9"/>
+    <p:sldId id="263" r:id="rId10"/>
+    <p:sldId id="264" r:id="rId11"/>
+    <p:sldId id="265" r:id="rId12"/>
+    <p:sldId id="266" r:id="rId13"/>
+    <p:sldId id="267" r:id="rId14"/>
   </p:sldIdLst>
   <p:sldSz cx="12192000" cy="6858000"/>
   <p:notesSz cx="6858000" cy="9144000"/>
@@ -113,6 +116,11 @@
       </a:defRPr>
     </a:lvl9pPr>
   </p:defaultTextStyle>
+  <p:extLst>
+    <p:ext uri="{EFAFB233-063F-42B5-8137-9DF3F51BA10A}">
+      <p15:sldGuideLst xmlns:p15="http://schemas.microsoft.com/office/powerpoint/2012/main"/>
+    </p:ext>
+  </p:extLst>
 </p:presentation>
 </file>
 
@@ -3422,6 +3430,92 @@
           <p:cNvPr id="2" name="Title 1">
             <a:extLst>
               <a:ext uri="{FF2B5EF4-FFF2-40B4-BE49-F238E27FC236}">
+                <a16:creationId xmlns:a16="http://schemas.microsoft.com/office/drawing/2014/main" id="{99178DB9-E162-481E-9D56-FD5ADC2B26FD}"/>
+              </a:ext>
+            </a:extLst>
+          </p:cNvPr>
+          <p:cNvSpPr>
+            <a:spLocks noGrp="1"/>
+          </p:cNvSpPr>
+          <p:nvPr>
+            <p:ph type="title"/>
+          </p:nvPr>
+        </p:nvSpPr>
+        <p:spPr/>
+        <p:txBody>
+          <a:bodyPr/>
+          <a:lstStyle/>
+          <a:p>
+            <a:r>
+              <a:rPr lang="en-US" dirty="0"/>
+              <a:t>8. Identify unique junctions and atomic roads and save them in a database</a:t>
+            </a:r>
+          </a:p>
+        </p:txBody>
+      </p:sp>
+      <p:sp>
+        <p:nvSpPr>
+          <p:cNvPr id="3" name="Content Placeholder 2">
+            <a:extLst>
+              <a:ext uri="{FF2B5EF4-FFF2-40B4-BE49-F238E27FC236}">
+                <a16:creationId xmlns:a16="http://schemas.microsoft.com/office/drawing/2014/main" id="{E68314E0-6ABA-4535-9E30-75A73DD28154}"/>
+              </a:ext>
+            </a:extLst>
+          </p:cNvPr>
+          <p:cNvSpPr>
+            <a:spLocks noGrp="1"/>
+          </p:cNvSpPr>
+          <p:nvPr>
+            <p:ph idx="1"/>
+          </p:nvPr>
+        </p:nvSpPr>
+        <p:spPr/>
+        <p:txBody>
+          <a:bodyPr/>
+          <a:lstStyle/>
+          <a:p>
+            <a:r>
+              <a:rPr lang="en-US" dirty="0"/>
+              <a:t>Atomic roads are those unique roads from which all other roads can be generated. They may have several road components, several lane sections. They need to be used as atomic units.</a:t>
+            </a:r>
+          </a:p>
+        </p:txBody>
+      </p:sp>
+    </p:spTree>
+    <p:extLst>
+      <p:ext uri="{BB962C8B-B14F-4D97-AF65-F5344CB8AC3E}">
+        <p14:creationId xmlns:p14="http://schemas.microsoft.com/office/powerpoint/2010/main" val="2058310382"/>
+      </p:ext>
+    </p:extLst>
+  </p:cSld>
+  <p:clrMapOvr>
+    <a:masterClrMapping/>
+  </p:clrMapOvr>
+</p:sld>
+</file>
+
+<file path=ppt/slides/slide11.xml><?xml version="1.0" encoding="utf-8"?>
+<p:sld xmlns:a="http://schemas.openxmlformats.org/drawingml/2006/main" xmlns:r="http://schemas.openxmlformats.org/officeDocument/2006/relationships" xmlns:p="http://schemas.openxmlformats.org/presentationml/2006/main">
+  <p:cSld>
+    <p:spTree>
+      <p:nvGrpSpPr>
+        <p:cNvPr id="1" name=""/>
+        <p:cNvGrpSpPr/>
+        <p:nvPr/>
+      </p:nvGrpSpPr>
+      <p:grpSpPr>
+        <a:xfrm>
+          <a:off x="0" y="0"/>
+          <a:ext cx="0" cy="0"/>
+          <a:chOff x="0" y="0"/>
+          <a:chExt cx="0" cy="0"/>
+        </a:xfrm>
+      </p:grpSpPr>
+      <p:sp>
+        <p:nvSpPr>
+          <p:cNvPr id="2" name="Title 1">
+            <a:extLst>
+              <a:ext uri="{FF2B5EF4-FFF2-40B4-BE49-F238E27FC236}">
                 <a16:creationId xmlns:a16="http://schemas.microsoft.com/office/drawing/2014/main" id="{9530B157-6ECC-4219-B483-87A678FDC66B}"/>
               </a:ext>
             </a:extLst>
@@ -3466,7 +3560,24 @@
           <a:bodyPr/>
           <a:lstStyle/>
           <a:p>
-            <a:endParaRPr lang="en-US"/>
+            <a:r>
+              <a:rPr lang="en-US" dirty="0"/>
+              <a:t>All third-party dependencies must be included in the package</a:t>
+            </a:r>
+          </a:p>
+          <a:p>
+            <a:r>
+              <a:rPr lang="en-US" dirty="0"/>
+              <a:t>All the objects must be saved in serializable formats or as </a:t>
+            </a:r>
+            <a:r>
+              <a:rPr lang="en-US" dirty="0" err="1"/>
+              <a:t>c++</a:t>
+            </a:r>
+            <a:r>
+              <a:rPr lang="en-US" dirty="0"/>
+              <a:t> classes which can be used to instantiate them, so that users do not need to create new objects or update references. Must have object and class version mappings.</a:t>
+            </a:r>
           </a:p>
         </p:txBody>
       </p:sp>
@@ -3474,6 +3585,183 @@
     <p:extLst>
       <p:ext uri="{BB962C8B-B14F-4D97-AF65-F5344CB8AC3E}">
         <p14:creationId xmlns:p14="http://schemas.microsoft.com/office/powerpoint/2010/main" val="364679022"/>
+      </p:ext>
+    </p:extLst>
+  </p:cSld>
+  <p:clrMapOvr>
+    <a:masterClrMapping/>
+  </p:clrMapOvr>
+</p:sld>
+</file>
+
+<file path=ppt/slides/slide12.xml><?xml version="1.0" encoding="utf-8"?>
+<p:sld xmlns:a="http://schemas.openxmlformats.org/drawingml/2006/main" xmlns:r="http://schemas.openxmlformats.org/officeDocument/2006/relationships" xmlns:p="http://schemas.openxmlformats.org/presentationml/2006/main">
+  <p:cSld>
+    <p:spTree>
+      <p:nvGrpSpPr>
+        <p:cNvPr id="1" name=""/>
+        <p:cNvGrpSpPr/>
+        <p:nvPr/>
+      </p:nvGrpSpPr>
+      <p:grpSpPr>
+        <a:xfrm>
+          <a:off x="0" y="0"/>
+          <a:ext cx="0" cy="0"/>
+          <a:chOff x="0" y="0"/>
+          <a:chExt cx="0" cy="0"/>
+        </a:xfrm>
+      </p:grpSpPr>
+      <p:sp>
+        <p:nvSpPr>
+          <p:cNvPr id="2" name="Title 1">
+            <a:extLst>
+              <a:ext uri="{FF2B5EF4-FFF2-40B4-BE49-F238E27FC236}">
+                <a16:creationId xmlns:a16="http://schemas.microsoft.com/office/drawing/2014/main" id="{446822B0-AAB5-4D04-99B9-F00543830BE9}"/>
+              </a:ext>
+            </a:extLst>
+          </p:cNvPr>
+          <p:cNvSpPr>
+            <a:spLocks noGrp="1"/>
+          </p:cNvSpPr>
+          <p:nvPr>
+            <p:ph type="title"/>
+          </p:nvPr>
+        </p:nvSpPr>
+        <p:spPr/>
+        <p:txBody>
+          <a:bodyPr/>
+          <a:lstStyle/>
+          <a:p>
+            <a:r>
+              <a:rPr lang="en-US" dirty="0"/>
+              <a:t>10. Arbitrary roundabout given an area and a set of obstacles</a:t>
+            </a:r>
+          </a:p>
+        </p:txBody>
+      </p:sp>
+      <p:pic>
+        <p:nvPicPr>
+          <p:cNvPr id="10" name="Picture 9" descr="A picture containing diagram&#10;&#10;Description automatically generated">
+            <a:extLst>
+              <a:ext uri="{FF2B5EF4-FFF2-40B4-BE49-F238E27FC236}">
+                <a16:creationId xmlns:a16="http://schemas.microsoft.com/office/drawing/2014/main" id="{D1DB5808-22C4-46DD-90EC-8DDE97FF5C65}"/>
+              </a:ext>
+            </a:extLst>
+          </p:cNvPr>
+          <p:cNvPicPr>
+            <a:picLocks noChangeAspect="1"/>
+          </p:cNvPicPr>
+          <p:nvPr/>
+        </p:nvPicPr>
+        <p:blipFill>
+          <a:blip r:embed="rId2">
+            <a:extLst>
+              <a:ext uri="{28A0092B-C50C-407E-A947-70E740481C1C}">
+                <a14:useLocalDpi xmlns:a14="http://schemas.microsoft.com/office/drawing/2010/main" val="0"/>
+              </a:ext>
+            </a:extLst>
+          </a:blip>
+          <a:stretch>
+            <a:fillRect/>
+          </a:stretch>
+        </p:blipFill>
+        <p:spPr>
+          <a:xfrm>
+            <a:off x="838200" y="1865603"/>
+            <a:ext cx="3212452" cy="4283269"/>
+          </a:xfrm>
+          <a:prstGeom prst="rect">
+            <a:avLst/>
+          </a:prstGeom>
+        </p:spPr>
+      </p:pic>
+    </p:spTree>
+    <p:extLst>
+      <p:ext uri="{BB962C8B-B14F-4D97-AF65-F5344CB8AC3E}">
+        <p14:creationId xmlns:p14="http://schemas.microsoft.com/office/powerpoint/2010/main" val="3655714560"/>
+      </p:ext>
+    </p:extLst>
+  </p:cSld>
+  <p:clrMapOvr>
+    <a:masterClrMapping/>
+  </p:clrMapOvr>
+</p:sld>
+</file>
+
+<file path=ppt/slides/slide13.xml><?xml version="1.0" encoding="utf-8"?>
+<p:sld xmlns:a="http://schemas.openxmlformats.org/drawingml/2006/main" xmlns:r="http://schemas.openxmlformats.org/officeDocument/2006/relationships" xmlns:p="http://schemas.openxmlformats.org/presentationml/2006/main">
+  <p:cSld>
+    <p:spTree>
+      <p:nvGrpSpPr>
+        <p:cNvPr id="1" name=""/>
+        <p:cNvGrpSpPr/>
+        <p:nvPr/>
+      </p:nvGrpSpPr>
+      <p:grpSpPr>
+        <a:xfrm>
+          <a:off x="0" y="0"/>
+          <a:ext cx="0" cy="0"/>
+          <a:chOff x="0" y="0"/>
+          <a:chExt cx="0" cy="0"/>
+        </a:xfrm>
+      </p:grpSpPr>
+      <p:sp>
+        <p:nvSpPr>
+          <p:cNvPr id="2" name="Title 1">
+            <a:extLst>
+              <a:ext uri="{FF2B5EF4-FFF2-40B4-BE49-F238E27FC236}">
+                <a16:creationId xmlns:a16="http://schemas.microsoft.com/office/drawing/2014/main" id="{334A3F25-D020-4881-9DD7-4925255AAF69}"/>
+              </a:ext>
+            </a:extLst>
+          </p:cNvPr>
+          <p:cNvSpPr>
+            <a:spLocks noGrp="1"/>
+          </p:cNvSpPr>
+          <p:nvPr>
+            <p:ph type="title"/>
+          </p:nvPr>
+        </p:nvSpPr>
+        <p:spPr/>
+        <p:txBody>
+          <a:bodyPr/>
+          <a:lstStyle/>
+          <a:p>
+            <a:r>
+              <a:rPr lang="en-US" dirty="0"/>
+              <a:t>11. Connection roads with obstacle constraints.</a:t>
+            </a:r>
+          </a:p>
+        </p:txBody>
+      </p:sp>
+      <p:sp>
+        <p:nvSpPr>
+          <p:cNvPr id="3" name="Content Placeholder 2">
+            <a:extLst>
+              <a:ext uri="{FF2B5EF4-FFF2-40B4-BE49-F238E27FC236}">
+                <a16:creationId xmlns:a16="http://schemas.microsoft.com/office/drawing/2014/main" id="{E0DCCD24-5731-4791-962C-E3B6CFB66DDE}"/>
+              </a:ext>
+            </a:extLst>
+          </p:cNvPr>
+          <p:cNvSpPr>
+            <a:spLocks noGrp="1"/>
+          </p:cNvSpPr>
+          <p:nvPr>
+            <p:ph idx="1"/>
+          </p:nvPr>
+        </p:nvSpPr>
+        <p:spPr/>
+        <p:txBody>
+          <a:bodyPr/>
+          <a:lstStyle/>
+          <a:p>
+            <a:endParaRPr lang="en-US"/>
+          </a:p>
+        </p:txBody>
+      </p:sp>
+    </p:spTree>
+    <p:extLst>
+      <p:ext uri="{BB962C8B-B14F-4D97-AF65-F5344CB8AC3E}">
+        <p14:creationId xmlns:p14="http://schemas.microsoft.com/office/powerpoint/2010/main" val="940991360"/>
       </p:ext>
     </p:extLst>
   </p:cSld>
@@ -3518,12 +3806,14 @@
         </p:nvSpPr>
         <p:spPr/>
         <p:txBody>
-          <a:bodyPr/>
+          <a:bodyPr>
+            <a:normAutofit fontScale="90000"/>
+          </a:bodyPr>
           <a:lstStyle/>
           <a:p>
             <a:r>
               <a:rPr lang="en-US" dirty="0"/>
-              <a:t>Connect two arbitrary roads with a connection road</a:t>
+              <a:t>Connect two arbitrary roads with a connection road given the absolute positions of the roads</a:t>
             </a:r>
           </a:p>
         </p:txBody>
@@ -3586,31 +3876,41 @@
           </a:p>
         </p:txBody>
       </p:sp>
-      <p:sp>
-        <p:nvSpPr>
-          <p:cNvPr id="3" name="Content Placeholder 2">
-            <a:extLst>
-              <a:ext uri="{FF2B5EF4-FFF2-40B4-BE49-F238E27FC236}">
-                <a16:creationId xmlns:a16="http://schemas.microsoft.com/office/drawing/2014/main" id="{D446027D-0C35-4F7F-93A2-3D6D5F7A5CAA}"/>
-              </a:ext>
-            </a:extLst>
-          </p:cNvPr>
-          <p:cNvSpPr>
-            <a:spLocks noGrp="1"/>
-          </p:cNvSpPr>
+      <p:pic>
+        <p:nvPicPr>
+          <p:cNvPr id="5" name="Content Placeholder 4" descr="Diagram&#10;&#10;Description automatically generated">
+            <a:extLst>
+              <a:ext uri="{FF2B5EF4-FFF2-40B4-BE49-F238E27FC236}">
+                <a16:creationId xmlns:a16="http://schemas.microsoft.com/office/drawing/2014/main" id="{238F4980-5B74-45B4-B63D-28540F0D3D7B}"/>
+              </a:ext>
+            </a:extLst>
+          </p:cNvPr>
+          <p:cNvPicPr>
+            <a:picLocks noGrp="1" noChangeAspect="1"/>
+          </p:cNvPicPr>
           <p:nvPr>
             <p:ph idx="1"/>
           </p:nvPr>
-        </p:nvSpPr>
-        <p:spPr/>
-        <p:txBody>
-          <a:bodyPr/>
-          <a:lstStyle/>
-          <a:p>
-            <a:endParaRPr lang="en-US"/>
-          </a:p>
-        </p:txBody>
-      </p:sp>
+        </p:nvPicPr>
+        <p:blipFill>
+          <a:blip r:embed="rId2">
+            <a:extLst>
+              <a:ext uri="{28A0092B-C50C-407E-A947-70E740481C1C}">
+                <a14:useLocalDpi xmlns:a14="http://schemas.microsoft.com/office/drawing/2010/main" val="0"/>
+              </a:ext>
+            </a:extLst>
+          </a:blip>
+          <a:stretch>
+            <a:fillRect/>
+          </a:stretch>
+        </p:blipFill>
+        <p:spPr>
+          <a:xfrm>
+            <a:off x="3195108" y="1825625"/>
+            <a:ext cx="5801783" cy="4351338"/>
+          </a:xfrm>
+        </p:spPr>
+      </p:pic>
     </p:spTree>
     <p:extLst>
       <p:ext uri="{BB962C8B-B14F-4D97-AF65-F5344CB8AC3E}">
@@ -3664,7 +3964,7 @@
           <a:p>
             <a:r>
               <a:rPr lang="en-US" dirty="0"/>
-              <a:t>3. Create roads with given lanes</a:t>
+              <a:t>3. Create roads with given lane configuration</a:t>
             </a:r>
           </a:p>
         </p:txBody>
@@ -3690,7 +3990,19 @@
           <a:bodyPr/>
           <a:lstStyle/>
           <a:p>
-            <a:endParaRPr lang="en-US"/>
+            <a:r>
+              <a:rPr lang="en-US" dirty="0"/>
+              <a:t>We can define standard lane configurations ( like two right, one left ) with standard lane geometric variations.</a:t>
+            </a:r>
+          </a:p>
+          <a:p>
+            <a:r>
+              <a:rPr lang="en-US" dirty="0"/>
+              <a:t>Input lanes, output lanes.</a:t>
+            </a:r>
+          </a:p>
+          <a:p>
+            <a:endParaRPr lang="en-US" dirty="0"/>
           </a:p>
         </p:txBody>
       </p:sp>
@@ -3729,7 +4041,7 @@
           <p:cNvPr id="2" name="Title 1">
             <a:extLst>
               <a:ext uri="{FF2B5EF4-FFF2-40B4-BE49-F238E27FC236}">
-                <a16:creationId xmlns:a16="http://schemas.microsoft.com/office/drawing/2014/main" id="{1B8E91D8-7BF4-4658-B4E1-5E4E89633515}"/>
+                <a16:creationId xmlns:a16="http://schemas.microsoft.com/office/drawing/2014/main" id="{B3FA78E3-ED32-44A0-B8FC-07357B9B5C83}"/>
               </a:ext>
             </a:extLst>
           </p:cNvPr>
@@ -3747,40 +4059,50 @@
           <a:p>
             <a:r>
               <a:rPr lang="en-US" dirty="0"/>
-              <a:t>4. Merge any road into a given point of another road</a:t>
-            </a:r>
-          </a:p>
-        </p:txBody>
-      </p:sp>
-      <p:sp>
-        <p:nvSpPr>
-          <p:cNvPr id="3" name="Content Placeholder 2">
-            <a:extLst>
-              <a:ext uri="{FF2B5EF4-FFF2-40B4-BE49-F238E27FC236}">
-                <a16:creationId xmlns:a16="http://schemas.microsoft.com/office/drawing/2014/main" id="{7B9E03AA-10C6-4F31-92C5-E712547409A2}"/>
-              </a:ext>
-            </a:extLst>
-          </p:cNvPr>
-          <p:cNvSpPr>
-            <a:spLocks noGrp="1"/>
-          </p:cNvSpPr>
+              <a:t>3.1 Connect roads with different number of lanes</a:t>
+            </a:r>
+          </a:p>
+        </p:txBody>
+      </p:sp>
+      <p:pic>
+        <p:nvPicPr>
+          <p:cNvPr id="5" name="Content Placeholder 4" descr="Diagram, text&#10;&#10;Description automatically generated">
+            <a:extLst>
+              <a:ext uri="{FF2B5EF4-FFF2-40B4-BE49-F238E27FC236}">
+                <a16:creationId xmlns:a16="http://schemas.microsoft.com/office/drawing/2014/main" id="{3474D842-57F4-4707-9E6B-F049135ED2BE}"/>
+              </a:ext>
+            </a:extLst>
+          </p:cNvPr>
+          <p:cNvPicPr>
+            <a:picLocks noGrp="1" noChangeAspect="1"/>
+          </p:cNvPicPr>
           <p:nvPr>
             <p:ph idx="1"/>
           </p:nvPr>
-        </p:nvSpPr>
-        <p:spPr/>
-        <p:txBody>
-          <a:bodyPr/>
-          <a:lstStyle/>
-          <a:p>
-            <a:endParaRPr lang="en-US"/>
-          </a:p>
-        </p:txBody>
-      </p:sp>
+        </p:nvPicPr>
+        <p:blipFill>
+          <a:blip r:embed="rId2">
+            <a:extLst>
+              <a:ext uri="{28A0092B-C50C-407E-A947-70E740481C1C}">
+                <a14:useLocalDpi xmlns:a14="http://schemas.microsoft.com/office/drawing/2010/main" val="0"/>
+              </a:ext>
+            </a:extLst>
+          </a:blip>
+          <a:stretch>
+            <a:fillRect/>
+          </a:stretch>
+        </p:blipFill>
+        <p:spPr>
+          <a:xfrm>
+            <a:off x="3195108" y="1825625"/>
+            <a:ext cx="5801783" cy="4351338"/>
+          </a:xfrm>
+        </p:spPr>
+      </p:pic>
     </p:spTree>
     <p:extLst>
       <p:ext uri="{BB962C8B-B14F-4D97-AF65-F5344CB8AC3E}">
-        <p14:creationId xmlns:p14="http://schemas.microsoft.com/office/powerpoint/2010/main" val="504732806"/>
+        <p14:creationId xmlns:p14="http://schemas.microsoft.com/office/powerpoint/2010/main" val="3916595618"/>
       </p:ext>
     </p:extLst>
   </p:cSld>
@@ -3812,7 +4134,7 @@
           <p:cNvPr id="2" name="Title 1">
             <a:extLst>
               <a:ext uri="{FF2B5EF4-FFF2-40B4-BE49-F238E27FC236}">
-                <a16:creationId xmlns:a16="http://schemas.microsoft.com/office/drawing/2014/main" id="{AA2DE6E0-1563-4702-A319-C95A7DF41C86}"/>
+                <a16:creationId xmlns:a16="http://schemas.microsoft.com/office/drawing/2014/main" id="{1B8E91D8-7BF4-4658-B4E1-5E4E89633515}"/>
               </a:ext>
             </a:extLst>
           </p:cNvPr>
@@ -3830,40 +4152,85 @@
           <a:p>
             <a:r>
               <a:rPr lang="en-US" dirty="0"/>
-              <a:t>5. Detecting and Solving road overlaps</a:t>
-            </a:r>
-          </a:p>
-        </p:txBody>
-      </p:sp>
-      <p:sp>
-        <p:nvSpPr>
-          <p:cNvPr id="3" name="Content Placeholder 2">
-            <a:extLst>
-              <a:ext uri="{FF2B5EF4-FFF2-40B4-BE49-F238E27FC236}">
-                <a16:creationId xmlns:a16="http://schemas.microsoft.com/office/drawing/2014/main" id="{2491E846-C10A-47E2-855E-EF0FE83EBAF4}"/>
-              </a:ext>
-            </a:extLst>
-          </p:cNvPr>
-          <p:cNvSpPr>
-            <a:spLocks noGrp="1"/>
-          </p:cNvSpPr>
+              <a:t>4. Merge any road into a given point of another road</a:t>
+            </a:r>
+          </a:p>
+        </p:txBody>
+      </p:sp>
+      <p:pic>
+        <p:nvPicPr>
+          <p:cNvPr id="5" name="Content Placeholder 4" descr="Diagram&#10;&#10;Description automatically generated">
+            <a:extLst>
+              <a:ext uri="{FF2B5EF4-FFF2-40B4-BE49-F238E27FC236}">
+                <a16:creationId xmlns:a16="http://schemas.microsoft.com/office/drawing/2014/main" id="{D029A94E-852F-41E5-A536-71995AA4CEAD}"/>
+              </a:ext>
+            </a:extLst>
+          </p:cNvPr>
+          <p:cNvPicPr>
+            <a:picLocks noGrp="1" noChangeAspect="1"/>
+          </p:cNvPicPr>
           <p:nvPr>
             <p:ph idx="1"/>
           </p:nvPr>
-        </p:nvSpPr>
-        <p:spPr/>
-        <p:txBody>
-          <a:bodyPr/>
-          <a:lstStyle/>
-          <a:p>
-            <a:endParaRPr lang="en-US"/>
+        </p:nvPicPr>
+        <p:blipFill>
+          <a:blip r:embed="rId2">
+            <a:extLst>
+              <a:ext uri="{28A0092B-C50C-407E-A947-70E740481C1C}">
+                <a14:useLocalDpi xmlns:a14="http://schemas.microsoft.com/office/drawing/2010/main" val="0"/>
+              </a:ext>
+            </a:extLst>
+          </a:blip>
+          <a:stretch>
+            <a:fillRect/>
+          </a:stretch>
+        </p:blipFill>
+        <p:spPr>
+          <a:xfrm>
+            <a:off x="4464248" y="1825625"/>
+            <a:ext cx="3263503" cy="4351338"/>
+          </a:xfrm>
+        </p:spPr>
+      </p:pic>
+      <p:sp>
+        <p:nvSpPr>
+          <p:cNvPr id="6" name="TextBox 5">
+            <a:extLst>
+              <a:ext uri="{FF2B5EF4-FFF2-40B4-BE49-F238E27FC236}">
+                <a16:creationId xmlns:a16="http://schemas.microsoft.com/office/drawing/2014/main" id="{5531021D-5C7F-4C43-A1B3-804FF7221FD2}"/>
+              </a:ext>
+            </a:extLst>
+          </p:cNvPr>
+          <p:cNvSpPr txBox="1"/>
+          <p:nvPr/>
+        </p:nvSpPr>
+        <p:spPr>
+          <a:xfrm>
+            <a:off x="8201608" y="2388637"/>
+            <a:ext cx="1866123" cy="1477328"/>
+          </a:xfrm>
+          <a:prstGeom prst="rect">
+            <a:avLst/>
+          </a:prstGeom>
+          <a:noFill/>
+        </p:spPr>
+        <p:txBody>
+          <a:bodyPr wrap="square" rtlCol="0">
+            <a:spAutoFit/>
+          </a:bodyPr>
+          <a:lstStyle/>
+          <a:p>
+            <a:r>
+              <a:rPr lang="en-US" dirty="0"/>
+              <a:t>Given point can be in inertial coordinate or in reference line coordinate</a:t>
+            </a:r>
           </a:p>
         </p:txBody>
       </p:sp>
     </p:spTree>
     <p:extLst>
       <p:ext uri="{BB962C8B-B14F-4D97-AF65-F5344CB8AC3E}">
-        <p14:creationId xmlns:p14="http://schemas.microsoft.com/office/powerpoint/2010/main" val="1551029021"/>
+        <p14:creationId xmlns:p14="http://schemas.microsoft.com/office/powerpoint/2010/main" val="504732806"/>
       </p:ext>
     </p:extLst>
   </p:cSld>
@@ -3895,7 +4262,7 @@
           <p:cNvPr id="2" name="Title 1">
             <a:extLst>
               <a:ext uri="{FF2B5EF4-FFF2-40B4-BE49-F238E27FC236}">
-                <a16:creationId xmlns:a16="http://schemas.microsoft.com/office/drawing/2014/main" id="{032092E6-DD28-4146-8193-DC584B9F5EBB}"/>
+                <a16:creationId xmlns:a16="http://schemas.microsoft.com/office/drawing/2014/main" id="{AA2DE6E0-1563-4702-A319-C95A7DF41C86}"/>
               </a:ext>
             </a:extLst>
           </p:cNvPr>
@@ -3913,40 +4280,50 @@
           <a:p>
             <a:r>
               <a:rPr lang="en-US" dirty="0"/>
-              <a:t>6. Add elevation</a:t>
-            </a:r>
-          </a:p>
-        </p:txBody>
-      </p:sp>
-      <p:sp>
-        <p:nvSpPr>
-          <p:cNvPr id="3" name="Content Placeholder 2">
-            <a:extLst>
-              <a:ext uri="{FF2B5EF4-FFF2-40B4-BE49-F238E27FC236}">
-                <a16:creationId xmlns:a16="http://schemas.microsoft.com/office/drawing/2014/main" id="{EEB8CDFB-FA2B-4CE6-945F-A73BF3C489DC}"/>
-              </a:ext>
-            </a:extLst>
-          </p:cNvPr>
-          <p:cNvSpPr>
-            <a:spLocks noGrp="1"/>
-          </p:cNvSpPr>
+              <a:t>5. Detecting and Solving road overlaps</a:t>
+            </a:r>
+          </a:p>
+        </p:txBody>
+      </p:sp>
+      <p:pic>
+        <p:nvPicPr>
+          <p:cNvPr id="5" name="Content Placeholder 4" descr="Chart, line chart&#10;&#10;Description automatically generated">
+            <a:extLst>
+              <a:ext uri="{FF2B5EF4-FFF2-40B4-BE49-F238E27FC236}">
+                <a16:creationId xmlns:a16="http://schemas.microsoft.com/office/drawing/2014/main" id="{0A162659-E863-41A1-8E6F-C112DBCA4B50}"/>
+              </a:ext>
+            </a:extLst>
+          </p:cNvPr>
+          <p:cNvPicPr>
+            <a:picLocks noGrp="1" noChangeAspect="1"/>
+          </p:cNvPicPr>
           <p:nvPr>
             <p:ph idx="1"/>
           </p:nvPr>
-        </p:nvSpPr>
-        <p:spPr/>
-        <p:txBody>
-          <a:bodyPr/>
-          <a:lstStyle/>
-          <a:p>
-            <a:endParaRPr lang="en-US"/>
-          </a:p>
-        </p:txBody>
-      </p:sp>
+        </p:nvPicPr>
+        <p:blipFill>
+          <a:blip r:embed="rId2">
+            <a:extLst>
+              <a:ext uri="{28A0092B-C50C-407E-A947-70E740481C1C}">
+                <a14:useLocalDpi xmlns:a14="http://schemas.microsoft.com/office/drawing/2010/main" val="0"/>
+              </a:ext>
+            </a:extLst>
+          </a:blip>
+          <a:stretch>
+            <a:fillRect/>
+          </a:stretch>
+        </p:blipFill>
+        <p:spPr>
+          <a:xfrm>
+            <a:off x="3195108" y="1825625"/>
+            <a:ext cx="5801783" cy="4351338"/>
+          </a:xfrm>
+        </p:spPr>
+      </p:pic>
     </p:spTree>
     <p:extLst>
       <p:ext uri="{BB962C8B-B14F-4D97-AF65-F5344CB8AC3E}">
-        <p14:creationId xmlns:p14="http://schemas.microsoft.com/office/powerpoint/2010/main" val="2430753737"/>
+        <p14:creationId xmlns:p14="http://schemas.microsoft.com/office/powerpoint/2010/main" val="1551029021"/>
       </p:ext>
     </p:extLst>
   </p:cSld>
@@ -3978,7 +4355,7 @@
           <p:cNvPr id="2" name="Title 1">
             <a:extLst>
               <a:ext uri="{FF2B5EF4-FFF2-40B4-BE49-F238E27FC236}">
-                <a16:creationId xmlns:a16="http://schemas.microsoft.com/office/drawing/2014/main" id="{9D70CE33-7AF8-4AAA-AF5E-054C20BD2C5C}"/>
+                <a16:creationId xmlns:a16="http://schemas.microsoft.com/office/drawing/2014/main" id="{032092E6-DD28-4146-8193-DC584B9F5EBB}"/>
               </a:ext>
             </a:extLst>
           </p:cNvPr>
@@ -3996,29 +4373,8 @@
           <a:p>
             <a:r>
               <a:rPr lang="en-US" dirty="0"/>
-              <a:t>7. Convert </a:t>
-            </a:r>
-            <a:r>
-              <a:rPr lang="en-US" dirty="0" err="1"/>
-              <a:t>opendrive</a:t>
-            </a:r>
-            <a:r>
-              <a:rPr lang="en-US" dirty="0"/>
-              <a:t> xml to </a:t>
-            </a:r>
-            <a:r>
-              <a:rPr lang="en-US" dirty="0" err="1"/>
-              <a:t>opendrive</a:t>
-            </a:r>
-            <a:r>
-              <a:rPr lang="en-US" dirty="0"/>
-              <a:t> objects in </a:t>
-            </a:r>
-            <a:r>
-              <a:rPr lang="en-US" dirty="0" err="1"/>
-              <a:t>pyodrx</a:t>
-            </a:r>
-            <a:endParaRPr lang="en-US" dirty="0"/>
+              <a:t>6. Add elevation</a:t>
+            </a:r>
           </a:p>
         </p:txBody>
       </p:sp>
@@ -4027,7 +4383,7 @@
           <p:cNvPr id="3" name="Content Placeholder 2">
             <a:extLst>
               <a:ext uri="{FF2B5EF4-FFF2-40B4-BE49-F238E27FC236}">
-                <a16:creationId xmlns:a16="http://schemas.microsoft.com/office/drawing/2014/main" id="{7AB8488B-23CF-424C-9637-DD17F2842BB5}"/>
+                <a16:creationId xmlns:a16="http://schemas.microsoft.com/office/drawing/2014/main" id="{EEB8CDFB-FA2B-4CE6-945F-A73BF3C489DC}"/>
               </a:ext>
             </a:extLst>
           </p:cNvPr>
@@ -4050,7 +4406,7 @@
     </p:spTree>
     <p:extLst>
       <p:ext uri="{BB962C8B-B14F-4D97-AF65-F5344CB8AC3E}">
-        <p14:creationId xmlns:p14="http://schemas.microsoft.com/office/powerpoint/2010/main" val="59271028"/>
+        <p14:creationId xmlns:p14="http://schemas.microsoft.com/office/powerpoint/2010/main" val="2430753737"/>
       </p:ext>
     </p:extLst>
   </p:cSld>
@@ -4082,7 +4438,7 @@
           <p:cNvPr id="2" name="Title 1">
             <a:extLst>
               <a:ext uri="{FF2B5EF4-FFF2-40B4-BE49-F238E27FC236}">
-                <a16:creationId xmlns:a16="http://schemas.microsoft.com/office/drawing/2014/main" id="{99178DB9-E162-481E-9D56-FD5ADC2B26FD}"/>
+                <a16:creationId xmlns:a16="http://schemas.microsoft.com/office/drawing/2014/main" id="{9D70CE33-7AF8-4AAA-AF5E-054C20BD2C5C}"/>
               </a:ext>
             </a:extLst>
           </p:cNvPr>
@@ -4100,8 +4456,29 @@
           <a:p>
             <a:r>
               <a:rPr lang="en-US" dirty="0"/>
-              <a:t>8. Identify unique junctions and save them in a database</a:t>
-            </a:r>
+              <a:t>7. Convert </a:t>
+            </a:r>
+            <a:r>
+              <a:rPr lang="en-US" dirty="0" err="1"/>
+              <a:t>opendrive</a:t>
+            </a:r>
+            <a:r>
+              <a:rPr lang="en-US" dirty="0"/>
+              <a:t> xml to </a:t>
+            </a:r>
+            <a:r>
+              <a:rPr lang="en-US" dirty="0" err="1"/>
+              <a:t>opendrive</a:t>
+            </a:r>
+            <a:r>
+              <a:rPr lang="en-US" dirty="0"/>
+              <a:t> objects in </a:t>
+            </a:r>
+            <a:r>
+              <a:rPr lang="en-US" dirty="0" err="1"/>
+              <a:t>pyodrx</a:t>
+            </a:r>
+            <a:endParaRPr lang="en-US" dirty="0"/>
           </a:p>
         </p:txBody>
       </p:sp>
@@ -4110,7 +4487,7 @@
           <p:cNvPr id="3" name="Content Placeholder 2">
             <a:extLst>
               <a:ext uri="{FF2B5EF4-FFF2-40B4-BE49-F238E27FC236}">
-                <a16:creationId xmlns:a16="http://schemas.microsoft.com/office/drawing/2014/main" id="{E68314E0-6ABA-4535-9E30-75A73DD28154}"/>
+                <a16:creationId xmlns:a16="http://schemas.microsoft.com/office/drawing/2014/main" id="{7AB8488B-23CF-424C-9637-DD17F2842BB5}"/>
               </a:ext>
             </a:extLst>
           </p:cNvPr>
@@ -4133,7 +4510,7 @@
     </p:spTree>
     <p:extLst>
       <p:ext uri="{BB962C8B-B14F-4D97-AF65-F5344CB8AC3E}">
-        <p14:creationId xmlns:p14="http://schemas.microsoft.com/office/powerpoint/2010/main" val="2058310382"/>
+        <p14:creationId xmlns:p14="http://schemas.microsoft.com/office/powerpoint/2010/main" val="59271028"/>
       </p:ext>
     </p:extLst>
   </p:cSld>

</xml_diff>

<commit_message>
like a boss to byPredecessor. M shape variant with single lane. standard lanes have basic lane configuration now. updating roundabouts
</commit_message>
<xml_diff>
--- a/plan/challenges.pptx
+++ b/plan/challenges.pptx
@@ -273,7 +273,7 @@
           <a:p>
             <a:fld id="{76031F30-5868-4F85-A273-006B44ACFCE8}" type="datetimeFigureOut">
               <a:rPr lang="en-US" smtClean="0"/>
-              <a:t>11/15/2020</a:t>
+              <a:t>11/18/2020</a:t>
             </a:fld>
             <a:endParaRPr lang="en-US"/>
           </a:p>
@@ -471,7 +471,7 @@
           <a:p>
             <a:fld id="{76031F30-5868-4F85-A273-006B44ACFCE8}" type="datetimeFigureOut">
               <a:rPr lang="en-US" smtClean="0"/>
-              <a:t>11/15/2020</a:t>
+              <a:t>11/18/2020</a:t>
             </a:fld>
             <a:endParaRPr lang="en-US"/>
           </a:p>
@@ -679,7 +679,7 @@
           <a:p>
             <a:fld id="{76031F30-5868-4F85-A273-006B44ACFCE8}" type="datetimeFigureOut">
               <a:rPr lang="en-US" smtClean="0"/>
-              <a:t>11/15/2020</a:t>
+              <a:t>11/18/2020</a:t>
             </a:fld>
             <a:endParaRPr lang="en-US"/>
           </a:p>
@@ -877,7 +877,7 @@
           <a:p>
             <a:fld id="{76031F30-5868-4F85-A273-006B44ACFCE8}" type="datetimeFigureOut">
               <a:rPr lang="en-US" smtClean="0"/>
-              <a:t>11/15/2020</a:t>
+              <a:t>11/18/2020</a:t>
             </a:fld>
             <a:endParaRPr lang="en-US"/>
           </a:p>
@@ -1152,7 +1152,7 @@
           <a:p>
             <a:fld id="{76031F30-5868-4F85-A273-006B44ACFCE8}" type="datetimeFigureOut">
               <a:rPr lang="en-US" smtClean="0"/>
-              <a:t>11/15/2020</a:t>
+              <a:t>11/18/2020</a:t>
             </a:fld>
             <a:endParaRPr lang="en-US"/>
           </a:p>
@@ -1417,7 +1417,7 @@
           <a:p>
             <a:fld id="{76031F30-5868-4F85-A273-006B44ACFCE8}" type="datetimeFigureOut">
               <a:rPr lang="en-US" smtClean="0"/>
-              <a:t>11/15/2020</a:t>
+              <a:t>11/18/2020</a:t>
             </a:fld>
             <a:endParaRPr lang="en-US"/>
           </a:p>
@@ -1829,7 +1829,7 @@
           <a:p>
             <a:fld id="{76031F30-5868-4F85-A273-006B44ACFCE8}" type="datetimeFigureOut">
               <a:rPr lang="en-US" smtClean="0"/>
-              <a:t>11/15/2020</a:t>
+              <a:t>11/18/2020</a:t>
             </a:fld>
             <a:endParaRPr lang="en-US"/>
           </a:p>
@@ -1970,7 +1970,7 @@
           <a:p>
             <a:fld id="{76031F30-5868-4F85-A273-006B44ACFCE8}" type="datetimeFigureOut">
               <a:rPr lang="en-US" smtClean="0"/>
-              <a:t>11/15/2020</a:t>
+              <a:t>11/18/2020</a:t>
             </a:fld>
             <a:endParaRPr lang="en-US"/>
           </a:p>
@@ -2083,7 +2083,7 @@
           <a:p>
             <a:fld id="{76031F30-5868-4F85-A273-006B44ACFCE8}" type="datetimeFigureOut">
               <a:rPr lang="en-US" smtClean="0"/>
-              <a:t>11/15/2020</a:t>
+              <a:t>11/18/2020</a:t>
             </a:fld>
             <a:endParaRPr lang="en-US"/>
           </a:p>
@@ -2394,7 +2394,7 @@
           <a:p>
             <a:fld id="{76031F30-5868-4F85-A273-006B44ACFCE8}" type="datetimeFigureOut">
               <a:rPr lang="en-US" smtClean="0"/>
-              <a:t>11/15/2020</a:t>
+              <a:t>11/18/2020</a:t>
             </a:fld>
             <a:endParaRPr lang="en-US"/>
           </a:p>
@@ -2682,7 +2682,7 @@
           <a:p>
             <a:fld id="{76031F30-5868-4F85-A273-006B44ACFCE8}" type="datetimeFigureOut">
               <a:rPr lang="en-US" smtClean="0"/>
-              <a:t>11/15/2020</a:t>
+              <a:t>11/18/2020</a:t>
             </a:fld>
             <a:endParaRPr lang="en-US"/>
           </a:p>
@@ -2923,7 +2923,7 @@
           <a:p>
             <a:fld id="{76031F30-5868-4F85-A273-006B44ACFCE8}" type="datetimeFigureOut">
               <a:rPr lang="en-US" smtClean="0"/>
-              <a:t>11/15/2020</a:t>
+              <a:t>11/18/2020</a:t>
             </a:fld>
             <a:endParaRPr lang="en-US"/>
           </a:p>
@@ -3677,6 +3677,44 @@
           </a:prstGeom>
         </p:spPr>
       </p:pic>
+      <p:sp>
+        <p:nvSpPr>
+          <p:cNvPr id="3" name="TextBox 2">
+            <a:extLst>
+              <a:ext uri="{FF2B5EF4-FFF2-40B4-BE49-F238E27FC236}">
+                <a16:creationId xmlns:a16="http://schemas.microsoft.com/office/drawing/2014/main" id="{91C824A7-4A3C-4126-82F3-B68925B385A4}"/>
+              </a:ext>
+            </a:extLst>
+          </p:cNvPr>
+          <p:cNvSpPr txBox="1"/>
+          <p:nvPr/>
+        </p:nvSpPr>
+        <p:spPr>
+          <a:xfrm>
+            <a:off x="5999584" y="2192694"/>
+            <a:ext cx="4049485" cy="646331"/>
+          </a:xfrm>
+          <a:prstGeom prst="rect">
+            <a:avLst/>
+          </a:prstGeom>
+          <a:noFill/>
+        </p:spPr>
+        <p:txBody>
+          <a:bodyPr wrap="square" rtlCol="0">
+            <a:spAutoFit/>
+          </a:bodyPr>
+          <a:lstStyle/>
+          <a:p>
+            <a:r>
+              <a:rPr lang="en-US" dirty="0"/>
+              <a:t>Merge angle: 90 degrees or any?</a:t>
+            </a:r>
+          </a:p>
+          <a:p>
+            <a:endParaRPr lang="en-US" dirty="0"/>
+          </a:p>
+        </p:txBody>
+      </p:sp>
     </p:spTree>
     <p:extLst>
       <p:ext uri="{BB962C8B-B14F-4D97-AF65-F5344CB8AC3E}">

</xml_diff>

<commit_message>
close to solving roundabout
</commit_message>
<xml_diff>
--- a/plan/challenges.pptx
+++ b/plan/challenges.pptx
@@ -20,6 +20,7 @@
     <p:sldId id="267" r:id="rId14"/>
     <p:sldId id="269" r:id="rId15"/>
     <p:sldId id="270" r:id="rId16"/>
+    <p:sldId id="271" r:id="rId17"/>
   </p:sldIdLst>
   <p:sldSz cx="12192000" cy="6858000"/>
   <p:notesSz cx="6858000" cy="9144000"/>
@@ -273,7 +274,7 @@
           <a:p>
             <a:fld id="{76031F30-5868-4F85-A273-006B44ACFCE8}" type="datetimeFigureOut">
               <a:rPr lang="en-US" smtClean="0"/>
-              <a:t>11/18/2020</a:t>
+              <a:t>11/20/2020</a:t>
             </a:fld>
             <a:endParaRPr lang="en-US"/>
           </a:p>
@@ -471,7 +472,7 @@
           <a:p>
             <a:fld id="{76031F30-5868-4F85-A273-006B44ACFCE8}" type="datetimeFigureOut">
               <a:rPr lang="en-US" smtClean="0"/>
-              <a:t>11/18/2020</a:t>
+              <a:t>11/20/2020</a:t>
             </a:fld>
             <a:endParaRPr lang="en-US"/>
           </a:p>
@@ -679,7 +680,7 @@
           <a:p>
             <a:fld id="{76031F30-5868-4F85-A273-006B44ACFCE8}" type="datetimeFigureOut">
               <a:rPr lang="en-US" smtClean="0"/>
-              <a:t>11/18/2020</a:t>
+              <a:t>11/20/2020</a:t>
             </a:fld>
             <a:endParaRPr lang="en-US"/>
           </a:p>
@@ -877,7 +878,7 @@
           <a:p>
             <a:fld id="{76031F30-5868-4F85-A273-006B44ACFCE8}" type="datetimeFigureOut">
               <a:rPr lang="en-US" smtClean="0"/>
-              <a:t>11/18/2020</a:t>
+              <a:t>11/20/2020</a:t>
             </a:fld>
             <a:endParaRPr lang="en-US"/>
           </a:p>
@@ -1152,7 +1153,7 @@
           <a:p>
             <a:fld id="{76031F30-5868-4F85-A273-006B44ACFCE8}" type="datetimeFigureOut">
               <a:rPr lang="en-US" smtClean="0"/>
-              <a:t>11/18/2020</a:t>
+              <a:t>11/20/2020</a:t>
             </a:fld>
             <a:endParaRPr lang="en-US"/>
           </a:p>
@@ -1417,7 +1418,7 @@
           <a:p>
             <a:fld id="{76031F30-5868-4F85-A273-006B44ACFCE8}" type="datetimeFigureOut">
               <a:rPr lang="en-US" smtClean="0"/>
-              <a:t>11/18/2020</a:t>
+              <a:t>11/20/2020</a:t>
             </a:fld>
             <a:endParaRPr lang="en-US"/>
           </a:p>
@@ -1829,7 +1830,7 @@
           <a:p>
             <a:fld id="{76031F30-5868-4F85-A273-006B44ACFCE8}" type="datetimeFigureOut">
               <a:rPr lang="en-US" smtClean="0"/>
-              <a:t>11/18/2020</a:t>
+              <a:t>11/20/2020</a:t>
             </a:fld>
             <a:endParaRPr lang="en-US"/>
           </a:p>
@@ -1970,7 +1971,7 @@
           <a:p>
             <a:fld id="{76031F30-5868-4F85-A273-006B44ACFCE8}" type="datetimeFigureOut">
               <a:rPr lang="en-US" smtClean="0"/>
-              <a:t>11/18/2020</a:t>
+              <a:t>11/20/2020</a:t>
             </a:fld>
             <a:endParaRPr lang="en-US"/>
           </a:p>
@@ -2083,7 +2084,7 @@
           <a:p>
             <a:fld id="{76031F30-5868-4F85-A273-006B44ACFCE8}" type="datetimeFigureOut">
               <a:rPr lang="en-US" smtClean="0"/>
-              <a:t>11/18/2020</a:t>
+              <a:t>11/20/2020</a:t>
             </a:fld>
             <a:endParaRPr lang="en-US"/>
           </a:p>
@@ -2394,7 +2395,7 @@
           <a:p>
             <a:fld id="{76031F30-5868-4F85-A273-006B44ACFCE8}" type="datetimeFigureOut">
               <a:rPr lang="en-US" smtClean="0"/>
-              <a:t>11/18/2020</a:t>
+              <a:t>11/20/2020</a:t>
             </a:fld>
             <a:endParaRPr lang="en-US"/>
           </a:p>
@@ -2682,7 +2683,7 @@
           <a:p>
             <a:fld id="{76031F30-5868-4F85-A273-006B44ACFCE8}" type="datetimeFigureOut">
               <a:rPr lang="en-US" smtClean="0"/>
-              <a:t>11/18/2020</a:t>
+              <a:t>11/20/2020</a:t>
             </a:fld>
             <a:endParaRPr lang="en-US"/>
           </a:p>
@@ -2923,7 +2924,7 @@
           <a:p>
             <a:fld id="{76031F30-5868-4F85-A273-006B44ACFCE8}" type="datetimeFigureOut">
               <a:rPr lang="en-US" smtClean="0"/>
-              <a:t>11/18/2020</a:t>
+              <a:t>11/20/2020</a:t>
             </a:fld>
             <a:endParaRPr lang="en-US"/>
           </a:p>
@@ -4015,6 +4016,89 @@
 </p:sld>
 </file>
 
+<file path=ppt/slides/slide16.xml><?xml version="1.0" encoding="utf-8"?>
+<p:sld xmlns:a="http://schemas.openxmlformats.org/drawingml/2006/main" xmlns:r="http://schemas.openxmlformats.org/officeDocument/2006/relationships" xmlns:p="http://schemas.openxmlformats.org/presentationml/2006/main">
+  <p:cSld>
+    <p:spTree>
+      <p:nvGrpSpPr>
+        <p:cNvPr id="1" name=""/>
+        <p:cNvGrpSpPr/>
+        <p:nvPr/>
+      </p:nvGrpSpPr>
+      <p:grpSpPr>
+        <a:xfrm>
+          <a:off x="0" y="0"/>
+          <a:ext cx="0" cy="0"/>
+          <a:chOff x="0" y="0"/>
+          <a:chExt cx="0" cy="0"/>
+        </a:xfrm>
+      </p:grpSpPr>
+      <p:sp>
+        <p:nvSpPr>
+          <p:cNvPr id="2" name="Title 1">
+            <a:extLst>
+              <a:ext uri="{FF2B5EF4-FFF2-40B4-BE49-F238E27FC236}">
+                <a16:creationId xmlns:a16="http://schemas.microsoft.com/office/drawing/2014/main" id="{2D86D7AA-CF82-4C11-A8AB-9C90879FFD1C}"/>
+              </a:ext>
+            </a:extLst>
+          </p:cNvPr>
+          <p:cNvSpPr>
+            <a:spLocks noGrp="1"/>
+          </p:cNvSpPr>
+          <p:nvPr>
+            <p:ph type="title"/>
+          </p:nvPr>
+        </p:nvSpPr>
+        <p:spPr/>
+        <p:txBody>
+          <a:bodyPr/>
+          <a:lstStyle/>
+          <a:p>
+            <a:r>
+              <a:rPr lang="en-US" dirty="0"/>
+              <a:t>14. Ramp </a:t>
+            </a:r>
+          </a:p>
+        </p:txBody>
+      </p:sp>
+      <p:sp>
+        <p:nvSpPr>
+          <p:cNvPr id="3" name="Content Placeholder 2">
+            <a:extLst>
+              <a:ext uri="{FF2B5EF4-FFF2-40B4-BE49-F238E27FC236}">
+                <a16:creationId xmlns:a16="http://schemas.microsoft.com/office/drawing/2014/main" id="{569FDCA7-B875-4487-92C9-F44B0ABB6197}"/>
+              </a:ext>
+            </a:extLst>
+          </p:cNvPr>
+          <p:cNvSpPr>
+            <a:spLocks noGrp="1"/>
+          </p:cNvSpPr>
+          <p:nvPr>
+            <p:ph idx="1"/>
+          </p:nvPr>
+        </p:nvSpPr>
+        <p:spPr/>
+        <p:txBody>
+          <a:bodyPr/>
+          <a:lstStyle/>
+          <a:p>
+            <a:endParaRPr lang="en-US"/>
+          </a:p>
+        </p:txBody>
+      </p:sp>
+    </p:spTree>
+    <p:extLst>
+      <p:ext uri="{BB962C8B-B14F-4D97-AF65-F5344CB8AC3E}">
+        <p14:creationId xmlns:p14="http://schemas.microsoft.com/office/powerpoint/2010/main" val="3571255644"/>
+      </p:ext>
+    </p:extLst>
+  </p:cSld>
+  <p:clrMapOvr>
+    <a:masterClrMapping/>
+  </p:clrMapOvr>
+</p:sld>
+</file>
+
 <file path=ppt/slides/slide2.xml><?xml version="1.0" encoding="utf-8"?>
 <p:sld xmlns:a="http://schemas.openxmlformats.org/drawingml/2006/main" xmlns:r="http://schemas.openxmlformats.org/officeDocument/2006/relationships" xmlns:p="http://schemas.openxmlformats.org/presentationml/2006/main">
   <p:cSld>

</xml_diff>

<commit_message>
pylint errors and some work on lane builder
</commit_message>
<xml_diff>
--- a/plan/challenges.pptx
+++ b/plan/challenges.pptx
@@ -25,6 +25,9 @@
     <p:sldId id="273" r:id="rId19"/>
     <p:sldId id="274" r:id="rId20"/>
     <p:sldId id="275" r:id="rId21"/>
+    <p:sldId id="276" r:id="rId22"/>
+    <p:sldId id="277" r:id="rId23"/>
+    <p:sldId id="278" r:id="rId24"/>
   </p:sldIdLst>
   <p:sldSz cx="12192000" cy="6858000"/>
   <p:notesSz cx="6858000" cy="9144000"/>
@@ -278,7 +281,7 @@
           <a:p>
             <a:fld id="{76031F30-5868-4F85-A273-006B44ACFCE8}" type="datetimeFigureOut">
               <a:rPr lang="en-US" smtClean="0"/>
-              <a:t>11/23/2020</a:t>
+              <a:t>12/12/2020</a:t>
             </a:fld>
             <a:endParaRPr lang="en-US"/>
           </a:p>
@@ -476,7 +479,7 @@
           <a:p>
             <a:fld id="{76031F30-5868-4F85-A273-006B44ACFCE8}" type="datetimeFigureOut">
               <a:rPr lang="en-US" smtClean="0"/>
-              <a:t>11/23/2020</a:t>
+              <a:t>12/12/2020</a:t>
             </a:fld>
             <a:endParaRPr lang="en-US"/>
           </a:p>
@@ -684,7 +687,7 @@
           <a:p>
             <a:fld id="{76031F30-5868-4F85-A273-006B44ACFCE8}" type="datetimeFigureOut">
               <a:rPr lang="en-US" smtClean="0"/>
-              <a:t>11/23/2020</a:t>
+              <a:t>12/12/2020</a:t>
             </a:fld>
             <a:endParaRPr lang="en-US"/>
           </a:p>
@@ -882,7 +885,7 @@
           <a:p>
             <a:fld id="{76031F30-5868-4F85-A273-006B44ACFCE8}" type="datetimeFigureOut">
               <a:rPr lang="en-US" smtClean="0"/>
-              <a:t>11/23/2020</a:t>
+              <a:t>12/12/2020</a:t>
             </a:fld>
             <a:endParaRPr lang="en-US"/>
           </a:p>
@@ -1157,7 +1160,7 @@
           <a:p>
             <a:fld id="{76031F30-5868-4F85-A273-006B44ACFCE8}" type="datetimeFigureOut">
               <a:rPr lang="en-US" smtClean="0"/>
-              <a:t>11/23/2020</a:t>
+              <a:t>12/12/2020</a:t>
             </a:fld>
             <a:endParaRPr lang="en-US"/>
           </a:p>
@@ -1422,7 +1425,7 @@
           <a:p>
             <a:fld id="{76031F30-5868-4F85-A273-006B44ACFCE8}" type="datetimeFigureOut">
               <a:rPr lang="en-US" smtClean="0"/>
-              <a:t>11/23/2020</a:t>
+              <a:t>12/12/2020</a:t>
             </a:fld>
             <a:endParaRPr lang="en-US"/>
           </a:p>
@@ -1834,7 +1837,7 @@
           <a:p>
             <a:fld id="{76031F30-5868-4F85-A273-006B44ACFCE8}" type="datetimeFigureOut">
               <a:rPr lang="en-US" smtClean="0"/>
-              <a:t>11/23/2020</a:t>
+              <a:t>12/12/2020</a:t>
             </a:fld>
             <a:endParaRPr lang="en-US"/>
           </a:p>
@@ -1975,7 +1978,7 @@
           <a:p>
             <a:fld id="{76031F30-5868-4F85-A273-006B44ACFCE8}" type="datetimeFigureOut">
               <a:rPr lang="en-US" smtClean="0"/>
-              <a:t>11/23/2020</a:t>
+              <a:t>12/12/2020</a:t>
             </a:fld>
             <a:endParaRPr lang="en-US"/>
           </a:p>
@@ -2088,7 +2091,7 @@
           <a:p>
             <a:fld id="{76031F30-5868-4F85-A273-006B44ACFCE8}" type="datetimeFigureOut">
               <a:rPr lang="en-US" smtClean="0"/>
-              <a:t>11/23/2020</a:t>
+              <a:t>12/12/2020</a:t>
             </a:fld>
             <a:endParaRPr lang="en-US"/>
           </a:p>
@@ -2399,7 +2402,7 @@
           <a:p>
             <a:fld id="{76031F30-5868-4F85-A273-006B44ACFCE8}" type="datetimeFigureOut">
               <a:rPr lang="en-US" smtClean="0"/>
-              <a:t>11/23/2020</a:t>
+              <a:t>12/12/2020</a:t>
             </a:fld>
             <a:endParaRPr lang="en-US"/>
           </a:p>
@@ -2687,7 +2690,7 @@
           <a:p>
             <a:fld id="{76031F30-5868-4F85-A273-006B44ACFCE8}" type="datetimeFigureOut">
               <a:rPr lang="en-US" smtClean="0"/>
-              <a:t>11/23/2020</a:t>
+              <a:t>12/12/2020</a:t>
             </a:fld>
             <a:endParaRPr lang="en-US"/>
           </a:p>
@@ -2928,7 +2931,7 @@
           <a:p>
             <a:fld id="{76031F30-5868-4F85-A273-006B44ACFCE8}" type="datetimeFigureOut">
               <a:rPr lang="en-US" smtClean="0"/>
-              <a:t>11/23/2020</a:t>
+              <a:t>12/12/2020</a:t>
             </a:fld>
             <a:endParaRPr lang="en-US"/>
           </a:p>
@@ -5767,6 +5770,267 @@
 </p:sld>
 </file>
 
+<file path=ppt/slides/slide21.xml><?xml version="1.0" encoding="utf-8"?>
+<p:sld xmlns:a="http://schemas.openxmlformats.org/drawingml/2006/main" xmlns:r="http://schemas.openxmlformats.org/officeDocument/2006/relationships" xmlns:p="http://schemas.openxmlformats.org/presentationml/2006/main">
+  <p:cSld>
+    <p:spTree>
+      <p:nvGrpSpPr>
+        <p:cNvPr id="1" name=""/>
+        <p:cNvGrpSpPr/>
+        <p:nvPr/>
+      </p:nvGrpSpPr>
+      <p:grpSpPr>
+        <a:xfrm>
+          <a:off x="0" y="0"/>
+          <a:ext cx="0" cy="0"/>
+          <a:chOff x="0" y="0"/>
+          <a:chExt cx="0" cy="0"/>
+        </a:xfrm>
+      </p:grpSpPr>
+      <p:sp>
+        <p:nvSpPr>
+          <p:cNvPr id="2" name="Title 1">
+            <a:extLst>
+              <a:ext uri="{FF2B5EF4-FFF2-40B4-BE49-F238E27FC236}">
+                <a16:creationId xmlns:a16="http://schemas.microsoft.com/office/drawing/2014/main" id="{C82AE33D-A148-4F90-99BE-BA61D2D2B346}"/>
+              </a:ext>
+            </a:extLst>
+          </p:cNvPr>
+          <p:cNvSpPr>
+            <a:spLocks noGrp="1"/>
+          </p:cNvSpPr>
+          <p:nvPr>
+            <p:ph type="title"/>
+          </p:nvPr>
+        </p:nvSpPr>
+        <p:spPr/>
+        <p:txBody>
+          <a:bodyPr/>
+          <a:lstStyle/>
+          <a:p>
+            <a:r>
+              <a:rPr lang="en-US" dirty="0"/>
+              <a:t>19 Variable width lanes</a:t>
+            </a:r>
+          </a:p>
+        </p:txBody>
+      </p:sp>
+      <p:sp>
+        <p:nvSpPr>
+          <p:cNvPr id="3" name="Content Placeholder 2">
+            <a:extLst>
+              <a:ext uri="{FF2B5EF4-FFF2-40B4-BE49-F238E27FC236}">
+                <a16:creationId xmlns:a16="http://schemas.microsoft.com/office/drawing/2014/main" id="{0B686639-0A76-4C94-932B-7F5E65A77E0B}"/>
+              </a:ext>
+            </a:extLst>
+          </p:cNvPr>
+          <p:cNvSpPr>
+            <a:spLocks noGrp="1"/>
+          </p:cNvSpPr>
+          <p:nvPr>
+            <p:ph idx="1"/>
+          </p:nvPr>
+        </p:nvSpPr>
+        <p:spPr/>
+        <p:txBody>
+          <a:bodyPr/>
+          <a:lstStyle/>
+          <a:p>
+            <a:r>
+              <a:rPr lang="en-US" dirty="0"/>
+              <a:t>In case of curves, variable width lanes are desired for comfortable driving (STREETGEN) </a:t>
+            </a:r>
+          </a:p>
+        </p:txBody>
+      </p:sp>
+    </p:spTree>
+    <p:extLst>
+      <p:ext uri="{BB962C8B-B14F-4D97-AF65-F5344CB8AC3E}">
+        <p14:creationId xmlns:p14="http://schemas.microsoft.com/office/powerpoint/2010/main" val="4238862135"/>
+      </p:ext>
+    </p:extLst>
+  </p:cSld>
+  <p:clrMapOvr>
+    <a:masterClrMapping/>
+  </p:clrMapOvr>
+</p:sld>
+</file>
+
+<file path=ppt/slides/slide22.xml><?xml version="1.0" encoding="utf-8"?>
+<p:sld xmlns:a="http://schemas.openxmlformats.org/drawingml/2006/main" xmlns:r="http://schemas.openxmlformats.org/officeDocument/2006/relationships" xmlns:p="http://schemas.openxmlformats.org/presentationml/2006/main">
+  <p:cSld>
+    <p:spTree>
+      <p:nvGrpSpPr>
+        <p:cNvPr id="1" name=""/>
+        <p:cNvGrpSpPr/>
+        <p:nvPr/>
+      </p:nvGrpSpPr>
+      <p:grpSpPr>
+        <a:xfrm>
+          <a:off x="0" y="0"/>
+          <a:ext cx="0" cy="0"/>
+          <a:chOff x="0" y="0"/>
+          <a:chExt cx="0" cy="0"/>
+        </a:xfrm>
+      </p:grpSpPr>
+      <p:sp>
+        <p:nvSpPr>
+          <p:cNvPr id="2" name="Title 1">
+            <a:extLst>
+              <a:ext uri="{FF2B5EF4-FFF2-40B4-BE49-F238E27FC236}">
+                <a16:creationId xmlns:a16="http://schemas.microsoft.com/office/drawing/2014/main" id="{6E79FA5C-ADA4-4019-A2FC-1E1F746CC8E9}"/>
+              </a:ext>
+            </a:extLst>
+          </p:cNvPr>
+          <p:cNvSpPr>
+            <a:spLocks noGrp="1"/>
+          </p:cNvSpPr>
+          <p:nvPr>
+            <p:ph type="title"/>
+          </p:nvPr>
+        </p:nvSpPr>
+        <p:spPr/>
+        <p:txBody>
+          <a:bodyPr/>
+          <a:lstStyle/>
+          <a:p>
+            <a:r>
+              <a:rPr lang="en-US" dirty="0"/>
+              <a:t>20 Junction connection road curvature constraints</a:t>
+            </a:r>
+          </a:p>
+        </p:txBody>
+      </p:sp>
+      <p:sp>
+        <p:nvSpPr>
+          <p:cNvPr id="3" name="Content Placeholder 2">
+            <a:extLst>
+              <a:ext uri="{FF2B5EF4-FFF2-40B4-BE49-F238E27FC236}">
+                <a16:creationId xmlns:a16="http://schemas.microsoft.com/office/drawing/2014/main" id="{2086BDBD-B831-4FF7-9940-2F3A13EC4E08}"/>
+              </a:ext>
+            </a:extLst>
+          </p:cNvPr>
+          <p:cNvSpPr>
+            <a:spLocks noGrp="1"/>
+          </p:cNvSpPr>
+          <p:nvPr>
+            <p:ph idx="1"/>
+          </p:nvPr>
+        </p:nvSpPr>
+        <p:spPr/>
+        <p:txBody>
+          <a:bodyPr/>
+          <a:lstStyle/>
+          <a:p>
+            <a:r>
+              <a:rPr lang="en-US" dirty="0"/>
+              <a:t>Max curvature to prevent lane overlaps given an angle</a:t>
+            </a:r>
+          </a:p>
+          <a:p>
+            <a:r>
+              <a:rPr lang="en-US" dirty="0"/>
+              <a:t>Min curvature to prevent lane length going over a threshold given an angle</a:t>
+            </a:r>
+          </a:p>
+        </p:txBody>
+      </p:sp>
+    </p:spTree>
+    <p:extLst>
+      <p:ext uri="{BB962C8B-B14F-4D97-AF65-F5344CB8AC3E}">
+        <p14:creationId xmlns:p14="http://schemas.microsoft.com/office/powerpoint/2010/main" val="3130091277"/>
+      </p:ext>
+    </p:extLst>
+  </p:cSld>
+  <p:clrMapOvr>
+    <a:masterClrMapping/>
+  </p:clrMapOvr>
+</p:sld>
+</file>
+
+<file path=ppt/slides/slide23.xml><?xml version="1.0" encoding="utf-8"?>
+<p:sld xmlns:a="http://schemas.openxmlformats.org/drawingml/2006/main" xmlns:r="http://schemas.openxmlformats.org/officeDocument/2006/relationships" xmlns:p="http://schemas.openxmlformats.org/presentationml/2006/main">
+  <p:cSld>
+    <p:spTree>
+      <p:nvGrpSpPr>
+        <p:cNvPr id="1" name=""/>
+        <p:cNvGrpSpPr/>
+        <p:nvPr/>
+      </p:nvGrpSpPr>
+      <p:grpSpPr>
+        <a:xfrm>
+          <a:off x="0" y="0"/>
+          <a:ext cx="0" cy="0"/>
+          <a:chOff x="0" y="0"/>
+          <a:chExt cx="0" cy="0"/>
+        </a:xfrm>
+      </p:grpSpPr>
+      <p:sp>
+        <p:nvSpPr>
+          <p:cNvPr id="2" name="Title 1">
+            <a:extLst>
+              <a:ext uri="{FF2B5EF4-FFF2-40B4-BE49-F238E27FC236}">
+                <a16:creationId xmlns:a16="http://schemas.microsoft.com/office/drawing/2014/main" id="{945C68E8-5D5C-496E-867A-768B9580A257}"/>
+              </a:ext>
+            </a:extLst>
+          </p:cNvPr>
+          <p:cNvSpPr>
+            <a:spLocks noGrp="1"/>
+          </p:cNvSpPr>
+          <p:nvPr>
+            <p:ph type="title"/>
+          </p:nvPr>
+        </p:nvSpPr>
+        <p:spPr/>
+        <p:txBody>
+          <a:bodyPr/>
+          <a:lstStyle/>
+          <a:p>
+            <a:r>
+              <a:rPr lang="en-US" dirty="0"/>
+              <a:t>21 Turn lanes that are not a part of the junction</a:t>
+            </a:r>
+          </a:p>
+        </p:txBody>
+      </p:sp>
+      <p:sp>
+        <p:nvSpPr>
+          <p:cNvPr id="3" name="Content Placeholder 2">
+            <a:extLst>
+              <a:ext uri="{FF2B5EF4-FFF2-40B4-BE49-F238E27FC236}">
+                <a16:creationId xmlns:a16="http://schemas.microsoft.com/office/drawing/2014/main" id="{25F73D0E-8B07-4C19-9EE0-1077EDF490B2}"/>
+              </a:ext>
+            </a:extLst>
+          </p:cNvPr>
+          <p:cNvSpPr>
+            <a:spLocks noGrp="1"/>
+          </p:cNvSpPr>
+          <p:nvPr>
+            <p:ph idx="1"/>
+          </p:nvPr>
+        </p:nvSpPr>
+        <p:spPr/>
+        <p:txBody>
+          <a:bodyPr/>
+          <a:lstStyle/>
+          <a:p>
+            <a:endParaRPr lang="en-US"/>
+          </a:p>
+        </p:txBody>
+      </p:sp>
+    </p:spTree>
+    <p:extLst>
+      <p:ext uri="{BB962C8B-B14F-4D97-AF65-F5344CB8AC3E}">
+        <p14:creationId xmlns:p14="http://schemas.microsoft.com/office/powerpoint/2010/main" val="2514726084"/>
+      </p:ext>
+    </p:extLst>
+  </p:cSld>
+  <p:clrMapOvr>
+    <a:masterClrMapping/>
+  </p:clrMapOvr>
+</p:sld>
+</file>
+
 <file path=ppt/slides/slide3.xml><?xml version="1.0" encoding="utf-8"?>
 <p:sld xmlns:a="http://schemas.openxmlformats.org/drawingml/2006/main" xmlns:r="http://schemas.openxmlformats.org/officeDocument/2006/relationships" xmlns:p="http://schemas.openxmlformats.org/presentationml/2006/main">
   <p:cSld>

</xml_diff>

<commit_message>
working on lane configurations
</commit_message>
<xml_diff>
--- a/plan/challenges.pptx
+++ b/plan/challenges.pptx
@@ -28,6 +28,9 @@
     <p:sldId id="276" r:id="rId22"/>
     <p:sldId id="277" r:id="rId23"/>
     <p:sldId id="278" r:id="rId24"/>
+    <p:sldId id="279" r:id="rId25"/>
+    <p:sldId id="280" r:id="rId26"/>
+    <p:sldId id="281" r:id="rId27"/>
   </p:sldIdLst>
   <p:sldSz cx="12192000" cy="6858000"/>
   <p:notesSz cx="6858000" cy="9144000"/>
@@ -281,7 +284,7 @@
           <a:p>
             <a:fld id="{76031F30-5868-4F85-A273-006B44ACFCE8}" type="datetimeFigureOut">
               <a:rPr lang="en-US" smtClean="0"/>
-              <a:t>12/12/2020</a:t>
+              <a:t>12/16/2020</a:t>
             </a:fld>
             <a:endParaRPr lang="en-US"/>
           </a:p>
@@ -479,7 +482,7 @@
           <a:p>
             <a:fld id="{76031F30-5868-4F85-A273-006B44ACFCE8}" type="datetimeFigureOut">
               <a:rPr lang="en-US" smtClean="0"/>
-              <a:t>12/12/2020</a:t>
+              <a:t>12/16/2020</a:t>
             </a:fld>
             <a:endParaRPr lang="en-US"/>
           </a:p>
@@ -687,7 +690,7 @@
           <a:p>
             <a:fld id="{76031F30-5868-4F85-A273-006B44ACFCE8}" type="datetimeFigureOut">
               <a:rPr lang="en-US" smtClean="0"/>
-              <a:t>12/12/2020</a:t>
+              <a:t>12/16/2020</a:t>
             </a:fld>
             <a:endParaRPr lang="en-US"/>
           </a:p>
@@ -885,7 +888,7 @@
           <a:p>
             <a:fld id="{76031F30-5868-4F85-A273-006B44ACFCE8}" type="datetimeFigureOut">
               <a:rPr lang="en-US" smtClean="0"/>
-              <a:t>12/12/2020</a:t>
+              <a:t>12/16/2020</a:t>
             </a:fld>
             <a:endParaRPr lang="en-US"/>
           </a:p>
@@ -1160,7 +1163,7 @@
           <a:p>
             <a:fld id="{76031F30-5868-4F85-A273-006B44ACFCE8}" type="datetimeFigureOut">
               <a:rPr lang="en-US" smtClean="0"/>
-              <a:t>12/12/2020</a:t>
+              <a:t>12/16/2020</a:t>
             </a:fld>
             <a:endParaRPr lang="en-US"/>
           </a:p>
@@ -1425,7 +1428,7 @@
           <a:p>
             <a:fld id="{76031F30-5868-4F85-A273-006B44ACFCE8}" type="datetimeFigureOut">
               <a:rPr lang="en-US" smtClean="0"/>
-              <a:t>12/12/2020</a:t>
+              <a:t>12/16/2020</a:t>
             </a:fld>
             <a:endParaRPr lang="en-US"/>
           </a:p>
@@ -1837,7 +1840,7 @@
           <a:p>
             <a:fld id="{76031F30-5868-4F85-A273-006B44ACFCE8}" type="datetimeFigureOut">
               <a:rPr lang="en-US" smtClean="0"/>
-              <a:t>12/12/2020</a:t>
+              <a:t>12/16/2020</a:t>
             </a:fld>
             <a:endParaRPr lang="en-US"/>
           </a:p>
@@ -1978,7 +1981,7 @@
           <a:p>
             <a:fld id="{76031F30-5868-4F85-A273-006B44ACFCE8}" type="datetimeFigureOut">
               <a:rPr lang="en-US" smtClean="0"/>
-              <a:t>12/12/2020</a:t>
+              <a:t>12/16/2020</a:t>
             </a:fld>
             <a:endParaRPr lang="en-US"/>
           </a:p>
@@ -2091,7 +2094,7 @@
           <a:p>
             <a:fld id="{76031F30-5868-4F85-A273-006B44ACFCE8}" type="datetimeFigureOut">
               <a:rPr lang="en-US" smtClean="0"/>
-              <a:t>12/12/2020</a:t>
+              <a:t>12/16/2020</a:t>
             </a:fld>
             <a:endParaRPr lang="en-US"/>
           </a:p>
@@ -2402,7 +2405,7 @@
           <a:p>
             <a:fld id="{76031F30-5868-4F85-A273-006B44ACFCE8}" type="datetimeFigureOut">
               <a:rPr lang="en-US" smtClean="0"/>
-              <a:t>12/12/2020</a:t>
+              <a:t>12/16/2020</a:t>
             </a:fld>
             <a:endParaRPr lang="en-US"/>
           </a:p>
@@ -2690,7 +2693,7 @@
           <a:p>
             <a:fld id="{76031F30-5868-4F85-A273-006B44ACFCE8}" type="datetimeFigureOut">
               <a:rPr lang="en-US" smtClean="0"/>
-              <a:t>12/12/2020</a:t>
+              <a:t>12/16/2020</a:t>
             </a:fld>
             <a:endParaRPr lang="en-US"/>
           </a:p>
@@ -2931,7 +2934,7 @@
           <a:p>
             <a:fld id="{76031F30-5868-4F85-A273-006B44ACFCE8}" type="datetimeFigureOut">
               <a:rPr lang="en-US" smtClean="0"/>
-              <a:t>12/12/2020</a:t>
+              <a:t>12/16/2020</a:t>
             </a:fld>
             <a:endParaRPr lang="en-US"/>
           </a:p>
@@ -6031,6 +6034,2755 @@
 </p:sld>
 </file>
 
+<file path=ppt/slides/slide24.xml><?xml version="1.0" encoding="utf-8"?>
+<p:sld xmlns:a="http://schemas.openxmlformats.org/drawingml/2006/main" xmlns:r="http://schemas.openxmlformats.org/officeDocument/2006/relationships" xmlns:p="http://schemas.openxmlformats.org/presentationml/2006/main">
+  <p:cSld>
+    <p:spTree>
+      <p:nvGrpSpPr>
+        <p:cNvPr id="1" name=""/>
+        <p:cNvGrpSpPr/>
+        <p:nvPr/>
+      </p:nvGrpSpPr>
+      <p:grpSpPr>
+        <a:xfrm>
+          <a:off x="0" y="0"/>
+          <a:ext cx="0" cy="0"/>
+          <a:chOff x="0" y="0"/>
+          <a:chExt cx="0" cy="0"/>
+        </a:xfrm>
+      </p:grpSpPr>
+      <p:sp>
+        <p:nvSpPr>
+          <p:cNvPr id="2" name="Title 1">
+            <a:extLst>
+              <a:ext uri="{FF2B5EF4-FFF2-40B4-BE49-F238E27FC236}">
+                <a16:creationId xmlns:a16="http://schemas.microsoft.com/office/drawing/2014/main" id="{E80149D6-CD45-45C0-804C-9867BDF101C9}"/>
+              </a:ext>
+            </a:extLst>
+          </p:cNvPr>
+          <p:cNvSpPr>
+            <a:spLocks noGrp="1"/>
+          </p:cNvSpPr>
+          <p:nvPr>
+            <p:ph type="title"/>
+          </p:nvPr>
+        </p:nvSpPr>
+        <p:spPr/>
+        <p:txBody>
+          <a:bodyPr/>
+          <a:lstStyle/>
+          <a:p>
+            <a:r>
+              <a:rPr lang="en-US" dirty="0"/>
+              <a:t>22 Connection roads with different reference lines</a:t>
+            </a:r>
+          </a:p>
+        </p:txBody>
+      </p:sp>
+      <p:pic>
+        <p:nvPicPr>
+          <p:cNvPr id="6" name="Picture 5">
+            <a:extLst>
+              <a:ext uri="{FF2B5EF4-FFF2-40B4-BE49-F238E27FC236}">
+                <a16:creationId xmlns:a16="http://schemas.microsoft.com/office/drawing/2014/main" id="{6A4D68FB-A7F4-497A-88DD-87EBB638AD3B}"/>
+              </a:ext>
+            </a:extLst>
+          </p:cNvPr>
+          <p:cNvPicPr>
+            <a:picLocks noChangeAspect="1"/>
+          </p:cNvPicPr>
+          <p:nvPr/>
+        </p:nvPicPr>
+        <p:blipFill>
+          <a:blip r:embed="rId2">
+            <a:extLst>
+              <a:ext uri="{28A0092B-C50C-407E-A947-70E740481C1C}">
+                <a14:useLocalDpi xmlns:a14="http://schemas.microsoft.com/office/drawing/2010/main" val="0"/>
+              </a:ext>
+            </a:extLst>
+          </a:blip>
+          <a:stretch>
+            <a:fillRect/>
+          </a:stretch>
+        </p:blipFill>
+        <p:spPr>
+          <a:xfrm>
+            <a:off x="1082953" y="2035013"/>
+            <a:ext cx="4572000" cy="2571750"/>
+          </a:xfrm>
+          <a:prstGeom prst="rect">
+            <a:avLst/>
+          </a:prstGeom>
+        </p:spPr>
+      </p:pic>
+      <p:cxnSp>
+        <p:nvCxnSpPr>
+          <p:cNvPr id="4" name="Straight Arrow Connector 3">
+            <a:extLst>
+              <a:ext uri="{FF2B5EF4-FFF2-40B4-BE49-F238E27FC236}">
+                <a16:creationId xmlns:a16="http://schemas.microsoft.com/office/drawing/2014/main" id="{741D3535-E4A9-41FB-AB57-8877B765E94F}"/>
+              </a:ext>
+            </a:extLst>
+          </p:cNvPr>
+          <p:cNvCxnSpPr>
+            <a:cxnSpLocks/>
+          </p:cNvCxnSpPr>
+          <p:nvPr/>
+        </p:nvCxnSpPr>
+        <p:spPr>
+          <a:xfrm flipV="1">
+            <a:off x="3337349" y="2494584"/>
+            <a:ext cx="1234651" cy="657358"/>
+          </a:xfrm>
+          <a:prstGeom prst="straightConnector1">
+            <a:avLst/>
+          </a:prstGeom>
+          <a:ln>
+            <a:solidFill>
+              <a:schemeClr val="bg2">
+                <a:lumMod val="75000"/>
+              </a:schemeClr>
+            </a:solidFill>
+            <a:tailEnd type="triangle"/>
+          </a:ln>
+        </p:spPr>
+        <p:style>
+          <a:lnRef idx="1">
+            <a:schemeClr val="accent1"/>
+          </a:lnRef>
+          <a:fillRef idx="0">
+            <a:schemeClr val="accent1"/>
+          </a:fillRef>
+          <a:effectRef idx="0">
+            <a:schemeClr val="accent1"/>
+          </a:effectRef>
+          <a:fontRef idx="minor">
+            <a:schemeClr val="tx1"/>
+          </a:fontRef>
+        </p:style>
+      </p:cxnSp>
+      <p:cxnSp>
+        <p:nvCxnSpPr>
+          <p:cNvPr id="7" name="Straight Arrow Connector 6">
+            <a:extLst>
+              <a:ext uri="{FF2B5EF4-FFF2-40B4-BE49-F238E27FC236}">
+                <a16:creationId xmlns:a16="http://schemas.microsoft.com/office/drawing/2014/main" id="{63A9BDEB-D532-49E8-982A-5E4A2108DE5D}"/>
+              </a:ext>
+            </a:extLst>
+          </p:cNvPr>
+          <p:cNvCxnSpPr>
+            <a:cxnSpLocks/>
+          </p:cNvCxnSpPr>
+          <p:nvPr/>
+        </p:nvCxnSpPr>
+        <p:spPr>
+          <a:xfrm flipH="1" flipV="1">
+            <a:off x="2991816" y="2494584"/>
+            <a:ext cx="345534" cy="657358"/>
+          </a:xfrm>
+          <a:prstGeom prst="straightConnector1">
+            <a:avLst/>
+          </a:prstGeom>
+          <a:ln>
+            <a:solidFill>
+              <a:schemeClr val="bg2">
+                <a:lumMod val="75000"/>
+              </a:schemeClr>
+            </a:solidFill>
+            <a:tailEnd type="triangle"/>
+          </a:ln>
+        </p:spPr>
+        <p:style>
+          <a:lnRef idx="1">
+            <a:schemeClr val="accent1"/>
+          </a:lnRef>
+          <a:fillRef idx="0">
+            <a:schemeClr val="accent1"/>
+          </a:fillRef>
+          <a:effectRef idx="0">
+            <a:schemeClr val="accent1"/>
+          </a:effectRef>
+          <a:fontRef idx="minor">
+            <a:schemeClr val="tx1"/>
+          </a:fontRef>
+        </p:style>
+      </p:cxnSp>
+      <p:cxnSp>
+        <p:nvCxnSpPr>
+          <p:cNvPr id="11" name="Straight Arrow Connector 10">
+            <a:extLst>
+              <a:ext uri="{FF2B5EF4-FFF2-40B4-BE49-F238E27FC236}">
+                <a16:creationId xmlns:a16="http://schemas.microsoft.com/office/drawing/2014/main" id="{D3A494EC-7B6D-4530-9D58-4F8B03068E34}"/>
+              </a:ext>
+            </a:extLst>
+          </p:cNvPr>
+          <p:cNvCxnSpPr>
+            <a:cxnSpLocks/>
+          </p:cNvCxnSpPr>
+          <p:nvPr/>
+        </p:nvCxnSpPr>
+        <p:spPr>
+          <a:xfrm>
+            <a:off x="2178547" y="4314957"/>
+            <a:ext cx="4508793" cy="0"/>
+          </a:xfrm>
+          <a:prstGeom prst="straightConnector1">
+            <a:avLst/>
+          </a:prstGeom>
+          <a:ln>
+            <a:tailEnd type="triangle"/>
+          </a:ln>
+        </p:spPr>
+        <p:style>
+          <a:lnRef idx="1">
+            <a:schemeClr val="accent1"/>
+          </a:lnRef>
+          <a:fillRef idx="0">
+            <a:schemeClr val="accent1"/>
+          </a:fillRef>
+          <a:effectRef idx="0">
+            <a:schemeClr val="accent1"/>
+          </a:effectRef>
+          <a:fontRef idx="minor">
+            <a:schemeClr val="tx1"/>
+          </a:fontRef>
+        </p:style>
+      </p:cxnSp>
+      <p:cxnSp>
+        <p:nvCxnSpPr>
+          <p:cNvPr id="12" name="Straight Arrow Connector 11">
+            <a:extLst>
+              <a:ext uri="{FF2B5EF4-FFF2-40B4-BE49-F238E27FC236}">
+                <a16:creationId xmlns:a16="http://schemas.microsoft.com/office/drawing/2014/main" id="{0FB1BFD0-2FED-4125-9EA6-97C79FA46D5F}"/>
+              </a:ext>
+            </a:extLst>
+          </p:cNvPr>
+          <p:cNvCxnSpPr>
+            <a:cxnSpLocks/>
+          </p:cNvCxnSpPr>
+          <p:nvPr/>
+        </p:nvCxnSpPr>
+        <p:spPr>
+          <a:xfrm flipV="1">
+            <a:off x="2330947" y="1887794"/>
+            <a:ext cx="0" cy="2579564"/>
+          </a:xfrm>
+          <a:prstGeom prst="straightConnector1">
+            <a:avLst/>
+          </a:prstGeom>
+          <a:ln>
+            <a:tailEnd type="triangle"/>
+          </a:ln>
+        </p:spPr>
+        <p:style>
+          <a:lnRef idx="1">
+            <a:schemeClr val="accent1"/>
+          </a:lnRef>
+          <a:fillRef idx="0">
+            <a:schemeClr val="accent1"/>
+          </a:fillRef>
+          <a:effectRef idx="0">
+            <a:schemeClr val="accent1"/>
+          </a:effectRef>
+          <a:fontRef idx="minor">
+            <a:schemeClr val="tx1"/>
+          </a:fontRef>
+        </p:style>
+      </p:cxnSp>
+      <p:cxnSp>
+        <p:nvCxnSpPr>
+          <p:cNvPr id="15" name="Straight Arrow Connector 14">
+            <a:extLst>
+              <a:ext uri="{FF2B5EF4-FFF2-40B4-BE49-F238E27FC236}">
+                <a16:creationId xmlns:a16="http://schemas.microsoft.com/office/drawing/2014/main" id="{F8D16A36-9FB7-4084-B188-310D7F2689D1}"/>
+              </a:ext>
+            </a:extLst>
+          </p:cNvPr>
+          <p:cNvCxnSpPr>
+            <a:cxnSpLocks/>
+          </p:cNvCxnSpPr>
+          <p:nvPr/>
+        </p:nvCxnSpPr>
+        <p:spPr>
+          <a:xfrm>
+            <a:off x="4336026" y="2642068"/>
+            <a:ext cx="147484" cy="219119"/>
+          </a:xfrm>
+          <a:prstGeom prst="straightConnector1">
+            <a:avLst/>
+          </a:prstGeom>
+          <a:ln w="25400">
+            <a:solidFill>
+              <a:schemeClr val="accent6"/>
+            </a:solidFill>
+            <a:tailEnd type="triangle"/>
+          </a:ln>
+        </p:spPr>
+        <p:style>
+          <a:lnRef idx="1">
+            <a:schemeClr val="accent1"/>
+          </a:lnRef>
+          <a:fillRef idx="0">
+            <a:schemeClr val="accent1"/>
+          </a:fillRef>
+          <a:effectRef idx="0">
+            <a:schemeClr val="accent1"/>
+          </a:effectRef>
+          <a:fontRef idx="minor">
+            <a:schemeClr val="tx1"/>
+          </a:fontRef>
+        </p:style>
+      </p:cxnSp>
+      <p:sp>
+        <p:nvSpPr>
+          <p:cNvPr id="21" name="TextBox 20">
+            <a:extLst>
+              <a:ext uri="{FF2B5EF4-FFF2-40B4-BE49-F238E27FC236}">
+                <a16:creationId xmlns:a16="http://schemas.microsoft.com/office/drawing/2014/main" id="{C28A12E8-D61F-4A98-9F81-90AB031C1C34}"/>
+              </a:ext>
+            </a:extLst>
+          </p:cNvPr>
+          <p:cNvSpPr txBox="1"/>
+          <p:nvPr/>
+        </p:nvSpPr>
+        <p:spPr>
+          <a:xfrm>
+            <a:off x="3509719" y="3275111"/>
+            <a:ext cx="238549" cy="307777"/>
+          </a:xfrm>
+          <a:prstGeom prst="rect">
+            <a:avLst/>
+          </a:prstGeom>
+          <a:noFill/>
+        </p:spPr>
+        <p:txBody>
+          <a:bodyPr wrap="square" rtlCol="0">
+            <a:spAutoFit/>
+          </a:bodyPr>
+          <a:lstStyle/>
+          <a:p>
+            <a:r>
+              <a:rPr lang="en-US" sz="1400" dirty="0"/>
+              <a:t>2</a:t>
+            </a:r>
+          </a:p>
+        </p:txBody>
+      </p:sp>
+      <p:sp>
+        <p:nvSpPr>
+          <p:cNvPr id="22" name="TextBox 21">
+            <a:extLst>
+              <a:ext uri="{FF2B5EF4-FFF2-40B4-BE49-F238E27FC236}">
+                <a16:creationId xmlns:a16="http://schemas.microsoft.com/office/drawing/2014/main" id="{FCF9323F-4CE0-4E24-8045-90E485B685D5}"/>
+              </a:ext>
+            </a:extLst>
+          </p:cNvPr>
+          <p:cNvSpPr txBox="1"/>
+          <p:nvPr/>
+        </p:nvSpPr>
+        <p:spPr>
+          <a:xfrm>
+            <a:off x="2941219" y="3342378"/>
+            <a:ext cx="238549" cy="307777"/>
+          </a:xfrm>
+          <a:prstGeom prst="rect">
+            <a:avLst/>
+          </a:prstGeom>
+          <a:noFill/>
+        </p:spPr>
+        <p:txBody>
+          <a:bodyPr wrap="square" rtlCol="0">
+            <a:spAutoFit/>
+          </a:bodyPr>
+          <a:lstStyle/>
+          <a:p>
+            <a:r>
+              <a:rPr lang="en-US" sz="1400" dirty="0"/>
+              <a:t>1</a:t>
+            </a:r>
+          </a:p>
+        </p:txBody>
+      </p:sp>
+      <p:cxnSp>
+        <p:nvCxnSpPr>
+          <p:cNvPr id="25" name="Straight Connector 24">
+            <a:extLst>
+              <a:ext uri="{FF2B5EF4-FFF2-40B4-BE49-F238E27FC236}">
+                <a16:creationId xmlns:a16="http://schemas.microsoft.com/office/drawing/2014/main" id="{6DAB5C11-455F-480B-8605-8B94ECF23AC1}"/>
+              </a:ext>
+            </a:extLst>
+          </p:cNvPr>
+          <p:cNvCxnSpPr/>
+          <p:nvPr/>
+        </p:nvCxnSpPr>
+        <p:spPr>
+          <a:xfrm>
+            <a:off x="4336026" y="2642068"/>
+            <a:ext cx="0" cy="219119"/>
+          </a:xfrm>
+          <a:prstGeom prst="line">
+            <a:avLst/>
+          </a:prstGeom>
+          <a:ln w="6350">
+            <a:tailEnd type="arrow"/>
+          </a:ln>
+        </p:spPr>
+        <p:style>
+          <a:lnRef idx="1">
+            <a:schemeClr val="accent1"/>
+          </a:lnRef>
+          <a:fillRef idx="0">
+            <a:schemeClr val="accent1"/>
+          </a:fillRef>
+          <a:effectRef idx="0">
+            <a:schemeClr val="accent1"/>
+          </a:effectRef>
+          <a:fontRef idx="minor">
+            <a:schemeClr val="tx1"/>
+          </a:fontRef>
+        </p:style>
+      </p:cxnSp>
+      <p:cxnSp>
+        <p:nvCxnSpPr>
+          <p:cNvPr id="26" name="Straight Connector 25">
+            <a:extLst>
+              <a:ext uri="{FF2B5EF4-FFF2-40B4-BE49-F238E27FC236}">
+                <a16:creationId xmlns:a16="http://schemas.microsoft.com/office/drawing/2014/main" id="{A83D4107-47EB-49D8-949D-926AB081BA36}"/>
+              </a:ext>
+            </a:extLst>
+          </p:cNvPr>
+          <p:cNvCxnSpPr>
+            <a:cxnSpLocks/>
+          </p:cNvCxnSpPr>
+          <p:nvPr/>
+        </p:nvCxnSpPr>
+        <p:spPr>
+          <a:xfrm>
+            <a:off x="4336026" y="2861187"/>
+            <a:ext cx="0" cy="0"/>
+          </a:xfrm>
+          <a:prstGeom prst="line">
+            <a:avLst/>
+          </a:prstGeom>
+        </p:spPr>
+        <p:style>
+          <a:lnRef idx="1">
+            <a:schemeClr val="accent1"/>
+          </a:lnRef>
+          <a:fillRef idx="0">
+            <a:schemeClr val="accent1"/>
+          </a:fillRef>
+          <a:effectRef idx="0">
+            <a:schemeClr val="accent1"/>
+          </a:effectRef>
+          <a:fontRef idx="minor">
+            <a:schemeClr val="tx1"/>
+          </a:fontRef>
+        </p:style>
+      </p:cxnSp>
+      <p:cxnSp>
+        <p:nvCxnSpPr>
+          <p:cNvPr id="29" name="Straight Connector 28">
+            <a:extLst>
+              <a:ext uri="{FF2B5EF4-FFF2-40B4-BE49-F238E27FC236}">
+                <a16:creationId xmlns:a16="http://schemas.microsoft.com/office/drawing/2014/main" id="{F89ACF2C-769A-4079-9B04-94DF0D53385E}"/>
+              </a:ext>
+            </a:extLst>
+          </p:cNvPr>
+          <p:cNvCxnSpPr>
+            <a:cxnSpLocks/>
+          </p:cNvCxnSpPr>
+          <p:nvPr/>
+        </p:nvCxnSpPr>
+        <p:spPr>
+          <a:xfrm flipH="1">
+            <a:off x="4336026" y="2861187"/>
+            <a:ext cx="152400" cy="0"/>
+          </a:xfrm>
+          <a:prstGeom prst="line">
+            <a:avLst/>
+          </a:prstGeom>
+          <a:ln w="6350">
+            <a:headEnd type="arrow"/>
+            <a:tailEnd type="none"/>
+          </a:ln>
+        </p:spPr>
+        <p:style>
+          <a:lnRef idx="1">
+            <a:schemeClr val="accent1"/>
+          </a:lnRef>
+          <a:fillRef idx="0">
+            <a:schemeClr val="accent1"/>
+          </a:fillRef>
+          <a:effectRef idx="0">
+            <a:schemeClr val="accent1"/>
+          </a:effectRef>
+          <a:fontRef idx="minor">
+            <a:schemeClr val="tx1"/>
+          </a:fontRef>
+        </p:style>
+      </p:cxnSp>
+      <p:sp>
+        <p:nvSpPr>
+          <p:cNvPr id="33" name="TextBox 32">
+            <a:extLst>
+              <a:ext uri="{FF2B5EF4-FFF2-40B4-BE49-F238E27FC236}">
+                <a16:creationId xmlns:a16="http://schemas.microsoft.com/office/drawing/2014/main" id="{1507AE85-67D0-45D3-821A-0EA064ACF24E}"/>
+              </a:ext>
+            </a:extLst>
+          </p:cNvPr>
+          <p:cNvSpPr txBox="1"/>
+          <p:nvPr/>
+        </p:nvSpPr>
+        <p:spPr>
+          <a:xfrm>
+            <a:off x="5434447" y="1822136"/>
+            <a:ext cx="2632364" cy="584775"/>
+          </a:xfrm>
+          <a:prstGeom prst="rect">
+            <a:avLst/>
+          </a:prstGeom>
+          <a:noFill/>
+        </p:spPr>
+        <p:txBody>
+          <a:bodyPr wrap="square" rtlCol="0">
+            <a:spAutoFit/>
+          </a:bodyPr>
+          <a:lstStyle/>
+          <a:p>
+            <a:r>
+              <a:rPr lang="en-US" sz="1600" dirty="0"/>
+              <a:t>Shift is along t axis which is at right angle of reference line </a:t>
+            </a:r>
+          </a:p>
+        </p:txBody>
+      </p:sp>
+      <p:sp>
+        <p:nvSpPr>
+          <p:cNvPr id="34" name="TextBox 33">
+            <a:extLst>
+              <a:ext uri="{FF2B5EF4-FFF2-40B4-BE49-F238E27FC236}">
+                <a16:creationId xmlns:a16="http://schemas.microsoft.com/office/drawing/2014/main" id="{584E38C2-20D7-4D82-9D88-96488B2B6C87}"/>
+              </a:ext>
+            </a:extLst>
+          </p:cNvPr>
+          <p:cNvSpPr txBox="1"/>
+          <p:nvPr/>
+        </p:nvSpPr>
+        <p:spPr>
+          <a:xfrm>
+            <a:off x="3010465" y="4314957"/>
+            <a:ext cx="238549" cy="307777"/>
+          </a:xfrm>
+          <a:prstGeom prst="rect">
+            <a:avLst/>
+          </a:prstGeom>
+          <a:noFill/>
+        </p:spPr>
+        <p:txBody>
+          <a:bodyPr wrap="square" rtlCol="0">
+            <a:spAutoFit/>
+          </a:bodyPr>
+          <a:lstStyle/>
+          <a:p>
+            <a:r>
+              <a:rPr lang="en-US" sz="1400" dirty="0"/>
+              <a:t>x</a:t>
+            </a:r>
+          </a:p>
+        </p:txBody>
+      </p:sp>
+      <p:sp>
+        <p:nvSpPr>
+          <p:cNvPr id="35" name="TextBox 34">
+            <a:extLst>
+              <a:ext uri="{FF2B5EF4-FFF2-40B4-BE49-F238E27FC236}">
+                <a16:creationId xmlns:a16="http://schemas.microsoft.com/office/drawing/2014/main" id="{1C4E9CC2-EE76-4F6D-8B13-A2DEEE3F0795}"/>
+              </a:ext>
+            </a:extLst>
+          </p:cNvPr>
+          <p:cNvSpPr txBox="1"/>
+          <p:nvPr/>
+        </p:nvSpPr>
+        <p:spPr>
+          <a:xfrm>
+            <a:off x="1978301" y="3674779"/>
+            <a:ext cx="238549" cy="307777"/>
+          </a:xfrm>
+          <a:prstGeom prst="rect">
+            <a:avLst/>
+          </a:prstGeom>
+          <a:noFill/>
+        </p:spPr>
+        <p:txBody>
+          <a:bodyPr wrap="square" rtlCol="0">
+            <a:spAutoFit/>
+          </a:bodyPr>
+          <a:lstStyle/>
+          <a:p>
+            <a:r>
+              <a:rPr lang="en-US" sz="1400" dirty="0"/>
+              <a:t>y</a:t>
+            </a:r>
+          </a:p>
+        </p:txBody>
+      </p:sp>
+      <p:sp>
+        <p:nvSpPr>
+          <p:cNvPr id="36" name="TextBox 35">
+            <a:extLst>
+              <a:ext uri="{FF2B5EF4-FFF2-40B4-BE49-F238E27FC236}">
+                <a16:creationId xmlns:a16="http://schemas.microsoft.com/office/drawing/2014/main" id="{68F8555D-23D5-45E0-A628-168F27F29F19}"/>
+              </a:ext>
+            </a:extLst>
+          </p:cNvPr>
+          <p:cNvSpPr txBox="1"/>
+          <p:nvPr/>
+        </p:nvSpPr>
+        <p:spPr>
+          <a:xfrm>
+            <a:off x="3765000" y="2553410"/>
+            <a:ext cx="238549" cy="307777"/>
+          </a:xfrm>
+          <a:prstGeom prst="rect">
+            <a:avLst/>
+          </a:prstGeom>
+          <a:noFill/>
+        </p:spPr>
+        <p:txBody>
+          <a:bodyPr wrap="square" rtlCol="0">
+            <a:spAutoFit/>
+          </a:bodyPr>
+          <a:lstStyle/>
+          <a:p>
+            <a:r>
+              <a:rPr lang="en-US" sz="1400" dirty="0"/>
+              <a:t>s</a:t>
+            </a:r>
+          </a:p>
+        </p:txBody>
+      </p:sp>
+      <p:sp>
+        <p:nvSpPr>
+          <p:cNvPr id="37" name="TextBox 36">
+            <a:extLst>
+              <a:ext uri="{FF2B5EF4-FFF2-40B4-BE49-F238E27FC236}">
+                <a16:creationId xmlns:a16="http://schemas.microsoft.com/office/drawing/2014/main" id="{350B7ECD-A8E5-4857-AA1E-D41105AB951B}"/>
+              </a:ext>
+            </a:extLst>
+          </p:cNvPr>
+          <p:cNvSpPr txBox="1"/>
+          <p:nvPr/>
+        </p:nvSpPr>
+        <p:spPr>
+          <a:xfrm>
+            <a:off x="3098801" y="2597738"/>
+            <a:ext cx="238549" cy="307777"/>
+          </a:xfrm>
+          <a:prstGeom prst="rect">
+            <a:avLst/>
+          </a:prstGeom>
+          <a:noFill/>
+        </p:spPr>
+        <p:txBody>
+          <a:bodyPr wrap="square" rtlCol="0">
+            <a:spAutoFit/>
+          </a:bodyPr>
+          <a:lstStyle/>
+          <a:p>
+            <a:r>
+              <a:rPr lang="en-US" sz="1400" dirty="0"/>
+              <a:t>t</a:t>
+            </a:r>
+          </a:p>
+        </p:txBody>
+      </p:sp>
+    </p:spTree>
+    <p:extLst>
+      <p:ext uri="{BB962C8B-B14F-4D97-AF65-F5344CB8AC3E}">
+        <p14:creationId xmlns:p14="http://schemas.microsoft.com/office/powerpoint/2010/main" val="1910511198"/>
+      </p:ext>
+    </p:extLst>
+  </p:cSld>
+  <p:clrMapOvr>
+    <a:masterClrMapping/>
+  </p:clrMapOvr>
+</p:sld>
+</file>
+
+<file path=ppt/slides/slide25.xml><?xml version="1.0" encoding="utf-8"?>
+<p:sld xmlns:a="http://schemas.openxmlformats.org/drawingml/2006/main" xmlns:r="http://schemas.openxmlformats.org/officeDocument/2006/relationships" xmlns:p="http://schemas.openxmlformats.org/presentationml/2006/main">
+  <p:cSld>
+    <p:spTree>
+      <p:nvGrpSpPr>
+        <p:cNvPr id="1" name=""/>
+        <p:cNvGrpSpPr/>
+        <p:nvPr/>
+      </p:nvGrpSpPr>
+      <p:grpSpPr>
+        <a:xfrm>
+          <a:off x="0" y="0"/>
+          <a:ext cx="0" cy="0"/>
+          <a:chOff x="0" y="0"/>
+          <a:chExt cx="0" cy="0"/>
+        </a:xfrm>
+      </p:grpSpPr>
+      <p:sp>
+        <p:nvSpPr>
+          <p:cNvPr id="2" name="Title 1">
+            <a:extLst>
+              <a:ext uri="{FF2B5EF4-FFF2-40B4-BE49-F238E27FC236}">
+                <a16:creationId xmlns:a16="http://schemas.microsoft.com/office/drawing/2014/main" id="{2791E0EA-4A46-4163-AC92-82DEE8095540}"/>
+              </a:ext>
+            </a:extLst>
+          </p:cNvPr>
+          <p:cNvSpPr>
+            <a:spLocks noGrp="1"/>
+          </p:cNvSpPr>
+          <p:nvPr>
+            <p:ph type="title"/>
+          </p:nvPr>
+        </p:nvSpPr>
+        <p:spPr/>
+        <p:txBody>
+          <a:bodyPr/>
+          <a:lstStyle/>
+          <a:p>
+            <a:r>
+              <a:rPr lang="en-US" dirty="0"/>
+              <a:t>23 Adjust lane widths after linking</a:t>
+            </a:r>
+          </a:p>
+        </p:txBody>
+      </p:sp>
+      <p:sp>
+        <p:nvSpPr>
+          <p:cNvPr id="3" name="Content Placeholder 2">
+            <a:extLst>
+              <a:ext uri="{FF2B5EF4-FFF2-40B4-BE49-F238E27FC236}">
+                <a16:creationId xmlns:a16="http://schemas.microsoft.com/office/drawing/2014/main" id="{195EEC90-E63F-4471-B064-F02367184C6B}"/>
+              </a:ext>
+            </a:extLst>
+          </p:cNvPr>
+          <p:cNvSpPr>
+            <a:spLocks noGrp="1"/>
+          </p:cNvSpPr>
+          <p:nvPr>
+            <p:ph idx="1"/>
+          </p:nvPr>
+        </p:nvSpPr>
+        <p:spPr/>
+        <p:txBody>
+          <a:bodyPr/>
+          <a:lstStyle/>
+          <a:p>
+            <a:r>
+              <a:rPr lang="en-US" dirty="0"/>
+              <a:t>Adjust according to the predecessor and successor lane widths. May need to create new lane section</a:t>
+            </a:r>
+          </a:p>
+        </p:txBody>
+      </p:sp>
+    </p:spTree>
+    <p:extLst>
+      <p:ext uri="{BB962C8B-B14F-4D97-AF65-F5344CB8AC3E}">
+        <p14:creationId xmlns:p14="http://schemas.microsoft.com/office/powerpoint/2010/main" val="1785809369"/>
+      </p:ext>
+    </p:extLst>
+  </p:cSld>
+  <p:clrMapOvr>
+    <a:masterClrMapping/>
+  </p:clrMapOvr>
+</p:sld>
+</file>
+
+<file path=ppt/slides/slide26.xml><?xml version="1.0" encoding="utf-8"?>
+<p:sld xmlns:a="http://schemas.openxmlformats.org/drawingml/2006/main" xmlns:r="http://schemas.openxmlformats.org/officeDocument/2006/relationships" xmlns:p="http://schemas.openxmlformats.org/presentationml/2006/main">
+  <p:cSld>
+    <p:spTree>
+      <p:nvGrpSpPr>
+        <p:cNvPr id="1" name=""/>
+        <p:cNvGrpSpPr/>
+        <p:nvPr/>
+      </p:nvGrpSpPr>
+      <p:grpSpPr>
+        <a:xfrm>
+          <a:off x="0" y="0"/>
+          <a:ext cx="0" cy="0"/>
+          <a:chOff x="0" y="0"/>
+          <a:chExt cx="0" cy="0"/>
+        </a:xfrm>
+      </p:grpSpPr>
+      <p:sp>
+        <p:nvSpPr>
+          <p:cNvPr id="2" name="Title 1">
+            <a:extLst>
+              <a:ext uri="{FF2B5EF4-FFF2-40B4-BE49-F238E27FC236}">
+                <a16:creationId xmlns:a16="http://schemas.microsoft.com/office/drawing/2014/main" id="{A3E06FF0-394C-48EF-A9B4-1291441385BD}"/>
+              </a:ext>
+            </a:extLst>
+          </p:cNvPr>
+          <p:cNvSpPr>
+            <a:spLocks noGrp="1"/>
+          </p:cNvSpPr>
+          <p:nvPr>
+            <p:ph type="title"/>
+          </p:nvPr>
+        </p:nvSpPr>
+        <p:spPr/>
+        <p:txBody>
+          <a:bodyPr/>
+          <a:lstStyle/>
+          <a:p>
+            <a:r>
+              <a:rPr lang="en-US" dirty="0"/>
+              <a:t>24. Lane Linkage possibilities</a:t>
+            </a:r>
+          </a:p>
+        </p:txBody>
+      </p:sp>
+      <p:grpSp>
+        <p:nvGrpSpPr>
+          <p:cNvPr id="11" name="Group 10">
+            <a:extLst>
+              <a:ext uri="{FF2B5EF4-FFF2-40B4-BE49-F238E27FC236}">
+                <a16:creationId xmlns:a16="http://schemas.microsoft.com/office/drawing/2014/main" id="{DD5A1653-3DE3-41A1-958E-2C0A1BA7FFE6}"/>
+              </a:ext>
+            </a:extLst>
+          </p:cNvPr>
+          <p:cNvGrpSpPr/>
+          <p:nvPr/>
+        </p:nvGrpSpPr>
+        <p:grpSpPr>
+          <a:xfrm>
+            <a:off x="1174487" y="4186084"/>
+            <a:ext cx="2540937" cy="654548"/>
+            <a:chOff x="1150374" y="4175900"/>
+            <a:chExt cx="2540937" cy="654548"/>
+          </a:xfrm>
+        </p:grpSpPr>
+        <p:cxnSp>
+          <p:nvCxnSpPr>
+            <p:cNvPr id="5" name="Straight Connector 4">
+              <a:extLst>
+                <a:ext uri="{FF2B5EF4-FFF2-40B4-BE49-F238E27FC236}">
+                  <a16:creationId xmlns:a16="http://schemas.microsoft.com/office/drawing/2014/main" id="{946DE291-32D6-42EA-806A-9BE5BB29455C}"/>
+                </a:ext>
+              </a:extLst>
+            </p:cNvPr>
+            <p:cNvCxnSpPr/>
+            <p:nvPr/>
+          </p:nvCxnSpPr>
+          <p:spPr>
+            <a:xfrm>
+              <a:off x="1150374" y="4175900"/>
+              <a:ext cx="2532509" cy="0"/>
+            </a:xfrm>
+            <a:prstGeom prst="line">
+              <a:avLst/>
+            </a:prstGeom>
+            <a:ln>
+              <a:solidFill>
+                <a:schemeClr val="accent2"/>
+              </a:solidFill>
+            </a:ln>
+          </p:spPr>
+          <p:style>
+            <a:lnRef idx="3">
+              <a:schemeClr val="dk1"/>
+            </a:lnRef>
+            <a:fillRef idx="0">
+              <a:schemeClr val="dk1"/>
+            </a:fillRef>
+            <a:effectRef idx="2">
+              <a:schemeClr val="dk1"/>
+            </a:effectRef>
+            <a:fontRef idx="minor">
+              <a:schemeClr val="tx1"/>
+            </a:fontRef>
+          </p:style>
+        </p:cxnSp>
+        <p:cxnSp>
+          <p:nvCxnSpPr>
+            <p:cNvPr id="7" name="Straight Connector 6">
+              <a:extLst>
+                <a:ext uri="{FF2B5EF4-FFF2-40B4-BE49-F238E27FC236}">
+                  <a16:creationId xmlns:a16="http://schemas.microsoft.com/office/drawing/2014/main" id="{B1A2971D-787F-4E11-8E4C-33713BF844C6}"/>
+                </a:ext>
+              </a:extLst>
+            </p:cNvPr>
+            <p:cNvCxnSpPr/>
+            <p:nvPr/>
+          </p:nvCxnSpPr>
+          <p:spPr>
+            <a:xfrm>
+              <a:off x="1154588" y="4403447"/>
+              <a:ext cx="2536723" cy="0"/>
+            </a:xfrm>
+            <a:prstGeom prst="line">
+              <a:avLst/>
+            </a:prstGeom>
+          </p:spPr>
+          <p:style>
+            <a:lnRef idx="1">
+              <a:schemeClr val="accent1"/>
+            </a:lnRef>
+            <a:fillRef idx="0">
+              <a:schemeClr val="accent1"/>
+            </a:fillRef>
+            <a:effectRef idx="0">
+              <a:schemeClr val="accent1"/>
+            </a:effectRef>
+            <a:fontRef idx="minor">
+              <a:schemeClr val="tx1"/>
+            </a:fontRef>
+          </p:style>
+        </p:cxnSp>
+        <p:cxnSp>
+          <p:nvCxnSpPr>
+            <p:cNvPr id="8" name="Straight Connector 7">
+              <a:extLst>
+                <a:ext uri="{FF2B5EF4-FFF2-40B4-BE49-F238E27FC236}">
+                  <a16:creationId xmlns:a16="http://schemas.microsoft.com/office/drawing/2014/main" id="{BDF295A4-E426-41EE-8660-346F277ACE95}"/>
+                </a:ext>
+              </a:extLst>
+            </p:cNvPr>
+            <p:cNvCxnSpPr/>
+            <p:nvPr/>
+          </p:nvCxnSpPr>
+          <p:spPr>
+            <a:xfrm>
+              <a:off x="1154588" y="4619054"/>
+              <a:ext cx="2536723" cy="0"/>
+            </a:xfrm>
+            <a:prstGeom prst="line">
+              <a:avLst/>
+            </a:prstGeom>
+          </p:spPr>
+          <p:style>
+            <a:lnRef idx="1">
+              <a:schemeClr val="accent1"/>
+            </a:lnRef>
+            <a:fillRef idx="0">
+              <a:schemeClr val="accent1"/>
+            </a:fillRef>
+            <a:effectRef idx="0">
+              <a:schemeClr val="accent1"/>
+            </a:effectRef>
+            <a:fontRef idx="minor">
+              <a:schemeClr val="tx1"/>
+            </a:fontRef>
+          </p:style>
+        </p:cxnSp>
+        <p:cxnSp>
+          <p:nvCxnSpPr>
+            <p:cNvPr id="9" name="Straight Connector 8">
+              <a:extLst>
+                <a:ext uri="{FF2B5EF4-FFF2-40B4-BE49-F238E27FC236}">
+                  <a16:creationId xmlns:a16="http://schemas.microsoft.com/office/drawing/2014/main" id="{B4BFB70E-23B9-4B61-A4DB-B5B32F5B66C6}"/>
+                </a:ext>
+              </a:extLst>
+            </p:cNvPr>
+            <p:cNvCxnSpPr/>
+            <p:nvPr/>
+          </p:nvCxnSpPr>
+          <p:spPr>
+            <a:xfrm>
+              <a:off x="1154588" y="4830448"/>
+              <a:ext cx="2536723" cy="0"/>
+            </a:xfrm>
+            <a:prstGeom prst="line">
+              <a:avLst/>
+            </a:prstGeom>
+          </p:spPr>
+          <p:style>
+            <a:lnRef idx="1">
+              <a:schemeClr val="accent1"/>
+            </a:lnRef>
+            <a:fillRef idx="0">
+              <a:schemeClr val="accent1"/>
+            </a:fillRef>
+            <a:effectRef idx="0">
+              <a:schemeClr val="accent1"/>
+            </a:effectRef>
+            <a:fontRef idx="minor">
+              <a:schemeClr val="tx1"/>
+            </a:fontRef>
+          </p:style>
+        </p:cxnSp>
+      </p:grpSp>
+      <p:cxnSp>
+        <p:nvCxnSpPr>
+          <p:cNvPr id="13" name="Straight Connector 12">
+            <a:extLst>
+              <a:ext uri="{FF2B5EF4-FFF2-40B4-BE49-F238E27FC236}">
+                <a16:creationId xmlns:a16="http://schemas.microsoft.com/office/drawing/2014/main" id="{A3E9CCD6-D15C-4809-916A-7D156E9C6EA7}"/>
+              </a:ext>
+            </a:extLst>
+          </p:cNvPr>
+          <p:cNvCxnSpPr/>
+          <p:nvPr/>
+        </p:nvCxnSpPr>
+        <p:spPr>
+          <a:xfrm rot="16200000">
+            <a:off x="3686114" y="2667156"/>
+            <a:ext cx="912152" cy="0"/>
+          </a:xfrm>
+          <a:prstGeom prst="line">
+            <a:avLst/>
+          </a:prstGeom>
+          <a:ln>
+            <a:solidFill>
+              <a:schemeClr val="accent2"/>
+            </a:solidFill>
+          </a:ln>
+        </p:spPr>
+        <p:style>
+          <a:lnRef idx="3">
+            <a:schemeClr val="dk1"/>
+          </a:lnRef>
+          <a:fillRef idx="0">
+            <a:schemeClr val="dk1"/>
+          </a:fillRef>
+          <a:effectRef idx="2">
+            <a:schemeClr val="dk1"/>
+          </a:effectRef>
+          <a:fontRef idx="minor">
+            <a:schemeClr val="tx1"/>
+          </a:fontRef>
+        </p:style>
+      </p:cxnSp>
+      <p:cxnSp>
+        <p:nvCxnSpPr>
+          <p:cNvPr id="14" name="Straight Connector 13">
+            <a:extLst>
+              <a:ext uri="{FF2B5EF4-FFF2-40B4-BE49-F238E27FC236}">
+                <a16:creationId xmlns:a16="http://schemas.microsoft.com/office/drawing/2014/main" id="{3A5B0293-5107-49AB-9408-1E2EB182CD3A}"/>
+              </a:ext>
+            </a:extLst>
+          </p:cNvPr>
+          <p:cNvCxnSpPr/>
+          <p:nvPr/>
+        </p:nvCxnSpPr>
+        <p:spPr>
+          <a:xfrm rot="16200000">
+            <a:off x="3912902" y="2664879"/>
+            <a:ext cx="913670" cy="0"/>
+          </a:xfrm>
+          <a:prstGeom prst="line">
+            <a:avLst/>
+          </a:prstGeom>
+        </p:spPr>
+        <p:style>
+          <a:lnRef idx="1">
+            <a:schemeClr val="accent1"/>
+          </a:lnRef>
+          <a:fillRef idx="0">
+            <a:schemeClr val="accent1"/>
+          </a:fillRef>
+          <a:effectRef idx="0">
+            <a:schemeClr val="accent1"/>
+          </a:effectRef>
+          <a:fontRef idx="minor">
+            <a:schemeClr val="tx1"/>
+          </a:fontRef>
+        </p:style>
+      </p:cxnSp>
+      <p:cxnSp>
+        <p:nvCxnSpPr>
+          <p:cNvPr id="15" name="Straight Connector 14">
+            <a:extLst>
+              <a:ext uri="{FF2B5EF4-FFF2-40B4-BE49-F238E27FC236}">
+                <a16:creationId xmlns:a16="http://schemas.microsoft.com/office/drawing/2014/main" id="{47290318-497F-433C-95B4-516FF0E11E60}"/>
+              </a:ext>
+            </a:extLst>
+          </p:cNvPr>
+          <p:cNvCxnSpPr/>
+          <p:nvPr/>
+        </p:nvCxnSpPr>
+        <p:spPr>
+          <a:xfrm rot="16200000">
+            <a:off x="4128509" y="2664879"/>
+            <a:ext cx="913670" cy="0"/>
+          </a:xfrm>
+          <a:prstGeom prst="line">
+            <a:avLst/>
+          </a:prstGeom>
+        </p:spPr>
+        <p:style>
+          <a:lnRef idx="1">
+            <a:schemeClr val="accent1"/>
+          </a:lnRef>
+          <a:fillRef idx="0">
+            <a:schemeClr val="accent1"/>
+          </a:fillRef>
+          <a:effectRef idx="0">
+            <a:schemeClr val="accent1"/>
+          </a:effectRef>
+          <a:fontRef idx="minor">
+            <a:schemeClr val="tx1"/>
+          </a:fontRef>
+        </p:style>
+      </p:cxnSp>
+      <p:cxnSp>
+        <p:nvCxnSpPr>
+          <p:cNvPr id="28" name="Straight Connector 27">
+            <a:extLst>
+              <a:ext uri="{FF2B5EF4-FFF2-40B4-BE49-F238E27FC236}">
+                <a16:creationId xmlns:a16="http://schemas.microsoft.com/office/drawing/2014/main" id="{CDB4BCD3-9057-47F2-8E66-1039E9D7A2DF}"/>
+              </a:ext>
+            </a:extLst>
+          </p:cNvPr>
+          <p:cNvCxnSpPr/>
+          <p:nvPr/>
+        </p:nvCxnSpPr>
+        <p:spPr>
+          <a:xfrm rot="16200000">
+            <a:off x="4575975" y="5774094"/>
+            <a:ext cx="593506" cy="0"/>
+          </a:xfrm>
+          <a:prstGeom prst="line">
+            <a:avLst/>
+          </a:prstGeom>
+          <a:ln>
+            <a:solidFill>
+              <a:schemeClr val="accent2"/>
+            </a:solidFill>
+          </a:ln>
+        </p:spPr>
+        <p:style>
+          <a:lnRef idx="3">
+            <a:schemeClr val="dk1"/>
+          </a:lnRef>
+          <a:fillRef idx="0">
+            <a:schemeClr val="dk1"/>
+          </a:fillRef>
+          <a:effectRef idx="2">
+            <a:schemeClr val="dk1"/>
+          </a:effectRef>
+          <a:fontRef idx="minor">
+            <a:schemeClr val="tx1"/>
+          </a:fontRef>
+        </p:style>
+      </p:cxnSp>
+      <p:cxnSp>
+        <p:nvCxnSpPr>
+          <p:cNvPr id="29" name="Straight Connector 28">
+            <a:extLst>
+              <a:ext uri="{FF2B5EF4-FFF2-40B4-BE49-F238E27FC236}">
+                <a16:creationId xmlns:a16="http://schemas.microsoft.com/office/drawing/2014/main" id="{FE1EDE5D-4498-4B14-AE1C-B1B54207ADFD}"/>
+              </a:ext>
+            </a:extLst>
+          </p:cNvPr>
+          <p:cNvCxnSpPr/>
+          <p:nvPr/>
+        </p:nvCxnSpPr>
+        <p:spPr>
+          <a:xfrm rot="16200000">
+            <a:off x="4324339" y="5774588"/>
+            <a:ext cx="594493" cy="0"/>
+          </a:xfrm>
+          <a:prstGeom prst="line">
+            <a:avLst/>
+          </a:prstGeom>
+        </p:spPr>
+        <p:style>
+          <a:lnRef idx="1">
+            <a:schemeClr val="accent1"/>
+          </a:lnRef>
+          <a:fillRef idx="0">
+            <a:schemeClr val="accent1"/>
+          </a:fillRef>
+          <a:effectRef idx="0">
+            <a:schemeClr val="accent1"/>
+          </a:effectRef>
+          <a:fontRef idx="minor">
+            <a:schemeClr val="tx1"/>
+          </a:fontRef>
+        </p:style>
+      </p:cxnSp>
+      <p:sp>
+        <p:nvSpPr>
+          <p:cNvPr id="35" name="Freeform: Shape 34">
+            <a:extLst>
+              <a:ext uri="{FF2B5EF4-FFF2-40B4-BE49-F238E27FC236}">
+                <a16:creationId xmlns:a16="http://schemas.microsoft.com/office/drawing/2014/main" id="{6FB1AF89-C306-47D4-921C-09F456FC6F4C}"/>
+              </a:ext>
+            </a:extLst>
+          </p:cNvPr>
+          <p:cNvSpPr/>
+          <p:nvPr/>
+        </p:nvSpPr>
+        <p:spPr>
+          <a:xfrm>
+            <a:off x="3729235" y="3173010"/>
+            <a:ext cx="600706" cy="1095595"/>
+          </a:xfrm>
+          <a:custGeom>
+            <a:avLst/>
+            <a:gdLst>
+              <a:gd name="connsiteX0" fmla="*/ 0 w 600706"/>
+              <a:gd name="connsiteY0" fmla="*/ 1095595 h 1095595"/>
+              <a:gd name="connsiteX1" fmla="*/ 560439 w 600706"/>
+              <a:gd name="connsiteY1" fmla="*/ 712137 h 1095595"/>
+              <a:gd name="connsiteX2" fmla="*/ 535156 w 600706"/>
+              <a:gd name="connsiteY2" fmla="*/ 0 h 1095595"/>
+            </a:gdLst>
+            <a:ahLst/>
+            <a:cxnLst>
+              <a:cxn ang="0">
+                <a:pos x="connsiteX0" y="connsiteY0"/>
+              </a:cxn>
+              <a:cxn ang="0">
+                <a:pos x="connsiteX1" y="connsiteY1"/>
+              </a:cxn>
+              <a:cxn ang="0">
+                <a:pos x="connsiteX2" y="connsiteY2"/>
+              </a:cxn>
+            </a:cxnLst>
+            <a:rect l="l" t="t" r="r" b="b"/>
+            <a:pathLst>
+              <a:path w="600706" h="1095595">
+                <a:moveTo>
+                  <a:pt x="0" y="1095595"/>
+                </a:moveTo>
+                <a:cubicBezTo>
+                  <a:pt x="235623" y="995165"/>
+                  <a:pt x="471246" y="894736"/>
+                  <a:pt x="560439" y="712137"/>
+                </a:cubicBezTo>
+                <a:cubicBezTo>
+                  <a:pt x="649632" y="529538"/>
+                  <a:pt x="567462" y="110964"/>
+                  <a:pt x="535156" y="0"/>
+                </a:cubicBezTo>
+              </a:path>
+            </a:pathLst>
+          </a:custGeom>
+          <a:noFill/>
+          <a:ln>
+            <a:solidFill>
+              <a:schemeClr val="bg1">
+                <a:lumMod val="50000"/>
+              </a:schemeClr>
+            </a:solidFill>
+            <a:tailEnd type="triangle"/>
+          </a:ln>
+        </p:spPr>
+        <p:style>
+          <a:lnRef idx="2">
+            <a:schemeClr val="accent1">
+              <a:shade val="50000"/>
+            </a:schemeClr>
+          </a:lnRef>
+          <a:fillRef idx="1">
+            <a:schemeClr val="accent1"/>
+          </a:fillRef>
+          <a:effectRef idx="0">
+            <a:schemeClr val="accent1"/>
+          </a:effectRef>
+          <a:fontRef idx="minor">
+            <a:schemeClr val="lt1"/>
+          </a:fontRef>
+        </p:style>
+        <p:txBody>
+          <a:bodyPr rtlCol="0" anchor="ctr"/>
+          <a:lstStyle/>
+          <a:p>
+            <a:pPr algn="ctr"/>
+            <a:endParaRPr lang="en-US"/>
+          </a:p>
+        </p:txBody>
+      </p:sp>
+      <p:sp>
+        <p:nvSpPr>
+          <p:cNvPr id="36" name="Freeform: Shape 35">
+            <a:extLst>
+              <a:ext uri="{FF2B5EF4-FFF2-40B4-BE49-F238E27FC236}">
+                <a16:creationId xmlns:a16="http://schemas.microsoft.com/office/drawing/2014/main" id="{48A227CE-EB57-4CA1-AAC1-DEB5B418B3B4}"/>
+              </a:ext>
+            </a:extLst>
+          </p:cNvPr>
+          <p:cNvSpPr/>
+          <p:nvPr/>
+        </p:nvSpPr>
+        <p:spPr>
+          <a:xfrm>
+            <a:off x="3940628" y="3121714"/>
+            <a:ext cx="600706" cy="1095595"/>
+          </a:xfrm>
+          <a:custGeom>
+            <a:avLst/>
+            <a:gdLst>
+              <a:gd name="connsiteX0" fmla="*/ 0 w 600706"/>
+              <a:gd name="connsiteY0" fmla="*/ 1095595 h 1095595"/>
+              <a:gd name="connsiteX1" fmla="*/ 560439 w 600706"/>
+              <a:gd name="connsiteY1" fmla="*/ 712137 h 1095595"/>
+              <a:gd name="connsiteX2" fmla="*/ 535156 w 600706"/>
+              <a:gd name="connsiteY2" fmla="*/ 0 h 1095595"/>
+            </a:gdLst>
+            <a:ahLst/>
+            <a:cxnLst>
+              <a:cxn ang="0">
+                <a:pos x="connsiteX0" y="connsiteY0"/>
+              </a:cxn>
+              <a:cxn ang="0">
+                <a:pos x="connsiteX1" y="connsiteY1"/>
+              </a:cxn>
+              <a:cxn ang="0">
+                <a:pos x="connsiteX2" y="connsiteY2"/>
+              </a:cxn>
+            </a:cxnLst>
+            <a:rect l="l" t="t" r="r" b="b"/>
+            <a:pathLst>
+              <a:path w="600706" h="1095595">
+                <a:moveTo>
+                  <a:pt x="0" y="1095595"/>
+                </a:moveTo>
+                <a:cubicBezTo>
+                  <a:pt x="235623" y="995165"/>
+                  <a:pt x="471246" y="894736"/>
+                  <a:pt x="560439" y="712137"/>
+                </a:cubicBezTo>
+                <a:cubicBezTo>
+                  <a:pt x="649632" y="529538"/>
+                  <a:pt x="567462" y="110964"/>
+                  <a:pt x="535156" y="0"/>
+                </a:cubicBezTo>
+              </a:path>
+            </a:pathLst>
+          </a:custGeom>
+          <a:noFill/>
+          <a:ln>
+            <a:solidFill>
+              <a:schemeClr val="bg1">
+                <a:lumMod val="50000"/>
+              </a:schemeClr>
+            </a:solidFill>
+            <a:tailEnd type="triangle"/>
+          </a:ln>
+        </p:spPr>
+        <p:style>
+          <a:lnRef idx="2">
+            <a:schemeClr val="accent1">
+              <a:shade val="50000"/>
+            </a:schemeClr>
+          </a:lnRef>
+          <a:fillRef idx="1">
+            <a:schemeClr val="accent1"/>
+          </a:fillRef>
+          <a:effectRef idx="0">
+            <a:schemeClr val="accent1"/>
+          </a:effectRef>
+          <a:fontRef idx="minor">
+            <a:schemeClr val="lt1"/>
+          </a:fontRef>
+        </p:style>
+        <p:txBody>
+          <a:bodyPr rtlCol="0" anchor="ctr"/>
+          <a:lstStyle/>
+          <a:p>
+            <a:pPr algn="ctr"/>
+            <a:endParaRPr lang="en-US"/>
+          </a:p>
+        </p:txBody>
+      </p:sp>
+      <p:cxnSp>
+        <p:nvCxnSpPr>
+          <p:cNvPr id="39" name="Straight Arrow Connector 38">
+            <a:extLst>
+              <a:ext uri="{FF2B5EF4-FFF2-40B4-BE49-F238E27FC236}">
+                <a16:creationId xmlns:a16="http://schemas.microsoft.com/office/drawing/2014/main" id="{2E33A6ED-39C5-47B5-B35F-028874A5BFDA}"/>
+              </a:ext>
+            </a:extLst>
+          </p:cNvPr>
+          <p:cNvCxnSpPr>
+            <a:cxnSpLocks/>
+          </p:cNvCxnSpPr>
+          <p:nvPr/>
+        </p:nvCxnSpPr>
+        <p:spPr>
+          <a:xfrm flipV="1">
+            <a:off x="3729235" y="3961495"/>
+            <a:ext cx="2003049" cy="507267"/>
+          </a:xfrm>
+          <a:prstGeom prst="straightConnector1">
+            <a:avLst/>
+          </a:prstGeom>
+          <a:ln w="12700">
+            <a:solidFill>
+              <a:srgbClr val="7030A0"/>
+            </a:solidFill>
+            <a:tailEnd type="triangle"/>
+          </a:ln>
+        </p:spPr>
+        <p:style>
+          <a:lnRef idx="1">
+            <a:schemeClr val="accent1"/>
+          </a:lnRef>
+          <a:fillRef idx="0">
+            <a:schemeClr val="accent1"/>
+          </a:fillRef>
+          <a:effectRef idx="0">
+            <a:schemeClr val="accent1"/>
+          </a:effectRef>
+          <a:fontRef idx="minor">
+            <a:schemeClr val="tx1"/>
+          </a:fontRef>
+        </p:style>
+      </p:cxnSp>
+      <p:cxnSp>
+        <p:nvCxnSpPr>
+          <p:cNvPr id="40" name="Straight Arrow Connector 39">
+            <a:extLst>
+              <a:ext uri="{FF2B5EF4-FFF2-40B4-BE49-F238E27FC236}">
+                <a16:creationId xmlns:a16="http://schemas.microsoft.com/office/drawing/2014/main" id="{59CF3107-9365-478D-A1AA-9C58ABC3DFF7}"/>
+              </a:ext>
+            </a:extLst>
+          </p:cNvPr>
+          <p:cNvCxnSpPr>
+            <a:cxnSpLocks/>
+          </p:cNvCxnSpPr>
+          <p:nvPr/>
+        </p:nvCxnSpPr>
+        <p:spPr>
+          <a:xfrm flipV="1">
+            <a:off x="3759434" y="4186084"/>
+            <a:ext cx="2009292" cy="282677"/>
+          </a:xfrm>
+          <a:prstGeom prst="straightConnector1">
+            <a:avLst/>
+          </a:prstGeom>
+          <a:ln w="12700">
+            <a:solidFill>
+              <a:srgbClr val="7030A0"/>
+            </a:solidFill>
+            <a:tailEnd type="triangle"/>
+          </a:ln>
+        </p:spPr>
+        <p:style>
+          <a:lnRef idx="1">
+            <a:schemeClr val="accent1"/>
+          </a:lnRef>
+          <a:fillRef idx="0">
+            <a:schemeClr val="accent1"/>
+          </a:fillRef>
+          <a:effectRef idx="0">
+            <a:schemeClr val="accent1"/>
+          </a:effectRef>
+          <a:fontRef idx="minor">
+            <a:schemeClr val="tx1"/>
+          </a:fontRef>
+        </p:style>
+      </p:cxnSp>
+      <p:cxnSp>
+        <p:nvCxnSpPr>
+          <p:cNvPr id="43" name="Straight Arrow Connector 42">
+            <a:extLst>
+              <a:ext uri="{FF2B5EF4-FFF2-40B4-BE49-F238E27FC236}">
+                <a16:creationId xmlns:a16="http://schemas.microsoft.com/office/drawing/2014/main" id="{1ED61D8D-DEF6-4CD4-97E1-C7CD3B2CC5D8}"/>
+              </a:ext>
+            </a:extLst>
+          </p:cNvPr>
+          <p:cNvCxnSpPr>
+            <a:cxnSpLocks/>
+          </p:cNvCxnSpPr>
+          <p:nvPr/>
+        </p:nvCxnSpPr>
+        <p:spPr>
+          <a:xfrm flipV="1">
+            <a:off x="3699036" y="4403244"/>
+            <a:ext cx="2069690" cy="315889"/>
+          </a:xfrm>
+          <a:prstGeom prst="straightConnector1">
+            <a:avLst/>
+          </a:prstGeom>
+          <a:ln w="12700">
+            <a:solidFill>
+              <a:schemeClr val="accent6"/>
+            </a:solidFill>
+            <a:tailEnd type="triangle"/>
+          </a:ln>
+        </p:spPr>
+        <p:style>
+          <a:lnRef idx="1">
+            <a:schemeClr val="accent1"/>
+          </a:lnRef>
+          <a:fillRef idx="0">
+            <a:schemeClr val="accent1"/>
+          </a:fillRef>
+          <a:effectRef idx="0">
+            <a:schemeClr val="accent1"/>
+          </a:effectRef>
+          <a:fontRef idx="minor">
+            <a:schemeClr val="tx1"/>
+          </a:fontRef>
+        </p:style>
+      </p:cxnSp>
+      <p:sp>
+        <p:nvSpPr>
+          <p:cNvPr id="46" name="Freeform: Shape 45">
+            <a:extLst>
+              <a:ext uri="{FF2B5EF4-FFF2-40B4-BE49-F238E27FC236}">
+                <a16:creationId xmlns:a16="http://schemas.microsoft.com/office/drawing/2014/main" id="{0AA0DF29-359E-4F36-92E8-4C584E5FF0A8}"/>
+              </a:ext>
+            </a:extLst>
+          </p:cNvPr>
+          <p:cNvSpPr/>
+          <p:nvPr/>
+        </p:nvSpPr>
+        <p:spPr>
+          <a:xfrm>
+            <a:off x="3712380" y="4740553"/>
+            <a:ext cx="1002890" cy="741633"/>
+          </a:xfrm>
+          <a:custGeom>
+            <a:avLst/>
+            <a:gdLst>
+              <a:gd name="connsiteX0" fmla="*/ 0 w 1002890"/>
+              <a:gd name="connsiteY0" fmla="*/ 0 h 741633"/>
+              <a:gd name="connsiteX1" fmla="*/ 699495 w 1002890"/>
+              <a:gd name="connsiteY1" fmla="*/ 185408 h 741633"/>
+              <a:gd name="connsiteX2" fmla="*/ 1002890 w 1002890"/>
+              <a:gd name="connsiteY2" fmla="*/ 741633 h 741633"/>
+            </a:gdLst>
+            <a:ahLst/>
+            <a:cxnLst>
+              <a:cxn ang="0">
+                <a:pos x="connsiteX0" y="connsiteY0"/>
+              </a:cxn>
+              <a:cxn ang="0">
+                <a:pos x="connsiteX1" y="connsiteY1"/>
+              </a:cxn>
+              <a:cxn ang="0">
+                <a:pos x="connsiteX2" y="connsiteY2"/>
+              </a:cxn>
+            </a:cxnLst>
+            <a:rect l="l" t="t" r="r" b="b"/>
+            <a:pathLst>
+              <a:path w="1002890" h="741633">
+                <a:moveTo>
+                  <a:pt x="0" y="0"/>
+                </a:moveTo>
+                <a:cubicBezTo>
+                  <a:pt x="266173" y="30901"/>
+                  <a:pt x="532347" y="61803"/>
+                  <a:pt x="699495" y="185408"/>
+                </a:cubicBezTo>
+                <a:cubicBezTo>
+                  <a:pt x="866643" y="309013"/>
+                  <a:pt x="938980" y="651036"/>
+                  <a:pt x="1002890" y="741633"/>
+                </a:cubicBezTo>
+              </a:path>
+            </a:pathLst>
+          </a:custGeom>
+          <a:noFill/>
+          <a:ln>
+            <a:solidFill>
+              <a:schemeClr val="accent6"/>
+            </a:solidFill>
+            <a:tailEnd type="triangle"/>
+          </a:ln>
+        </p:spPr>
+        <p:style>
+          <a:lnRef idx="2">
+            <a:schemeClr val="accent1">
+              <a:shade val="50000"/>
+            </a:schemeClr>
+          </a:lnRef>
+          <a:fillRef idx="1">
+            <a:schemeClr val="accent1"/>
+          </a:fillRef>
+          <a:effectRef idx="0">
+            <a:schemeClr val="accent1"/>
+          </a:effectRef>
+          <a:fontRef idx="minor">
+            <a:schemeClr val="lt1"/>
+          </a:fontRef>
+        </p:style>
+        <p:txBody>
+          <a:bodyPr rtlCol="0" anchor="ctr"/>
+          <a:lstStyle/>
+          <a:p>
+            <a:pPr algn="ctr"/>
+            <a:endParaRPr lang="en-US"/>
+          </a:p>
+        </p:txBody>
+      </p:sp>
+      <p:sp>
+        <p:nvSpPr>
+          <p:cNvPr id="51" name="TextBox 50">
+            <a:extLst>
+              <a:ext uri="{FF2B5EF4-FFF2-40B4-BE49-F238E27FC236}">
+                <a16:creationId xmlns:a16="http://schemas.microsoft.com/office/drawing/2014/main" id="{D85485B4-D23E-41F7-8496-4B0231FDF63E}"/>
+              </a:ext>
+            </a:extLst>
+          </p:cNvPr>
+          <p:cNvSpPr txBox="1"/>
+          <p:nvPr/>
+        </p:nvSpPr>
+        <p:spPr>
+          <a:xfrm>
+            <a:off x="3228069" y="4151772"/>
+            <a:ext cx="516922" cy="738664"/>
+          </a:xfrm>
+          <a:prstGeom prst="rect">
+            <a:avLst/>
+          </a:prstGeom>
+          <a:noFill/>
+        </p:spPr>
+        <p:txBody>
+          <a:bodyPr wrap="square" rtlCol="0">
+            <a:spAutoFit/>
+          </a:bodyPr>
+          <a:lstStyle/>
+          <a:p>
+            <a:r>
+              <a:rPr lang="en-US" sz="1400" dirty="0"/>
+              <a:t>-1</a:t>
+            </a:r>
+          </a:p>
+          <a:p>
+            <a:r>
+              <a:rPr lang="en-US" sz="1400" dirty="0"/>
+              <a:t>-2</a:t>
+            </a:r>
+          </a:p>
+          <a:p>
+            <a:r>
+              <a:rPr lang="en-US" sz="1400" dirty="0"/>
+              <a:t>-3</a:t>
+            </a:r>
+          </a:p>
+        </p:txBody>
+      </p:sp>
+      <p:sp>
+        <p:nvSpPr>
+          <p:cNvPr id="53" name="TextBox 52">
+            <a:extLst>
+              <a:ext uri="{FF2B5EF4-FFF2-40B4-BE49-F238E27FC236}">
+                <a16:creationId xmlns:a16="http://schemas.microsoft.com/office/drawing/2014/main" id="{497DCDEC-E618-459C-982E-CB1963047155}"/>
+              </a:ext>
+            </a:extLst>
+          </p:cNvPr>
+          <p:cNvSpPr txBox="1"/>
+          <p:nvPr/>
+        </p:nvSpPr>
+        <p:spPr>
+          <a:xfrm rot="16200000">
+            <a:off x="4205829" y="2460398"/>
+            <a:ext cx="516922" cy="738664"/>
+          </a:xfrm>
+          <a:prstGeom prst="rect">
+            <a:avLst/>
+          </a:prstGeom>
+          <a:noFill/>
+        </p:spPr>
+        <p:txBody>
+          <a:bodyPr wrap="square" rtlCol="0">
+            <a:spAutoFit/>
+          </a:bodyPr>
+          <a:lstStyle/>
+          <a:p>
+            <a:r>
+              <a:rPr lang="en-US" sz="1400" dirty="0"/>
+              <a:t>1</a:t>
+            </a:r>
+          </a:p>
+          <a:p>
+            <a:r>
+              <a:rPr lang="en-US" sz="1400" dirty="0"/>
+              <a:t>2</a:t>
+            </a:r>
+          </a:p>
+          <a:p>
+            <a:endParaRPr lang="en-US" sz="1400" dirty="0"/>
+          </a:p>
+        </p:txBody>
+      </p:sp>
+      <p:sp>
+        <p:nvSpPr>
+          <p:cNvPr id="54" name="Rectangle 53">
+            <a:extLst>
+              <a:ext uri="{FF2B5EF4-FFF2-40B4-BE49-F238E27FC236}">
+                <a16:creationId xmlns:a16="http://schemas.microsoft.com/office/drawing/2014/main" id="{6FADD9ED-2C65-4411-ACC7-85D47646211B}"/>
+              </a:ext>
+            </a:extLst>
+          </p:cNvPr>
+          <p:cNvSpPr/>
+          <p:nvPr/>
+        </p:nvSpPr>
+        <p:spPr>
+          <a:xfrm>
+            <a:off x="3691311" y="2208044"/>
+            <a:ext cx="371238" cy="902394"/>
+          </a:xfrm>
+          <a:prstGeom prst="rect">
+            <a:avLst/>
+          </a:prstGeom>
+          <a:ln>
+            <a:noFill/>
+          </a:ln>
+        </p:spPr>
+        <p:style>
+          <a:lnRef idx="2">
+            <a:schemeClr val="accent1">
+              <a:shade val="50000"/>
+            </a:schemeClr>
+          </a:lnRef>
+          <a:fillRef idx="1">
+            <a:schemeClr val="accent1"/>
+          </a:fillRef>
+          <a:effectRef idx="0">
+            <a:schemeClr val="accent1"/>
+          </a:effectRef>
+          <a:fontRef idx="minor">
+            <a:schemeClr val="lt1"/>
+          </a:fontRef>
+        </p:style>
+        <p:txBody>
+          <a:bodyPr rtlCol="0" anchor="ctr"/>
+          <a:lstStyle/>
+          <a:p>
+            <a:pPr algn="ctr"/>
+            <a:r>
+              <a:rPr lang="en-US" dirty="0"/>
+              <a:t>R</a:t>
+            </a:r>
+          </a:p>
+        </p:txBody>
+      </p:sp>
+      <p:sp>
+        <p:nvSpPr>
+          <p:cNvPr id="55" name="Rectangle 54">
+            <a:extLst>
+              <a:ext uri="{FF2B5EF4-FFF2-40B4-BE49-F238E27FC236}">
+                <a16:creationId xmlns:a16="http://schemas.microsoft.com/office/drawing/2014/main" id="{7FC668F9-DA7B-4465-9C78-56A05C1401A6}"/>
+              </a:ext>
+            </a:extLst>
+          </p:cNvPr>
+          <p:cNvSpPr/>
+          <p:nvPr/>
+        </p:nvSpPr>
+        <p:spPr>
+          <a:xfrm>
+            <a:off x="1174487" y="3605349"/>
+            <a:ext cx="2508429" cy="442505"/>
+          </a:xfrm>
+          <a:prstGeom prst="rect">
+            <a:avLst/>
+          </a:prstGeom>
+          <a:solidFill>
+            <a:srgbClr val="FFFF00"/>
+          </a:solidFill>
+          <a:ln>
+            <a:noFill/>
+          </a:ln>
+        </p:spPr>
+        <p:style>
+          <a:lnRef idx="2">
+            <a:schemeClr val="accent1">
+              <a:shade val="50000"/>
+            </a:schemeClr>
+          </a:lnRef>
+          <a:fillRef idx="1">
+            <a:schemeClr val="accent1"/>
+          </a:fillRef>
+          <a:effectRef idx="0">
+            <a:schemeClr val="accent1"/>
+          </a:effectRef>
+          <a:fontRef idx="minor">
+            <a:schemeClr val="lt1"/>
+          </a:fontRef>
+        </p:style>
+        <p:txBody>
+          <a:bodyPr rtlCol="0" anchor="ctr"/>
+          <a:lstStyle/>
+          <a:p>
+            <a:pPr algn="ctr"/>
+            <a:r>
+              <a:rPr lang="en-US" dirty="0"/>
+              <a:t>L</a:t>
+            </a:r>
+          </a:p>
+        </p:txBody>
+      </p:sp>
+      <p:sp>
+        <p:nvSpPr>
+          <p:cNvPr id="56" name="Rectangle 55">
+            <a:extLst>
+              <a:ext uri="{FF2B5EF4-FFF2-40B4-BE49-F238E27FC236}">
+                <a16:creationId xmlns:a16="http://schemas.microsoft.com/office/drawing/2014/main" id="{489228F6-5585-492A-A29F-3131EBA18706}"/>
+              </a:ext>
+            </a:extLst>
+          </p:cNvPr>
+          <p:cNvSpPr/>
+          <p:nvPr/>
+        </p:nvSpPr>
+        <p:spPr>
+          <a:xfrm>
+            <a:off x="5030187" y="5490191"/>
+            <a:ext cx="371238" cy="580656"/>
+          </a:xfrm>
+          <a:prstGeom prst="rect">
+            <a:avLst/>
+          </a:prstGeom>
+          <a:ln>
+            <a:noFill/>
+          </a:ln>
+        </p:spPr>
+        <p:style>
+          <a:lnRef idx="2">
+            <a:schemeClr val="accent1">
+              <a:shade val="50000"/>
+            </a:schemeClr>
+          </a:lnRef>
+          <a:fillRef idx="1">
+            <a:schemeClr val="accent1"/>
+          </a:fillRef>
+          <a:effectRef idx="0">
+            <a:schemeClr val="accent1"/>
+          </a:effectRef>
+          <a:fontRef idx="minor">
+            <a:schemeClr val="lt1"/>
+          </a:fontRef>
+        </p:style>
+        <p:txBody>
+          <a:bodyPr rtlCol="0" anchor="ctr"/>
+          <a:lstStyle/>
+          <a:p>
+            <a:pPr algn="ctr"/>
+            <a:r>
+              <a:rPr lang="en-US" dirty="0"/>
+              <a:t>R</a:t>
+            </a:r>
+          </a:p>
+        </p:txBody>
+      </p:sp>
+      <p:grpSp>
+        <p:nvGrpSpPr>
+          <p:cNvPr id="6" name="Group 5">
+            <a:extLst>
+              <a:ext uri="{FF2B5EF4-FFF2-40B4-BE49-F238E27FC236}">
+                <a16:creationId xmlns:a16="http://schemas.microsoft.com/office/drawing/2014/main" id="{06D16B26-50D7-43F5-8626-F807D39F0003}"/>
+              </a:ext>
+            </a:extLst>
+          </p:cNvPr>
+          <p:cNvGrpSpPr/>
+          <p:nvPr/>
+        </p:nvGrpSpPr>
+        <p:grpSpPr>
+          <a:xfrm>
+            <a:off x="5507217" y="2871429"/>
+            <a:ext cx="2765617" cy="1522535"/>
+            <a:chOff x="5507217" y="2871429"/>
+            <a:chExt cx="2765617" cy="1522535"/>
+          </a:xfrm>
+        </p:grpSpPr>
+        <p:grpSp>
+          <p:nvGrpSpPr>
+            <p:cNvPr id="17" name="Group 16">
+              <a:extLst>
+                <a:ext uri="{FF2B5EF4-FFF2-40B4-BE49-F238E27FC236}">
+                  <a16:creationId xmlns:a16="http://schemas.microsoft.com/office/drawing/2014/main" id="{CF36B47D-9072-4EFD-A0F5-E10EFC7DCE35}"/>
+                </a:ext>
+              </a:extLst>
+            </p:cNvPr>
+            <p:cNvGrpSpPr/>
+            <p:nvPr/>
+          </p:nvGrpSpPr>
+          <p:grpSpPr>
+            <a:xfrm rot="20412698">
+              <a:off x="5731897" y="3363935"/>
+              <a:ext cx="2540937" cy="654548"/>
+              <a:chOff x="1150374" y="4175900"/>
+              <a:chExt cx="2540937" cy="654548"/>
+            </a:xfrm>
+          </p:grpSpPr>
+          <p:cxnSp>
+            <p:nvCxnSpPr>
+              <p:cNvPr id="18" name="Straight Connector 17">
+                <a:extLst>
+                  <a:ext uri="{FF2B5EF4-FFF2-40B4-BE49-F238E27FC236}">
+                    <a16:creationId xmlns:a16="http://schemas.microsoft.com/office/drawing/2014/main" id="{24F0AC15-9CCB-476C-B29B-415A8E69756D}"/>
+                  </a:ext>
+                </a:extLst>
+              </p:cNvPr>
+              <p:cNvCxnSpPr/>
+              <p:nvPr/>
+            </p:nvCxnSpPr>
+            <p:spPr>
+              <a:xfrm>
+                <a:off x="1150374" y="4175900"/>
+                <a:ext cx="2532509" cy="0"/>
+              </a:xfrm>
+              <a:prstGeom prst="line">
+                <a:avLst/>
+              </a:prstGeom>
+              <a:ln>
+                <a:solidFill>
+                  <a:schemeClr val="accent2"/>
+                </a:solidFill>
+              </a:ln>
+            </p:spPr>
+            <p:style>
+              <a:lnRef idx="3">
+                <a:schemeClr val="dk1"/>
+              </a:lnRef>
+              <a:fillRef idx="0">
+                <a:schemeClr val="dk1"/>
+              </a:fillRef>
+              <a:effectRef idx="2">
+                <a:schemeClr val="dk1"/>
+              </a:effectRef>
+              <a:fontRef idx="minor">
+                <a:schemeClr val="tx1"/>
+              </a:fontRef>
+            </p:style>
+          </p:cxnSp>
+          <p:cxnSp>
+            <p:nvCxnSpPr>
+              <p:cNvPr id="19" name="Straight Connector 18">
+                <a:extLst>
+                  <a:ext uri="{FF2B5EF4-FFF2-40B4-BE49-F238E27FC236}">
+                    <a16:creationId xmlns:a16="http://schemas.microsoft.com/office/drawing/2014/main" id="{5A428933-2E68-4B05-9DF9-215AD2ED2FDD}"/>
+                  </a:ext>
+                </a:extLst>
+              </p:cNvPr>
+              <p:cNvCxnSpPr/>
+              <p:nvPr/>
+            </p:nvCxnSpPr>
+            <p:spPr>
+              <a:xfrm>
+                <a:off x="1154588" y="4403447"/>
+                <a:ext cx="2536723" cy="0"/>
+              </a:xfrm>
+              <a:prstGeom prst="line">
+                <a:avLst/>
+              </a:prstGeom>
+            </p:spPr>
+            <p:style>
+              <a:lnRef idx="1">
+                <a:schemeClr val="accent1"/>
+              </a:lnRef>
+              <a:fillRef idx="0">
+                <a:schemeClr val="accent1"/>
+              </a:fillRef>
+              <a:effectRef idx="0">
+                <a:schemeClr val="accent1"/>
+              </a:effectRef>
+              <a:fontRef idx="minor">
+                <a:schemeClr val="tx1"/>
+              </a:fontRef>
+            </p:style>
+          </p:cxnSp>
+          <p:cxnSp>
+            <p:nvCxnSpPr>
+              <p:cNvPr id="20" name="Straight Connector 19">
+                <a:extLst>
+                  <a:ext uri="{FF2B5EF4-FFF2-40B4-BE49-F238E27FC236}">
+                    <a16:creationId xmlns:a16="http://schemas.microsoft.com/office/drawing/2014/main" id="{1467280F-0697-4CE6-881B-566EF7F3B9DE}"/>
+                  </a:ext>
+                </a:extLst>
+              </p:cNvPr>
+              <p:cNvCxnSpPr/>
+              <p:nvPr/>
+            </p:nvCxnSpPr>
+            <p:spPr>
+              <a:xfrm>
+                <a:off x="1154588" y="4619054"/>
+                <a:ext cx="2536723" cy="0"/>
+              </a:xfrm>
+              <a:prstGeom prst="line">
+                <a:avLst/>
+              </a:prstGeom>
+            </p:spPr>
+            <p:style>
+              <a:lnRef idx="1">
+                <a:schemeClr val="accent1"/>
+              </a:lnRef>
+              <a:fillRef idx="0">
+                <a:schemeClr val="accent1"/>
+              </a:fillRef>
+              <a:effectRef idx="0">
+                <a:schemeClr val="accent1"/>
+              </a:effectRef>
+              <a:fontRef idx="minor">
+                <a:schemeClr val="tx1"/>
+              </a:fontRef>
+            </p:style>
+          </p:cxnSp>
+          <p:cxnSp>
+            <p:nvCxnSpPr>
+              <p:cNvPr id="21" name="Straight Connector 20">
+                <a:extLst>
+                  <a:ext uri="{FF2B5EF4-FFF2-40B4-BE49-F238E27FC236}">
+                    <a16:creationId xmlns:a16="http://schemas.microsoft.com/office/drawing/2014/main" id="{28613AFE-8557-48EB-97C3-2776FDCB3DE5}"/>
+                  </a:ext>
+                </a:extLst>
+              </p:cNvPr>
+              <p:cNvCxnSpPr/>
+              <p:nvPr/>
+            </p:nvCxnSpPr>
+            <p:spPr>
+              <a:xfrm>
+                <a:off x="1154588" y="4830448"/>
+                <a:ext cx="2536723" cy="0"/>
+              </a:xfrm>
+              <a:prstGeom prst="line">
+                <a:avLst/>
+              </a:prstGeom>
+            </p:spPr>
+            <p:style>
+              <a:lnRef idx="1">
+                <a:schemeClr val="accent1"/>
+              </a:lnRef>
+              <a:fillRef idx="0">
+                <a:schemeClr val="accent1"/>
+              </a:fillRef>
+              <a:effectRef idx="0">
+                <a:schemeClr val="accent1"/>
+              </a:effectRef>
+              <a:fontRef idx="minor">
+                <a:schemeClr val="tx1"/>
+              </a:fontRef>
+            </p:style>
+          </p:cxnSp>
+        </p:grpSp>
+        <p:sp>
+          <p:nvSpPr>
+            <p:cNvPr id="52" name="TextBox 51">
+              <a:extLst>
+                <a:ext uri="{FF2B5EF4-FFF2-40B4-BE49-F238E27FC236}">
+                  <a16:creationId xmlns:a16="http://schemas.microsoft.com/office/drawing/2014/main" id="{AB421530-0D49-483D-8474-5B9930556D6A}"/>
+                </a:ext>
+              </a:extLst>
+            </p:cNvPr>
+            <p:cNvSpPr txBox="1"/>
+            <p:nvPr/>
+          </p:nvSpPr>
+          <p:spPr>
+            <a:xfrm>
+              <a:off x="5911996" y="3655300"/>
+              <a:ext cx="516922" cy="738664"/>
+            </a:xfrm>
+            <a:prstGeom prst="rect">
+              <a:avLst/>
+            </a:prstGeom>
+            <a:noFill/>
+          </p:spPr>
+          <p:txBody>
+            <a:bodyPr wrap="square" rtlCol="0">
+              <a:spAutoFit/>
+            </a:bodyPr>
+            <a:lstStyle/>
+            <a:p>
+              <a:r>
+                <a:rPr lang="en-US" sz="1400" dirty="0"/>
+                <a:t>-1</a:t>
+              </a:r>
+            </a:p>
+            <a:p>
+              <a:r>
+                <a:rPr lang="en-US" sz="1400" dirty="0"/>
+                <a:t>-2</a:t>
+              </a:r>
+            </a:p>
+            <a:p>
+              <a:r>
+                <a:rPr lang="en-US" sz="1400" dirty="0"/>
+                <a:t>-3</a:t>
+              </a:r>
+            </a:p>
+          </p:txBody>
+        </p:sp>
+        <p:sp>
+          <p:nvSpPr>
+            <p:cNvPr id="57" name="Rectangle 56">
+              <a:extLst>
+                <a:ext uri="{FF2B5EF4-FFF2-40B4-BE49-F238E27FC236}">
+                  <a16:creationId xmlns:a16="http://schemas.microsoft.com/office/drawing/2014/main" id="{AD07EF17-B516-483A-9B50-A7C6DA183CF2}"/>
+                </a:ext>
+              </a:extLst>
+            </p:cNvPr>
+            <p:cNvSpPr/>
+            <p:nvPr/>
+          </p:nvSpPr>
+          <p:spPr>
+            <a:xfrm rot="20426854">
+              <a:off x="5507217" y="2871429"/>
+              <a:ext cx="2508429" cy="442505"/>
+            </a:xfrm>
+            <a:prstGeom prst="rect">
+              <a:avLst/>
+            </a:prstGeom>
+            <a:ln>
+              <a:noFill/>
+            </a:ln>
+          </p:spPr>
+          <p:style>
+            <a:lnRef idx="2">
+              <a:schemeClr val="accent1">
+                <a:shade val="50000"/>
+              </a:schemeClr>
+            </a:lnRef>
+            <a:fillRef idx="1">
+              <a:schemeClr val="accent1"/>
+            </a:fillRef>
+            <a:effectRef idx="0">
+              <a:schemeClr val="accent1"/>
+            </a:effectRef>
+            <a:fontRef idx="minor">
+              <a:schemeClr val="lt1"/>
+            </a:fontRef>
+          </p:style>
+          <p:txBody>
+            <a:bodyPr rtlCol="0" anchor="ctr"/>
+            <a:lstStyle/>
+            <a:p>
+              <a:pPr algn="ctr"/>
+              <a:r>
+                <a:rPr lang="en-US" dirty="0"/>
+                <a:t>R</a:t>
+              </a:r>
+            </a:p>
+          </p:txBody>
+        </p:sp>
+      </p:grpSp>
+      <p:cxnSp>
+        <p:nvCxnSpPr>
+          <p:cNvPr id="58" name="Straight Arrow Connector 57">
+            <a:extLst>
+              <a:ext uri="{FF2B5EF4-FFF2-40B4-BE49-F238E27FC236}">
+                <a16:creationId xmlns:a16="http://schemas.microsoft.com/office/drawing/2014/main" id="{A4728B3B-B4A0-4AC4-A151-FEA5C9803EBA}"/>
+              </a:ext>
+            </a:extLst>
+          </p:cNvPr>
+          <p:cNvCxnSpPr>
+            <a:cxnSpLocks/>
+          </p:cNvCxnSpPr>
+          <p:nvPr/>
+        </p:nvCxnSpPr>
+        <p:spPr>
+          <a:xfrm flipV="1">
+            <a:off x="3696455" y="3884190"/>
+            <a:ext cx="2007673" cy="415295"/>
+          </a:xfrm>
+          <a:prstGeom prst="straightConnector1">
+            <a:avLst/>
+          </a:prstGeom>
+          <a:ln w="12700">
+            <a:solidFill>
+              <a:schemeClr val="bg1">
+                <a:lumMod val="50000"/>
+              </a:schemeClr>
+            </a:solidFill>
+            <a:prstDash val="dash"/>
+            <a:tailEnd type="triangle"/>
+          </a:ln>
+        </p:spPr>
+        <p:style>
+          <a:lnRef idx="1">
+            <a:schemeClr val="accent1"/>
+          </a:lnRef>
+          <a:fillRef idx="0">
+            <a:schemeClr val="accent1"/>
+          </a:fillRef>
+          <a:effectRef idx="0">
+            <a:schemeClr val="accent1"/>
+          </a:effectRef>
+          <a:fontRef idx="minor">
+            <a:schemeClr val="tx1"/>
+          </a:fontRef>
+        </p:style>
+      </p:cxnSp>
+      <p:sp>
+        <p:nvSpPr>
+          <p:cNvPr id="61" name="TextBox 60">
+            <a:extLst>
+              <a:ext uri="{FF2B5EF4-FFF2-40B4-BE49-F238E27FC236}">
+                <a16:creationId xmlns:a16="http://schemas.microsoft.com/office/drawing/2014/main" id="{02841C77-20EF-458C-8889-6CE340E16041}"/>
+              </a:ext>
+            </a:extLst>
+          </p:cNvPr>
+          <p:cNvSpPr txBox="1"/>
+          <p:nvPr/>
+        </p:nvSpPr>
+        <p:spPr>
+          <a:xfrm>
+            <a:off x="9026434" y="1776549"/>
+            <a:ext cx="2477589" cy="1200329"/>
+          </a:xfrm>
+          <a:prstGeom prst="rect">
+            <a:avLst/>
+          </a:prstGeom>
+          <a:noFill/>
+        </p:spPr>
+        <p:txBody>
+          <a:bodyPr wrap="square" rtlCol="0">
+            <a:spAutoFit/>
+          </a:bodyPr>
+          <a:lstStyle/>
+          <a:p>
+            <a:r>
+              <a:rPr lang="en-US" dirty="0"/>
+              <a:t>Solid connections: the example configuration</a:t>
+            </a:r>
+          </a:p>
+          <a:p>
+            <a:r>
+              <a:rPr lang="en-US" dirty="0"/>
+              <a:t>Broken connections: alternative options </a:t>
+            </a:r>
+          </a:p>
+        </p:txBody>
+      </p:sp>
+      <p:cxnSp>
+        <p:nvCxnSpPr>
+          <p:cNvPr id="69" name="Straight Arrow Connector 68">
+            <a:extLst>
+              <a:ext uri="{FF2B5EF4-FFF2-40B4-BE49-F238E27FC236}">
+                <a16:creationId xmlns:a16="http://schemas.microsoft.com/office/drawing/2014/main" id="{371A8F44-999A-49AB-9AE9-2FD4436B643A}"/>
+              </a:ext>
+            </a:extLst>
+          </p:cNvPr>
+          <p:cNvCxnSpPr>
+            <a:cxnSpLocks/>
+            <a:stCxn id="51" idx="3"/>
+          </p:cNvCxnSpPr>
+          <p:nvPr/>
+        </p:nvCxnSpPr>
+        <p:spPr>
+          <a:xfrm flipV="1">
+            <a:off x="3744991" y="4324316"/>
+            <a:ext cx="2053582" cy="196788"/>
+          </a:xfrm>
+          <a:prstGeom prst="straightConnector1">
+            <a:avLst/>
+          </a:prstGeom>
+          <a:ln w="12700">
+            <a:solidFill>
+              <a:srgbClr val="7030A0"/>
+            </a:solidFill>
+            <a:prstDash val="dash"/>
+            <a:tailEnd type="triangle"/>
+          </a:ln>
+        </p:spPr>
+        <p:style>
+          <a:lnRef idx="1">
+            <a:schemeClr val="accent1"/>
+          </a:lnRef>
+          <a:fillRef idx="0">
+            <a:schemeClr val="accent1"/>
+          </a:fillRef>
+          <a:effectRef idx="0">
+            <a:schemeClr val="accent1"/>
+          </a:effectRef>
+          <a:fontRef idx="minor">
+            <a:schemeClr val="tx1"/>
+          </a:fontRef>
+        </p:style>
+      </p:cxnSp>
+      <p:sp>
+        <p:nvSpPr>
+          <p:cNvPr id="72" name="Freeform: Shape 71">
+            <a:extLst>
+              <a:ext uri="{FF2B5EF4-FFF2-40B4-BE49-F238E27FC236}">
+                <a16:creationId xmlns:a16="http://schemas.microsoft.com/office/drawing/2014/main" id="{8711EB62-2313-4145-BA8A-85F97B8CED30}"/>
+              </a:ext>
+            </a:extLst>
+          </p:cNvPr>
+          <p:cNvSpPr/>
+          <p:nvPr/>
+        </p:nvSpPr>
+        <p:spPr>
+          <a:xfrm>
+            <a:off x="3818709" y="3139440"/>
+            <a:ext cx="774158" cy="1284514"/>
+          </a:xfrm>
+          <a:custGeom>
+            <a:avLst/>
+            <a:gdLst>
+              <a:gd name="connsiteX0" fmla="*/ 0 w 774158"/>
+              <a:gd name="connsiteY0" fmla="*/ 1284514 h 1284514"/>
+              <a:gd name="connsiteX1" fmla="*/ 718457 w 774158"/>
+              <a:gd name="connsiteY1" fmla="*/ 840377 h 1284514"/>
+              <a:gd name="connsiteX2" fmla="*/ 727165 w 774158"/>
+              <a:gd name="connsiteY2" fmla="*/ 0 h 1284514"/>
+            </a:gdLst>
+            <a:ahLst/>
+            <a:cxnLst>
+              <a:cxn ang="0">
+                <a:pos x="connsiteX0" y="connsiteY0"/>
+              </a:cxn>
+              <a:cxn ang="0">
+                <a:pos x="connsiteX1" y="connsiteY1"/>
+              </a:cxn>
+              <a:cxn ang="0">
+                <a:pos x="connsiteX2" y="connsiteY2"/>
+              </a:cxn>
+            </a:cxnLst>
+            <a:rect l="l" t="t" r="r" b="b"/>
+            <a:pathLst>
+              <a:path w="774158" h="1284514">
+                <a:moveTo>
+                  <a:pt x="0" y="1284514"/>
+                </a:moveTo>
+                <a:cubicBezTo>
+                  <a:pt x="298631" y="1169488"/>
+                  <a:pt x="597263" y="1054463"/>
+                  <a:pt x="718457" y="840377"/>
+                </a:cubicBezTo>
+                <a:cubicBezTo>
+                  <a:pt x="839651" y="626291"/>
+                  <a:pt x="724988" y="137160"/>
+                  <a:pt x="727165" y="0"/>
+                </a:cubicBezTo>
+              </a:path>
+            </a:pathLst>
+          </a:custGeom>
+          <a:noFill/>
+          <a:ln>
+            <a:solidFill>
+              <a:srgbClr val="7030A0"/>
+            </a:solidFill>
+            <a:prstDash val="dash"/>
+            <a:tailEnd type="triangle"/>
+          </a:ln>
+        </p:spPr>
+        <p:style>
+          <a:lnRef idx="2">
+            <a:schemeClr val="accent1">
+              <a:shade val="50000"/>
+            </a:schemeClr>
+          </a:lnRef>
+          <a:fillRef idx="1">
+            <a:schemeClr val="accent1"/>
+          </a:fillRef>
+          <a:effectRef idx="0">
+            <a:schemeClr val="accent1"/>
+          </a:effectRef>
+          <a:fontRef idx="minor">
+            <a:schemeClr val="lt1"/>
+          </a:fontRef>
+        </p:style>
+        <p:txBody>
+          <a:bodyPr rtlCol="0" anchor="ctr"/>
+          <a:lstStyle/>
+          <a:p>
+            <a:pPr algn="ctr"/>
+            <a:endParaRPr lang="en-US"/>
+          </a:p>
+        </p:txBody>
+      </p:sp>
+      <p:cxnSp>
+        <p:nvCxnSpPr>
+          <p:cNvPr id="4" name="Straight Arrow Connector 3">
+            <a:extLst>
+              <a:ext uri="{FF2B5EF4-FFF2-40B4-BE49-F238E27FC236}">
+                <a16:creationId xmlns:a16="http://schemas.microsoft.com/office/drawing/2014/main" id="{3F3B1F88-18BA-405B-88F9-DAAFE8534A5E}"/>
+              </a:ext>
+            </a:extLst>
+          </p:cNvPr>
+          <p:cNvCxnSpPr/>
+          <p:nvPr/>
+        </p:nvCxnSpPr>
+        <p:spPr>
+          <a:xfrm flipV="1">
+            <a:off x="3744991" y="1368136"/>
+            <a:ext cx="3490545" cy="2849173"/>
+          </a:xfrm>
+          <a:prstGeom prst="straightConnector1">
+            <a:avLst/>
+          </a:prstGeom>
+          <a:ln w="19050">
+            <a:solidFill>
+              <a:srgbClr val="FF0000"/>
+            </a:solidFill>
+            <a:tailEnd type="triangle"/>
+          </a:ln>
+        </p:spPr>
+        <p:style>
+          <a:lnRef idx="1">
+            <a:schemeClr val="accent1"/>
+          </a:lnRef>
+          <a:fillRef idx="0">
+            <a:schemeClr val="accent1"/>
+          </a:fillRef>
+          <a:effectRef idx="0">
+            <a:schemeClr val="accent1"/>
+          </a:effectRef>
+          <a:fontRef idx="minor">
+            <a:schemeClr val="tx1"/>
+          </a:fontRef>
+        </p:style>
+      </p:cxnSp>
+    </p:spTree>
+    <p:extLst>
+      <p:ext uri="{BB962C8B-B14F-4D97-AF65-F5344CB8AC3E}">
+        <p14:creationId xmlns:p14="http://schemas.microsoft.com/office/powerpoint/2010/main" val="2436789231"/>
+      </p:ext>
+    </p:extLst>
+  </p:cSld>
+  <p:clrMapOvr>
+    <a:masterClrMapping/>
+  </p:clrMapOvr>
+  <p:timing>
+    <p:tnLst>
+      <p:par>
+        <p:cTn id="1" dur="indefinite" restart="never" nodeType="tmRoot">
+          <p:childTnLst>
+            <p:seq concurrent="1" nextAc="seek">
+              <p:cTn id="2" dur="indefinite" nodeType="mainSeq">
+                <p:childTnLst>
+                  <p:par>
+                    <p:cTn id="3" fill="hold">
+                      <p:stCondLst>
+                        <p:cond delay="indefinite"/>
+                      </p:stCondLst>
+                      <p:childTnLst>
+                        <p:par>
+                          <p:cTn id="4" fill="hold">
+                            <p:stCondLst>
+                              <p:cond delay="0"/>
+                            </p:stCondLst>
+                            <p:childTnLst>
+                              <p:par>
+                                <p:cTn id="5" presetID="10" presetClass="entr" presetSubtype="0" fill="hold" grpId="0" nodeType="clickEffect">
+                                  <p:stCondLst>
+                                    <p:cond delay="0"/>
+                                  </p:stCondLst>
+                                  <p:childTnLst>
+                                    <p:set>
+                                      <p:cBhvr>
+                                        <p:cTn id="6" dur="1" fill="hold">
+                                          <p:stCondLst>
+                                            <p:cond delay="0"/>
+                                          </p:stCondLst>
+                                        </p:cTn>
+                                        <p:tgtEl>
+                                          <p:spTgt spid="72"/>
+                                        </p:tgtEl>
+                                        <p:attrNameLst>
+                                          <p:attrName>style.visibility</p:attrName>
+                                        </p:attrNameLst>
+                                      </p:cBhvr>
+                                      <p:to>
+                                        <p:strVal val="visible"/>
+                                      </p:to>
+                                    </p:set>
+                                    <p:animEffect transition="in" filter="fade">
+                                      <p:cBhvr>
+                                        <p:cTn id="7" dur="500"/>
+                                        <p:tgtEl>
+                                          <p:spTgt spid="72"/>
+                                        </p:tgtEl>
+                                      </p:cBhvr>
+                                    </p:animEffect>
+                                  </p:childTnLst>
+                                </p:cTn>
+                              </p:par>
+                            </p:childTnLst>
+                          </p:cTn>
+                        </p:par>
+                      </p:childTnLst>
+                    </p:cTn>
+                  </p:par>
+                  <p:par>
+                    <p:cTn id="8" fill="hold">
+                      <p:stCondLst>
+                        <p:cond delay="indefinite"/>
+                      </p:stCondLst>
+                      <p:childTnLst>
+                        <p:par>
+                          <p:cTn id="9" fill="hold">
+                            <p:stCondLst>
+                              <p:cond delay="0"/>
+                            </p:stCondLst>
+                            <p:childTnLst>
+                              <p:par>
+                                <p:cTn id="10" presetID="10" presetClass="exit" presetSubtype="0" fill="hold" grpId="0" nodeType="clickEffect">
+                                  <p:stCondLst>
+                                    <p:cond delay="0"/>
+                                  </p:stCondLst>
+                                  <p:childTnLst>
+                                    <p:animEffect transition="out" filter="fade">
+                                      <p:cBhvr>
+                                        <p:cTn id="11" dur="500"/>
+                                        <p:tgtEl>
+                                          <p:spTgt spid="36"/>
+                                        </p:tgtEl>
+                                      </p:cBhvr>
+                                    </p:animEffect>
+                                    <p:set>
+                                      <p:cBhvr>
+                                        <p:cTn id="12" dur="1" fill="hold">
+                                          <p:stCondLst>
+                                            <p:cond delay="499"/>
+                                          </p:stCondLst>
+                                        </p:cTn>
+                                        <p:tgtEl>
+                                          <p:spTgt spid="36"/>
+                                        </p:tgtEl>
+                                        <p:attrNameLst>
+                                          <p:attrName>style.visibility</p:attrName>
+                                        </p:attrNameLst>
+                                      </p:cBhvr>
+                                      <p:to>
+                                        <p:strVal val="hidden"/>
+                                      </p:to>
+                                    </p:set>
+                                  </p:childTnLst>
+                                </p:cTn>
+                              </p:par>
+                            </p:childTnLst>
+                          </p:cTn>
+                        </p:par>
+                      </p:childTnLst>
+                    </p:cTn>
+                  </p:par>
+                  <p:par>
+                    <p:cTn id="13" fill="hold">
+                      <p:stCondLst>
+                        <p:cond delay="indefinite"/>
+                      </p:stCondLst>
+                      <p:childTnLst>
+                        <p:par>
+                          <p:cTn id="14" fill="hold">
+                            <p:stCondLst>
+                              <p:cond delay="0"/>
+                            </p:stCondLst>
+                            <p:childTnLst>
+                              <p:par>
+                                <p:cTn id="15" presetID="10" presetClass="entr" presetSubtype="0" fill="hold" nodeType="clickEffect">
+                                  <p:stCondLst>
+                                    <p:cond delay="0"/>
+                                  </p:stCondLst>
+                                  <p:childTnLst>
+                                    <p:set>
+                                      <p:cBhvr>
+                                        <p:cTn id="16" dur="1" fill="hold">
+                                          <p:stCondLst>
+                                            <p:cond delay="0"/>
+                                          </p:stCondLst>
+                                        </p:cTn>
+                                        <p:tgtEl>
+                                          <p:spTgt spid="58"/>
+                                        </p:tgtEl>
+                                        <p:attrNameLst>
+                                          <p:attrName>style.visibility</p:attrName>
+                                        </p:attrNameLst>
+                                      </p:cBhvr>
+                                      <p:to>
+                                        <p:strVal val="visible"/>
+                                      </p:to>
+                                    </p:set>
+                                    <p:animEffect transition="in" filter="fade">
+                                      <p:cBhvr>
+                                        <p:cTn id="17" dur="500"/>
+                                        <p:tgtEl>
+                                          <p:spTgt spid="58"/>
+                                        </p:tgtEl>
+                                      </p:cBhvr>
+                                    </p:animEffect>
+                                  </p:childTnLst>
+                                </p:cTn>
+                              </p:par>
+                            </p:childTnLst>
+                          </p:cTn>
+                        </p:par>
+                      </p:childTnLst>
+                    </p:cTn>
+                  </p:par>
+                  <p:par>
+                    <p:cTn id="18" fill="hold">
+                      <p:stCondLst>
+                        <p:cond delay="indefinite"/>
+                      </p:stCondLst>
+                      <p:childTnLst>
+                        <p:par>
+                          <p:cTn id="19" fill="hold">
+                            <p:stCondLst>
+                              <p:cond delay="0"/>
+                            </p:stCondLst>
+                            <p:childTnLst>
+                              <p:par>
+                                <p:cTn id="20" presetID="10" presetClass="exit" presetSubtype="0" fill="hold" nodeType="clickEffect">
+                                  <p:stCondLst>
+                                    <p:cond delay="0"/>
+                                  </p:stCondLst>
+                                  <p:childTnLst>
+                                    <p:animEffect transition="out" filter="fade">
+                                      <p:cBhvr>
+                                        <p:cTn id="21" dur="500"/>
+                                        <p:tgtEl>
+                                          <p:spTgt spid="39"/>
+                                        </p:tgtEl>
+                                      </p:cBhvr>
+                                    </p:animEffect>
+                                    <p:set>
+                                      <p:cBhvr>
+                                        <p:cTn id="22" dur="1" fill="hold">
+                                          <p:stCondLst>
+                                            <p:cond delay="499"/>
+                                          </p:stCondLst>
+                                        </p:cTn>
+                                        <p:tgtEl>
+                                          <p:spTgt spid="39"/>
+                                        </p:tgtEl>
+                                        <p:attrNameLst>
+                                          <p:attrName>style.visibility</p:attrName>
+                                        </p:attrNameLst>
+                                      </p:cBhvr>
+                                      <p:to>
+                                        <p:strVal val="hidden"/>
+                                      </p:to>
+                                    </p:set>
+                                  </p:childTnLst>
+                                </p:cTn>
+                              </p:par>
+                            </p:childTnLst>
+                          </p:cTn>
+                        </p:par>
+                      </p:childTnLst>
+                    </p:cTn>
+                  </p:par>
+                  <p:par>
+                    <p:cTn id="23" fill="hold">
+                      <p:stCondLst>
+                        <p:cond delay="indefinite"/>
+                      </p:stCondLst>
+                      <p:childTnLst>
+                        <p:par>
+                          <p:cTn id="24" fill="hold">
+                            <p:stCondLst>
+                              <p:cond delay="0"/>
+                            </p:stCondLst>
+                            <p:childTnLst>
+                              <p:par>
+                                <p:cTn id="25" presetID="10" presetClass="entr" presetSubtype="0" fill="hold" nodeType="clickEffect">
+                                  <p:stCondLst>
+                                    <p:cond delay="0"/>
+                                  </p:stCondLst>
+                                  <p:childTnLst>
+                                    <p:set>
+                                      <p:cBhvr>
+                                        <p:cTn id="26" dur="1" fill="hold">
+                                          <p:stCondLst>
+                                            <p:cond delay="0"/>
+                                          </p:stCondLst>
+                                        </p:cTn>
+                                        <p:tgtEl>
+                                          <p:spTgt spid="69"/>
+                                        </p:tgtEl>
+                                        <p:attrNameLst>
+                                          <p:attrName>style.visibility</p:attrName>
+                                        </p:attrNameLst>
+                                      </p:cBhvr>
+                                      <p:to>
+                                        <p:strVal val="visible"/>
+                                      </p:to>
+                                    </p:set>
+                                    <p:animEffect transition="in" filter="fade">
+                                      <p:cBhvr>
+                                        <p:cTn id="27" dur="500"/>
+                                        <p:tgtEl>
+                                          <p:spTgt spid="69"/>
+                                        </p:tgtEl>
+                                      </p:cBhvr>
+                                    </p:animEffect>
+                                  </p:childTnLst>
+                                </p:cTn>
+                              </p:par>
+                            </p:childTnLst>
+                          </p:cTn>
+                        </p:par>
+                      </p:childTnLst>
+                    </p:cTn>
+                  </p:par>
+                  <p:par>
+                    <p:cTn id="28" fill="hold">
+                      <p:stCondLst>
+                        <p:cond delay="indefinite"/>
+                      </p:stCondLst>
+                      <p:childTnLst>
+                        <p:par>
+                          <p:cTn id="29" fill="hold">
+                            <p:stCondLst>
+                              <p:cond delay="0"/>
+                            </p:stCondLst>
+                            <p:childTnLst>
+                              <p:par>
+                                <p:cTn id="30" presetID="10" presetClass="exit" presetSubtype="0" fill="hold" nodeType="clickEffect">
+                                  <p:stCondLst>
+                                    <p:cond delay="0"/>
+                                  </p:stCondLst>
+                                  <p:childTnLst>
+                                    <p:animEffect transition="out" filter="fade">
+                                      <p:cBhvr>
+                                        <p:cTn id="31" dur="500"/>
+                                        <p:tgtEl>
+                                          <p:spTgt spid="43"/>
+                                        </p:tgtEl>
+                                      </p:cBhvr>
+                                    </p:animEffect>
+                                    <p:set>
+                                      <p:cBhvr>
+                                        <p:cTn id="32" dur="1" fill="hold">
+                                          <p:stCondLst>
+                                            <p:cond delay="499"/>
+                                          </p:stCondLst>
+                                        </p:cTn>
+                                        <p:tgtEl>
+                                          <p:spTgt spid="43"/>
+                                        </p:tgtEl>
+                                        <p:attrNameLst>
+                                          <p:attrName>style.visibility</p:attrName>
+                                        </p:attrNameLst>
+                                      </p:cBhvr>
+                                      <p:to>
+                                        <p:strVal val="hidden"/>
+                                      </p:to>
+                                    </p:set>
+                                  </p:childTnLst>
+                                </p:cTn>
+                              </p:par>
+                            </p:childTnLst>
+                          </p:cTn>
+                        </p:par>
+                      </p:childTnLst>
+                    </p:cTn>
+                  </p:par>
+                </p:childTnLst>
+              </p:cTn>
+              <p:prevCondLst>
+                <p:cond evt="onPrev" delay="0">
+                  <p:tgtEl>
+                    <p:sldTgt/>
+                  </p:tgtEl>
+                </p:cond>
+              </p:prevCondLst>
+              <p:nextCondLst>
+                <p:cond evt="onNext" delay="0">
+                  <p:tgtEl>
+                    <p:sldTgt/>
+                  </p:tgtEl>
+                </p:cond>
+              </p:nextCondLst>
+            </p:seq>
+          </p:childTnLst>
+        </p:cTn>
+      </p:par>
+    </p:tnLst>
+    <p:bldLst>
+      <p:bldP spid="36" grpId="0" animBg="1"/>
+      <p:bldP spid="72" grpId="0" animBg="1"/>
+    </p:bldLst>
+  </p:timing>
+</p:sld>
+</file>
+
 <file path=ppt/slides/slide3.xml><?xml version="1.0" encoding="utf-8"?>
 <p:sld xmlns:a="http://schemas.openxmlformats.org/drawingml/2006/main" xmlns:r="http://schemas.openxmlformats.org/officeDocument/2006/relationships" xmlns:p="http://schemas.openxmlformats.org/presentationml/2006/main">
   <p:cSld>

</xml_diff>

<commit_message>
documentation on lane linker
</commit_message>
<xml_diff>
--- a/plan/challenges.pptx
+++ b/plan/challenges.pptx
@@ -31,6 +31,8 @@
     <p:sldId id="279" r:id="rId25"/>
     <p:sldId id="280" r:id="rId26"/>
     <p:sldId id="281" r:id="rId27"/>
+    <p:sldId id="282" r:id="rId28"/>
+    <p:sldId id="283" r:id="rId29"/>
   </p:sldIdLst>
   <p:sldSz cx="12192000" cy="6858000"/>
   <p:notesSz cx="6858000" cy="9144000"/>
@@ -284,7 +286,7 @@
           <a:p>
             <a:fld id="{76031F30-5868-4F85-A273-006B44ACFCE8}" type="datetimeFigureOut">
               <a:rPr lang="en-US" smtClean="0"/>
-              <a:t>12/16/2020</a:t>
+              <a:t>12/21/2020</a:t>
             </a:fld>
             <a:endParaRPr lang="en-US"/>
           </a:p>
@@ -482,7 +484,7 @@
           <a:p>
             <a:fld id="{76031F30-5868-4F85-A273-006B44ACFCE8}" type="datetimeFigureOut">
               <a:rPr lang="en-US" smtClean="0"/>
-              <a:t>12/16/2020</a:t>
+              <a:t>12/21/2020</a:t>
             </a:fld>
             <a:endParaRPr lang="en-US"/>
           </a:p>
@@ -690,7 +692,7 @@
           <a:p>
             <a:fld id="{76031F30-5868-4F85-A273-006B44ACFCE8}" type="datetimeFigureOut">
               <a:rPr lang="en-US" smtClean="0"/>
-              <a:t>12/16/2020</a:t>
+              <a:t>12/21/2020</a:t>
             </a:fld>
             <a:endParaRPr lang="en-US"/>
           </a:p>
@@ -888,7 +890,7 @@
           <a:p>
             <a:fld id="{76031F30-5868-4F85-A273-006B44ACFCE8}" type="datetimeFigureOut">
               <a:rPr lang="en-US" smtClean="0"/>
-              <a:t>12/16/2020</a:t>
+              <a:t>12/21/2020</a:t>
             </a:fld>
             <a:endParaRPr lang="en-US"/>
           </a:p>
@@ -1163,7 +1165,7 @@
           <a:p>
             <a:fld id="{76031F30-5868-4F85-A273-006B44ACFCE8}" type="datetimeFigureOut">
               <a:rPr lang="en-US" smtClean="0"/>
-              <a:t>12/16/2020</a:t>
+              <a:t>12/21/2020</a:t>
             </a:fld>
             <a:endParaRPr lang="en-US"/>
           </a:p>
@@ -1428,7 +1430,7 @@
           <a:p>
             <a:fld id="{76031F30-5868-4F85-A273-006B44ACFCE8}" type="datetimeFigureOut">
               <a:rPr lang="en-US" smtClean="0"/>
-              <a:t>12/16/2020</a:t>
+              <a:t>12/21/2020</a:t>
             </a:fld>
             <a:endParaRPr lang="en-US"/>
           </a:p>
@@ -1840,7 +1842,7 @@
           <a:p>
             <a:fld id="{76031F30-5868-4F85-A273-006B44ACFCE8}" type="datetimeFigureOut">
               <a:rPr lang="en-US" smtClean="0"/>
-              <a:t>12/16/2020</a:t>
+              <a:t>12/21/2020</a:t>
             </a:fld>
             <a:endParaRPr lang="en-US"/>
           </a:p>
@@ -1981,7 +1983,7 @@
           <a:p>
             <a:fld id="{76031F30-5868-4F85-A273-006B44ACFCE8}" type="datetimeFigureOut">
               <a:rPr lang="en-US" smtClean="0"/>
-              <a:t>12/16/2020</a:t>
+              <a:t>12/21/2020</a:t>
             </a:fld>
             <a:endParaRPr lang="en-US"/>
           </a:p>
@@ -2094,7 +2096,7 @@
           <a:p>
             <a:fld id="{76031F30-5868-4F85-A273-006B44ACFCE8}" type="datetimeFigureOut">
               <a:rPr lang="en-US" smtClean="0"/>
-              <a:t>12/16/2020</a:t>
+              <a:t>12/21/2020</a:t>
             </a:fld>
             <a:endParaRPr lang="en-US"/>
           </a:p>
@@ -2405,7 +2407,7 @@
           <a:p>
             <a:fld id="{76031F30-5868-4F85-A273-006B44ACFCE8}" type="datetimeFigureOut">
               <a:rPr lang="en-US" smtClean="0"/>
-              <a:t>12/16/2020</a:t>
+              <a:t>12/21/2020</a:t>
             </a:fld>
             <a:endParaRPr lang="en-US"/>
           </a:p>
@@ -2693,7 +2695,7 @@
           <a:p>
             <a:fld id="{76031F30-5868-4F85-A273-006B44ACFCE8}" type="datetimeFigureOut">
               <a:rPr lang="en-US" smtClean="0"/>
-              <a:t>12/16/2020</a:t>
+              <a:t>12/21/2020</a:t>
             </a:fld>
             <a:endParaRPr lang="en-US"/>
           </a:p>
@@ -2934,7 +2936,7 @@
           <a:p>
             <a:fld id="{76031F30-5868-4F85-A273-006B44ACFCE8}" type="datetimeFigureOut">
               <a:rPr lang="en-US" smtClean="0"/>
-              <a:t>12/16/2020</a:t>
+              <a:t>12/21/2020</a:t>
             </a:fld>
             <a:endParaRPr lang="en-US"/>
           </a:p>
@@ -7715,7 +7717,7 @@
         </p:nvSpPr>
         <p:spPr>
           <a:xfrm>
-            <a:off x="3691311" y="2208044"/>
+            <a:off x="3696368" y="2215626"/>
             <a:ext cx="371238" cy="902394"/>
           </a:xfrm>
           <a:prstGeom prst="rect">
@@ -7774,7 +7776,10 @@
             <a:avLst/>
           </a:prstGeom>
           <a:solidFill>
-            <a:srgbClr val="FFFF00"/>
+            <a:schemeClr val="accent4">
+              <a:lumMod val="60000"/>
+              <a:lumOff val="40000"/>
+            </a:schemeClr>
           </a:solidFill>
           <a:ln>
             <a:noFill/>
@@ -7874,10 +7879,10 @@
         </p:nvGrpSpPr>
         <p:grpSpPr>
           <a:xfrm>
-            <a:off x="5507217" y="2871429"/>
-            <a:ext cx="2765617" cy="1522535"/>
-            <a:chOff x="5507217" y="2871429"/>
-            <a:chExt cx="2765617" cy="1522535"/>
+            <a:off x="5731897" y="3363935"/>
+            <a:ext cx="2540937" cy="1030029"/>
+            <a:chOff x="5731897" y="3363935"/>
+            <a:chExt cx="2540937" cy="1030029"/>
           </a:xfrm>
         </p:grpSpPr>
         <p:grpSp>
@@ -8097,58 +8102,6 @@
             </a:p>
           </p:txBody>
         </p:sp>
-        <p:sp>
-          <p:nvSpPr>
-            <p:cNvPr id="57" name="Rectangle 56">
-              <a:extLst>
-                <a:ext uri="{FF2B5EF4-FFF2-40B4-BE49-F238E27FC236}">
-                  <a16:creationId xmlns:a16="http://schemas.microsoft.com/office/drawing/2014/main" id="{AD07EF17-B516-483A-9B50-A7C6DA183CF2}"/>
-                </a:ext>
-              </a:extLst>
-            </p:cNvPr>
-            <p:cNvSpPr/>
-            <p:nvPr/>
-          </p:nvSpPr>
-          <p:spPr>
-            <a:xfrm rot="20426854">
-              <a:off x="5507217" y="2871429"/>
-              <a:ext cx="2508429" cy="442505"/>
-            </a:xfrm>
-            <a:prstGeom prst="rect">
-              <a:avLst/>
-            </a:prstGeom>
-            <a:ln>
-              <a:noFill/>
-            </a:ln>
-          </p:spPr>
-          <p:style>
-            <a:lnRef idx="2">
-              <a:schemeClr val="accent1">
-                <a:shade val="50000"/>
-              </a:schemeClr>
-            </a:lnRef>
-            <a:fillRef idx="1">
-              <a:schemeClr val="accent1"/>
-            </a:fillRef>
-            <a:effectRef idx="0">
-              <a:schemeClr val="accent1"/>
-            </a:effectRef>
-            <a:fontRef idx="minor">
-              <a:schemeClr val="lt1"/>
-            </a:fontRef>
-          </p:style>
-          <p:txBody>
-            <a:bodyPr rtlCol="0" anchor="ctr"/>
-            <a:lstStyle/>
-            <a:p>
-              <a:pPr algn="ctr"/>
-              <a:r>
-                <a:rPr lang="en-US" dirty="0"/>
-                <a:t>R</a:t>
-              </a:r>
-            </a:p>
-          </p:txBody>
-        </p:sp>
       </p:grpSp>
       <p:cxnSp>
         <p:nvCxnSpPr>
@@ -8418,6 +8371,342 @@
           </a:fontRef>
         </p:style>
       </p:cxnSp>
+      <p:sp>
+        <p:nvSpPr>
+          <p:cNvPr id="37" name="Rectangle 36">
+            <a:extLst>
+              <a:ext uri="{FF2B5EF4-FFF2-40B4-BE49-F238E27FC236}">
+                <a16:creationId xmlns:a16="http://schemas.microsoft.com/office/drawing/2014/main" id="{62CFE3DB-E381-455D-8F49-2688C19BD794}"/>
+              </a:ext>
+            </a:extLst>
+          </p:cNvPr>
+          <p:cNvSpPr/>
+          <p:nvPr/>
+        </p:nvSpPr>
+        <p:spPr>
+          <a:xfrm rot="20435386">
+            <a:off x="5523249" y="2863414"/>
+            <a:ext cx="2508429" cy="442505"/>
+          </a:xfrm>
+          <a:prstGeom prst="rect">
+            <a:avLst/>
+          </a:prstGeom>
+          <a:solidFill>
+            <a:schemeClr val="accent4">
+              <a:lumMod val="60000"/>
+              <a:lumOff val="40000"/>
+            </a:schemeClr>
+          </a:solidFill>
+          <a:ln>
+            <a:noFill/>
+          </a:ln>
+        </p:spPr>
+        <p:style>
+          <a:lnRef idx="2">
+            <a:schemeClr val="accent1">
+              <a:shade val="50000"/>
+            </a:schemeClr>
+          </a:lnRef>
+          <a:fillRef idx="1">
+            <a:schemeClr val="accent1"/>
+          </a:fillRef>
+          <a:effectRef idx="0">
+            <a:schemeClr val="accent1"/>
+          </a:effectRef>
+          <a:fontRef idx="minor">
+            <a:schemeClr val="lt1"/>
+          </a:fontRef>
+        </p:style>
+        <p:txBody>
+          <a:bodyPr rtlCol="0" anchor="ctr"/>
+          <a:lstStyle/>
+          <a:p>
+            <a:pPr algn="ctr"/>
+            <a:r>
+              <a:rPr lang="en-US" dirty="0"/>
+              <a:t>L</a:t>
+            </a:r>
+          </a:p>
+        </p:txBody>
+      </p:sp>
+      <p:sp>
+        <p:nvSpPr>
+          <p:cNvPr id="38" name="TextBox 37">
+            <a:extLst>
+              <a:ext uri="{FF2B5EF4-FFF2-40B4-BE49-F238E27FC236}">
+                <a16:creationId xmlns:a16="http://schemas.microsoft.com/office/drawing/2014/main" id="{BA8EE5DC-BCC4-40CF-BE9D-717527AD10C9}"/>
+              </a:ext>
+            </a:extLst>
+          </p:cNvPr>
+          <p:cNvSpPr txBox="1"/>
+          <p:nvPr/>
+        </p:nvSpPr>
+        <p:spPr>
+          <a:xfrm>
+            <a:off x="5397436" y="5292674"/>
+            <a:ext cx="773021" cy="369332"/>
+          </a:xfrm>
+          <a:prstGeom prst="rect">
+            <a:avLst/>
+          </a:prstGeom>
+          <a:noFill/>
+        </p:spPr>
+        <p:txBody>
+          <a:bodyPr wrap="square" rtlCol="0">
+            <a:spAutoFit/>
+          </a:bodyPr>
+          <a:lstStyle/>
+          <a:p>
+            <a:r>
+              <a:rPr lang="en-US" dirty="0"/>
+              <a:t>End</a:t>
+            </a:r>
+          </a:p>
+        </p:txBody>
+      </p:sp>
+      <p:sp>
+        <p:nvSpPr>
+          <p:cNvPr id="41" name="TextBox 40">
+            <a:extLst>
+              <a:ext uri="{FF2B5EF4-FFF2-40B4-BE49-F238E27FC236}">
+                <a16:creationId xmlns:a16="http://schemas.microsoft.com/office/drawing/2014/main" id="{3482936A-7E1A-419C-980D-CB2754FC2585}"/>
+              </a:ext>
+            </a:extLst>
+          </p:cNvPr>
+          <p:cNvSpPr txBox="1"/>
+          <p:nvPr/>
+        </p:nvSpPr>
+        <p:spPr>
+          <a:xfrm>
+            <a:off x="3163553" y="2807421"/>
+            <a:ext cx="773021" cy="369332"/>
+          </a:xfrm>
+          <a:prstGeom prst="rect">
+            <a:avLst/>
+          </a:prstGeom>
+          <a:noFill/>
+        </p:spPr>
+        <p:txBody>
+          <a:bodyPr wrap="square" rtlCol="0">
+            <a:spAutoFit/>
+          </a:bodyPr>
+          <a:lstStyle/>
+          <a:p>
+            <a:r>
+              <a:rPr lang="en-US" dirty="0"/>
+              <a:t>End</a:t>
+            </a:r>
+          </a:p>
+        </p:txBody>
+      </p:sp>
+      <p:sp>
+        <p:nvSpPr>
+          <p:cNvPr id="3" name="Arrow: Down 2">
+            <a:extLst>
+              <a:ext uri="{FF2B5EF4-FFF2-40B4-BE49-F238E27FC236}">
+                <a16:creationId xmlns:a16="http://schemas.microsoft.com/office/drawing/2014/main" id="{66025283-60F4-40C2-86BE-F3C829413D1E}"/>
+              </a:ext>
+            </a:extLst>
+          </p:cNvPr>
+          <p:cNvSpPr/>
+          <p:nvPr/>
+        </p:nvSpPr>
+        <p:spPr>
+          <a:xfrm>
+            <a:off x="3818855" y="2809268"/>
+            <a:ext cx="131395" cy="232117"/>
+          </a:xfrm>
+          <a:prstGeom prst="downArrow">
+            <a:avLst/>
+          </a:prstGeom>
+          <a:solidFill>
+            <a:schemeClr val="bg1"/>
+          </a:solidFill>
+          <a:ln>
+            <a:noFill/>
+          </a:ln>
+        </p:spPr>
+        <p:style>
+          <a:lnRef idx="2">
+            <a:schemeClr val="accent1">
+              <a:shade val="50000"/>
+            </a:schemeClr>
+          </a:lnRef>
+          <a:fillRef idx="1">
+            <a:schemeClr val="accent1"/>
+          </a:fillRef>
+          <a:effectRef idx="0">
+            <a:schemeClr val="accent1"/>
+          </a:effectRef>
+          <a:fontRef idx="minor">
+            <a:schemeClr val="lt1"/>
+          </a:fontRef>
+        </p:style>
+        <p:txBody>
+          <a:bodyPr rtlCol="0" anchor="ctr"/>
+          <a:lstStyle/>
+          <a:p>
+            <a:pPr algn="ctr"/>
+            <a:endParaRPr lang="en-US"/>
+          </a:p>
+        </p:txBody>
+      </p:sp>
+      <p:sp>
+        <p:nvSpPr>
+          <p:cNvPr id="42" name="Arrow: Down 41">
+            <a:extLst>
+              <a:ext uri="{FF2B5EF4-FFF2-40B4-BE49-F238E27FC236}">
+                <a16:creationId xmlns:a16="http://schemas.microsoft.com/office/drawing/2014/main" id="{665A7294-340E-4820-8D85-9723A73B8484}"/>
+              </a:ext>
+            </a:extLst>
+          </p:cNvPr>
+          <p:cNvSpPr/>
+          <p:nvPr/>
+        </p:nvSpPr>
+        <p:spPr>
+          <a:xfrm rot="10800000">
+            <a:off x="5151121" y="5531646"/>
+            <a:ext cx="137107" cy="133277"/>
+          </a:xfrm>
+          <a:prstGeom prst="downArrow">
+            <a:avLst/>
+          </a:prstGeom>
+          <a:solidFill>
+            <a:schemeClr val="bg1"/>
+          </a:solidFill>
+          <a:ln>
+            <a:noFill/>
+          </a:ln>
+        </p:spPr>
+        <p:style>
+          <a:lnRef idx="2">
+            <a:schemeClr val="accent1">
+              <a:shade val="50000"/>
+            </a:schemeClr>
+          </a:lnRef>
+          <a:fillRef idx="1">
+            <a:schemeClr val="accent1"/>
+          </a:fillRef>
+          <a:effectRef idx="0">
+            <a:schemeClr val="accent1"/>
+          </a:effectRef>
+          <a:fontRef idx="minor">
+            <a:schemeClr val="lt1"/>
+          </a:fontRef>
+        </p:style>
+        <p:txBody>
+          <a:bodyPr rtlCol="0" anchor="ctr"/>
+          <a:lstStyle/>
+          <a:p>
+            <a:pPr algn="ctr"/>
+            <a:endParaRPr lang="en-US"/>
+          </a:p>
+        </p:txBody>
+      </p:sp>
+      <p:sp>
+        <p:nvSpPr>
+          <p:cNvPr id="44" name="Arrow: Right 43">
+            <a:extLst>
+              <a:ext uri="{FF2B5EF4-FFF2-40B4-BE49-F238E27FC236}">
+                <a16:creationId xmlns:a16="http://schemas.microsoft.com/office/drawing/2014/main" id="{40FED697-DE48-443C-BA99-BCE7008CCFF6}"/>
+              </a:ext>
+            </a:extLst>
+          </p:cNvPr>
+          <p:cNvSpPr/>
+          <p:nvPr/>
+        </p:nvSpPr>
+        <p:spPr>
+          <a:xfrm rot="9585822">
+            <a:off x="5796818" y="3214302"/>
+            <a:ext cx="899448" cy="150354"/>
+          </a:xfrm>
+          <a:prstGeom prst="rightArrow">
+            <a:avLst/>
+          </a:prstGeom>
+          <a:solidFill>
+            <a:schemeClr val="bg1"/>
+          </a:solidFill>
+          <a:ln>
+            <a:noFill/>
+          </a:ln>
+        </p:spPr>
+        <p:style>
+          <a:lnRef idx="2">
+            <a:schemeClr val="accent1">
+              <a:shade val="50000"/>
+            </a:schemeClr>
+          </a:lnRef>
+          <a:fillRef idx="1">
+            <a:schemeClr val="accent1"/>
+          </a:fillRef>
+          <a:effectRef idx="0">
+            <a:schemeClr val="accent1"/>
+          </a:effectRef>
+          <a:fontRef idx="minor">
+            <a:schemeClr val="lt1"/>
+          </a:fontRef>
+        </p:style>
+        <p:txBody>
+          <a:bodyPr rtlCol="0" anchor="ctr"/>
+          <a:lstStyle/>
+          <a:p>
+            <a:pPr algn="ctr"/>
+            <a:endParaRPr lang="en-US"/>
+          </a:p>
+        </p:txBody>
+      </p:sp>
+      <p:sp>
+        <p:nvSpPr>
+          <p:cNvPr id="45" name="Arrow: Right 44">
+            <a:extLst>
+              <a:ext uri="{FF2B5EF4-FFF2-40B4-BE49-F238E27FC236}">
+                <a16:creationId xmlns:a16="http://schemas.microsoft.com/office/drawing/2014/main" id="{9EA26477-6DC4-4ACE-8539-10E430CC5E8F}"/>
+              </a:ext>
+            </a:extLst>
+          </p:cNvPr>
+          <p:cNvSpPr/>
+          <p:nvPr/>
+        </p:nvSpPr>
+        <p:spPr>
+          <a:xfrm rot="10800000">
+            <a:off x="1399917" y="3750356"/>
+            <a:ext cx="899448" cy="150354"/>
+          </a:xfrm>
+          <a:prstGeom prst="rightArrow">
+            <a:avLst/>
+          </a:prstGeom>
+          <a:solidFill>
+            <a:schemeClr val="bg1"/>
+          </a:solidFill>
+          <a:ln>
+            <a:noFill/>
+          </a:ln>
+        </p:spPr>
+        <p:style>
+          <a:lnRef idx="2">
+            <a:schemeClr val="accent1">
+              <a:shade val="50000"/>
+            </a:schemeClr>
+          </a:lnRef>
+          <a:fillRef idx="1">
+            <a:schemeClr val="accent1"/>
+          </a:fillRef>
+          <a:effectRef idx="0">
+            <a:schemeClr val="accent1"/>
+          </a:effectRef>
+          <a:fontRef idx="minor">
+            <a:schemeClr val="lt1"/>
+          </a:fontRef>
+        </p:style>
+        <p:txBody>
+          <a:bodyPr rtlCol="0" anchor="ctr"/>
+          <a:lstStyle/>
+          <a:p>
+            <a:pPr algn="ctr"/>
+            <a:endParaRPr lang="en-US"/>
+          </a:p>
+        </p:txBody>
+      </p:sp>
     </p:spTree>
     <p:extLst>
       <p:ext uri="{BB962C8B-B14F-4D97-AF65-F5344CB8AC3E}">
@@ -8783,6 +9072,2975 @@
 </p:sld>
 </file>
 
+<file path=ppt/slides/slide27.xml><?xml version="1.0" encoding="utf-8"?>
+<p:sld xmlns:a="http://schemas.openxmlformats.org/drawingml/2006/main" xmlns:r="http://schemas.openxmlformats.org/officeDocument/2006/relationships" xmlns:p="http://schemas.openxmlformats.org/presentationml/2006/main">
+  <p:cSld>
+    <p:spTree>
+      <p:nvGrpSpPr>
+        <p:cNvPr id="1" name=""/>
+        <p:cNvGrpSpPr/>
+        <p:nvPr/>
+      </p:nvGrpSpPr>
+      <p:grpSpPr>
+        <a:xfrm>
+          <a:off x="0" y="0"/>
+          <a:ext cx="0" cy="0"/>
+          <a:chOff x="0" y="0"/>
+          <a:chExt cx="0" cy="0"/>
+        </a:xfrm>
+      </p:grpSpPr>
+      <p:sp>
+        <p:nvSpPr>
+          <p:cNvPr id="2" name="Title 1">
+            <a:extLst>
+              <a:ext uri="{FF2B5EF4-FFF2-40B4-BE49-F238E27FC236}">
+                <a16:creationId xmlns:a16="http://schemas.microsoft.com/office/drawing/2014/main" id="{66DEB391-322F-471C-BDFC-81E754DA4463}"/>
+              </a:ext>
+            </a:extLst>
+          </p:cNvPr>
+          <p:cNvSpPr>
+            <a:spLocks noGrp="1"/>
+          </p:cNvSpPr>
+          <p:nvPr>
+            <p:ph type="title"/>
+          </p:nvPr>
+        </p:nvSpPr>
+        <p:spPr>
+          <a:xfrm>
+            <a:off x="579050" y="212640"/>
+            <a:ext cx="10515600" cy="1325563"/>
+          </a:xfrm>
+        </p:spPr>
+        <p:txBody>
+          <a:bodyPr/>
+          <a:lstStyle/>
+          <a:p>
+            <a:r>
+              <a:rPr lang="en-US" dirty="0"/>
+              <a:t>Lane configuration</a:t>
+            </a:r>
+          </a:p>
+        </p:txBody>
+      </p:sp>
+      <p:grpSp>
+        <p:nvGrpSpPr>
+          <p:cNvPr id="67" name="Group 66">
+            <a:extLst>
+              <a:ext uri="{FF2B5EF4-FFF2-40B4-BE49-F238E27FC236}">
+                <a16:creationId xmlns:a16="http://schemas.microsoft.com/office/drawing/2014/main" id="{38E451A3-5B1E-4F19-93C6-70D32D8A2432}"/>
+              </a:ext>
+            </a:extLst>
+          </p:cNvPr>
+          <p:cNvGrpSpPr/>
+          <p:nvPr/>
+        </p:nvGrpSpPr>
+        <p:grpSpPr>
+          <a:xfrm>
+            <a:off x="7219171" y="4067609"/>
+            <a:ext cx="3734602" cy="1798247"/>
+            <a:chOff x="6953560" y="2830991"/>
+            <a:chExt cx="3734602" cy="1798247"/>
+          </a:xfrm>
+        </p:grpSpPr>
+        <p:grpSp>
+          <p:nvGrpSpPr>
+            <p:cNvPr id="51" name="Group 50">
+              <a:extLst>
+                <a:ext uri="{FF2B5EF4-FFF2-40B4-BE49-F238E27FC236}">
+                  <a16:creationId xmlns:a16="http://schemas.microsoft.com/office/drawing/2014/main" id="{38CA4543-F674-4DC5-9D88-EC0F3FE7C073}"/>
+                </a:ext>
+              </a:extLst>
+            </p:cNvPr>
+            <p:cNvGrpSpPr/>
+            <p:nvPr/>
+          </p:nvGrpSpPr>
+          <p:grpSpPr>
+            <a:xfrm>
+              <a:off x="6953560" y="2830991"/>
+              <a:ext cx="3734602" cy="1798247"/>
+              <a:chOff x="6953560" y="2830991"/>
+              <a:chExt cx="3734602" cy="1798247"/>
+            </a:xfrm>
+          </p:grpSpPr>
+          <p:sp>
+            <p:nvSpPr>
+              <p:cNvPr id="38" name="TextBox 37">
+                <a:extLst>
+                  <a:ext uri="{FF2B5EF4-FFF2-40B4-BE49-F238E27FC236}">
+                    <a16:creationId xmlns:a16="http://schemas.microsoft.com/office/drawing/2014/main" id="{2692A617-B8DC-4023-B58E-A89A02F2A206}"/>
+                  </a:ext>
+                </a:extLst>
+              </p:cNvPr>
+              <p:cNvSpPr txBox="1"/>
+              <p:nvPr/>
+            </p:nvSpPr>
+            <p:spPr>
+              <a:xfrm rot="20403980">
+                <a:off x="6953560" y="3929210"/>
+                <a:ext cx="773021" cy="369332"/>
+              </a:xfrm>
+              <a:prstGeom prst="rect">
+                <a:avLst/>
+              </a:prstGeom>
+              <a:noFill/>
+            </p:spPr>
+            <p:txBody>
+              <a:bodyPr wrap="square" rtlCol="0">
+                <a:spAutoFit/>
+              </a:bodyPr>
+              <a:lstStyle/>
+              <a:p>
+                <a:r>
+                  <a:rPr lang="en-US" dirty="0"/>
+                  <a:t>Start</a:t>
+                </a:r>
+              </a:p>
+            </p:txBody>
+          </p:sp>
+          <p:grpSp>
+            <p:nvGrpSpPr>
+              <p:cNvPr id="41" name="Group 40">
+                <a:extLst>
+                  <a:ext uri="{FF2B5EF4-FFF2-40B4-BE49-F238E27FC236}">
+                    <a16:creationId xmlns:a16="http://schemas.microsoft.com/office/drawing/2014/main" id="{D4158673-7AAA-43CB-93FB-7397F42FC937}"/>
+                  </a:ext>
+                </a:extLst>
+              </p:cNvPr>
+              <p:cNvGrpSpPr/>
+              <p:nvPr/>
+            </p:nvGrpSpPr>
+            <p:grpSpPr>
+              <a:xfrm>
+                <a:off x="7616505" y="3599209"/>
+                <a:ext cx="2540937" cy="1030029"/>
+                <a:chOff x="5731897" y="3363935"/>
+                <a:chExt cx="2540937" cy="1030029"/>
+              </a:xfrm>
+            </p:grpSpPr>
+            <p:grpSp>
+              <p:nvGrpSpPr>
+                <p:cNvPr id="43" name="Group 42">
+                  <a:extLst>
+                    <a:ext uri="{FF2B5EF4-FFF2-40B4-BE49-F238E27FC236}">
+                      <a16:creationId xmlns:a16="http://schemas.microsoft.com/office/drawing/2014/main" id="{FE988ACE-A9D1-4938-A9A5-869F3ACFCB53}"/>
+                    </a:ext>
+                  </a:extLst>
+                </p:cNvPr>
+                <p:cNvGrpSpPr/>
+                <p:nvPr/>
+              </p:nvGrpSpPr>
+              <p:grpSpPr>
+                <a:xfrm rot="20412698">
+                  <a:off x="5731897" y="3363935"/>
+                  <a:ext cx="2540937" cy="654548"/>
+                  <a:chOff x="1150374" y="4175900"/>
+                  <a:chExt cx="2540937" cy="654548"/>
+                </a:xfrm>
+              </p:grpSpPr>
+              <p:cxnSp>
+                <p:nvCxnSpPr>
+                  <p:cNvPr id="46" name="Straight Connector 45">
+                    <a:extLst>
+                      <a:ext uri="{FF2B5EF4-FFF2-40B4-BE49-F238E27FC236}">
+                        <a16:creationId xmlns:a16="http://schemas.microsoft.com/office/drawing/2014/main" id="{6A4B1403-5B2B-4AF6-8BCB-AC1AE7F87592}"/>
+                      </a:ext>
+                    </a:extLst>
+                  </p:cNvPr>
+                  <p:cNvCxnSpPr/>
+                  <p:nvPr/>
+                </p:nvCxnSpPr>
+                <p:spPr>
+                  <a:xfrm>
+                    <a:off x="1150374" y="4175900"/>
+                    <a:ext cx="2532509" cy="0"/>
+                  </a:xfrm>
+                  <a:prstGeom prst="line">
+                    <a:avLst/>
+                  </a:prstGeom>
+                  <a:ln>
+                    <a:solidFill>
+                      <a:schemeClr val="accent2"/>
+                    </a:solidFill>
+                  </a:ln>
+                </p:spPr>
+                <p:style>
+                  <a:lnRef idx="3">
+                    <a:schemeClr val="dk1"/>
+                  </a:lnRef>
+                  <a:fillRef idx="0">
+                    <a:schemeClr val="dk1"/>
+                  </a:fillRef>
+                  <a:effectRef idx="2">
+                    <a:schemeClr val="dk1"/>
+                  </a:effectRef>
+                  <a:fontRef idx="minor">
+                    <a:schemeClr val="tx1"/>
+                  </a:fontRef>
+                </p:style>
+              </p:cxnSp>
+              <p:cxnSp>
+                <p:nvCxnSpPr>
+                  <p:cNvPr id="47" name="Straight Connector 46">
+                    <a:extLst>
+                      <a:ext uri="{FF2B5EF4-FFF2-40B4-BE49-F238E27FC236}">
+                        <a16:creationId xmlns:a16="http://schemas.microsoft.com/office/drawing/2014/main" id="{9767D72A-D3DD-49C2-9E57-469CB604025D}"/>
+                      </a:ext>
+                    </a:extLst>
+                  </p:cNvPr>
+                  <p:cNvCxnSpPr/>
+                  <p:nvPr/>
+                </p:nvCxnSpPr>
+                <p:spPr>
+                  <a:xfrm>
+                    <a:off x="1154588" y="4403447"/>
+                    <a:ext cx="2536723" cy="0"/>
+                  </a:xfrm>
+                  <a:prstGeom prst="line">
+                    <a:avLst/>
+                  </a:prstGeom>
+                </p:spPr>
+                <p:style>
+                  <a:lnRef idx="1">
+                    <a:schemeClr val="accent1"/>
+                  </a:lnRef>
+                  <a:fillRef idx="0">
+                    <a:schemeClr val="accent1"/>
+                  </a:fillRef>
+                  <a:effectRef idx="0">
+                    <a:schemeClr val="accent1"/>
+                  </a:effectRef>
+                  <a:fontRef idx="minor">
+                    <a:schemeClr val="tx1"/>
+                  </a:fontRef>
+                </p:style>
+              </p:cxnSp>
+              <p:cxnSp>
+                <p:nvCxnSpPr>
+                  <p:cNvPr id="48" name="Straight Connector 47">
+                    <a:extLst>
+                      <a:ext uri="{FF2B5EF4-FFF2-40B4-BE49-F238E27FC236}">
+                        <a16:creationId xmlns:a16="http://schemas.microsoft.com/office/drawing/2014/main" id="{303B24CD-498E-4DF4-89BA-AD49DCD4D80F}"/>
+                      </a:ext>
+                    </a:extLst>
+                  </p:cNvPr>
+                  <p:cNvCxnSpPr/>
+                  <p:nvPr/>
+                </p:nvCxnSpPr>
+                <p:spPr>
+                  <a:xfrm>
+                    <a:off x="1154588" y="4619054"/>
+                    <a:ext cx="2536723" cy="0"/>
+                  </a:xfrm>
+                  <a:prstGeom prst="line">
+                    <a:avLst/>
+                  </a:prstGeom>
+                </p:spPr>
+                <p:style>
+                  <a:lnRef idx="1">
+                    <a:schemeClr val="accent1"/>
+                  </a:lnRef>
+                  <a:fillRef idx="0">
+                    <a:schemeClr val="accent1"/>
+                  </a:fillRef>
+                  <a:effectRef idx="0">
+                    <a:schemeClr val="accent1"/>
+                  </a:effectRef>
+                  <a:fontRef idx="minor">
+                    <a:schemeClr val="tx1"/>
+                  </a:fontRef>
+                </p:style>
+              </p:cxnSp>
+              <p:cxnSp>
+                <p:nvCxnSpPr>
+                  <p:cNvPr id="49" name="Straight Connector 48">
+                    <a:extLst>
+                      <a:ext uri="{FF2B5EF4-FFF2-40B4-BE49-F238E27FC236}">
+                        <a16:creationId xmlns:a16="http://schemas.microsoft.com/office/drawing/2014/main" id="{AA47B3C0-1501-4395-86A8-9425103A3782}"/>
+                      </a:ext>
+                    </a:extLst>
+                  </p:cNvPr>
+                  <p:cNvCxnSpPr/>
+                  <p:nvPr/>
+                </p:nvCxnSpPr>
+                <p:spPr>
+                  <a:xfrm>
+                    <a:off x="1154588" y="4830448"/>
+                    <a:ext cx="2536723" cy="0"/>
+                  </a:xfrm>
+                  <a:prstGeom prst="line">
+                    <a:avLst/>
+                  </a:prstGeom>
+                </p:spPr>
+                <p:style>
+                  <a:lnRef idx="1">
+                    <a:schemeClr val="accent1"/>
+                  </a:lnRef>
+                  <a:fillRef idx="0">
+                    <a:schemeClr val="accent1"/>
+                  </a:fillRef>
+                  <a:effectRef idx="0">
+                    <a:schemeClr val="accent1"/>
+                  </a:effectRef>
+                  <a:fontRef idx="minor">
+                    <a:schemeClr val="tx1"/>
+                  </a:fontRef>
+                </p:style>
+              </p:cxnSp>
+            </p:grpSp>
+            <p:sp>
+              <p:nvSpPr>
+                <p:cNvPr id="44" name="TextBox 43">
+                  <a:extLst>
+                    <a:ext uri="{FF2B5EF4-FFF2-40B4-BE49-F238E27FC236}">
+                      <a16:creationId xmlns:a16="http://schemas.microsoft.com/office/drawing/2014/main" id="{D8611C1F-1542-4DF9-BA84-0717A9A5A2A8}"/>
+                    </a:ext>
+                  </a:extLst>
+                </p:cNvPr>
+                <p:cNvSpPr txBox="1"/>
+                <p:nvPr/>
+              </p:nvSpPr>
+              <p:spPr>
+                <a:xfrm>
+                  <a:off x="5911996" y="3655300"/>
+                  <a:ext cx="516922" cy="738664"/>
+                </a:xfrm>
+                <a:prstGeom prst="rect">
+                  <a:avLst/>
+                </a:prstGeom>
+                <a:noFill/>
+              </p:spPr>
+              <p:txBody>
+                <a:bodyPr wrap="square" rtlCol="0">
+                  <a:spAutoFit/>
+                </a:bodyPr>
+                <a:lstStyle/>
+                <a:p>
+                  <a:r>
+                    <a:rPr lang="en-US" sz="1400" dirty="0"/>
+                    <a:t>-1</a:t>
+                  </a:r>
+                </a:p>
+                <a:p>
+                  <a:r>
+                    <a:rPr lang="en-US" sz="1400" dirty="0"/>
+                    <a:t>-2</a:t>
+                  </a:r>
+                </a:p>
+                <a:p>
+                  <a:r>
+                    <a:rPr lang="en-US" sz="1400" dirty="0"/>
+                    <a:t>-3</a:t>
+                  </a:r>
+                </a:p>
+              </p:txBody>
+            </p:sp>
+          </p:grpSp>
+          <p:sp>
+            <p:nvSpPr>
+              <p:cNvPr id="42" name="TextBox 41">
+                <a:extLst>
+                  <a:ext uri="{FF2B5EF4-FFF2-40B4-BE49-F238E27FC236}">
+                    <a16:creationId xmlns:a16="http://schemas.microsoft.com/office/drawing/2014/main" id="{7E69A1F4-9485-4233-BE28-19347ACB5E1C}"/>
+                  </a:ext>
+                </a:extLst>
+              </p:cNvPr>
+              <p:cNvSpPr txBox="1"/>
+              <p:nvPr/>
+            </p:nvSpPr>
+            <p:spPr>
+              <a:xfrm rot="20169058">
+                <a:off x="9915141" y="2830991"/>
+                <a:ext cx="773021" cy="369332"/>
+              </a:xfrm>
+              <a:prstGeom prst="rect">
+                <a:avLst/>
+              </a:prstGeom>
+              <a:noFill/>
+            </p:spPr>
+            <p:txBody>
+              <a:bodyPr wrap="square" rtlCol="0">
+                <a:spAutoFit/>
+              </a:bodyPr>
+              <a:lstStyle/>
+              <a:p>
+                <a:r>
+                  <a:rPr lang="en-US" dirty="0"/>
+                  <a:t>End</a:t>
+                </a:r>
+              </a:p>
+            </p:txBody>
+          </p:sp>
+          <p:sp>
+            <p:nvSpPr>
+              <p:cNvPr id="50" name="Rectangle 49">
+                <a:extLst>
+                  <a:ext uri="{FF2B5EF4-FFF2-40B4-BE49-F238E27FC236}">
+                    <a16:creationId xmlns:a16="http://schemas.microsoft.com/office/drawing/2014/main" id="{BD13DA5E-36C7-4639-A07F-577BCB536B91}"/>
+                  </a:ext>
+                </a:extLst>
+              </p:cNvPr>
+              <p:cNvSpPr/>
+              <p:nvPr/>
+            </p:nvSpPr>
+            <p:spPr>
+              <a:xfrm rot="20435386">
+                <a:off x="7396556" y="3091430"/>
+                <a:ext cx="2508429" cy="442505"/>
+              </a:xfrm>
+              <a:prstGeom prst="rect">
+                <a:avLst/>
+              </a:prstGeom>
+              <a:solidFill>
+                <a:schemeClr val="accent4">
+                  <a:lumMod val="60000"/>
+                  <a:lumOff val="40000"/>
+                </a:schemeClr>
+              </a:solidFill>
+              <a:ln>
+                <a:noFill/>
+              </a:ln>
+            </p:spPr>
+            <p:style>
+              <a:lnRef idx="2">
+                <a:schemeClr val="accent1">
+                  <a:shade val="50000"/>
+                </a:schemeClr>
+              </a:lnRef>
+              <a:fillRef idx="1">
+                <a:schemeClr val="accent1"/>
+              </a:fillRef>
+              <a:effectRef idx="0">
+                <a:schemeClr val="accent1"/>
+              </a:effectRef>
+              <a:fontRef idx="minor">
+                <a:schemeClr val="lt1"/>
+              </a:fontRef>
+            </p:style>
+            <p:txBody>
+              <a:bodyPr rtlCol="0" anchor="ctr"/>
+              <a:lstStyle/>
+              <a:p>
+                <a:pPr algn="ctr"/>
+                <a:r>
+                  <a:rPr lang="en-US" dirty="0"/>
+                  <a:t>L</a:t>
+                </a:r>
+              </a:p>
+            </p:txBody>
+          </p:sp>
+        </p:grpSp>
+        <p:sp>
+          <p:nvSpPr>
+            <p:cNvPr id="64" name="Arrow: Right 63">
+              <a:extLst>
+                <a:ext uri="{FF2B5EF4-FFF2-40B4-BE49-F238E27FC236}">
+                  <a16:creationId xmlns:a16="http://schemas.microsoft.com/office/drawing/2014/main" id="{B6AD17E1-06C7-4619-A824-4A635FA58F11}"/>
+                </a:ext>
+              </a:extLst>
+            </p:cNvPr>
+            <p:cNvSpPr/>
+            <p:nvPr/>
+          </p:nvSpPr>
+          <p:spPr>
+            <a:xfrm rot="20391773">
+              <a:off x="8514354" y="3833334"/>
+              <a:ext cx="899448" cy="150354"/>
+            </a:xfrm>
+            <a:prstGeom prst="rightArrow">
+              <a:avLst/>
+            </a:prstGeom>
+            <a:ln>
+              <a:noFill/>
+            </a:ln>
+          </p:spPr>
+          <p:style>
+            <a:lnRef idx="2">
+              <a:schemeClr val="accent1">
+                <a:shade val="50000"/>
+              </a:schemeClr>
+            </a:lnRef>
+            <a:fillRef idx="1">
+              <a:schemeClr val="accent1"/>
+            </a:fillRef>
+            <a:effectRef idx="0">
+              <a:schemeClr val="accent1"/>
+            </a:effectRef>
+            <a:fontRef idx="minor">
+              <a:schemeClr val="lt1"/>
+            </a:fontRef>
+          </p:style>
+          <p:txBody>
+            <a:bodyPr rtlCol="0" anchor="ctr"/>
+            <a:lstStyle/>
+            <a:p>
+              <a:pPr algn="ctr"/>
+              <a:endParaRPr lang="en-US"/>
+            </a:p>
+          </p:txBody>
+        </p:sp>
+        <p:sp>
+          <p:nvSpPr>
+            <p:cNvPr id="65" name="Arrow: Right 64">
+              <a:extLst>
+                <a:ext uri="{FF2B5EF4-FFF2-40B4-BE49-F238E27FC236}">
+                  <a16:creationId xmlns:a16="http://schemas.microsoft.com/office/drawing/2014/main" id="{C4DEDDED-BF5E-41B2-B00E-9FE2E5981860}"/>
+                </a:ext>
+              </a:extLst>
+            </p:cNvPr>
+            <p:cNvSpPr/>
+            <p:nvPr/>
+          </p:nvSpPr>
+          <p:spPr>
+            <a:xfrm rot="9585822">
+              <a:off x="7669761" y="3436114"/>
+              <a:ext cx="899448" cy="150354"/>
+            </a:xfrm>
+            <a:prstGeom prst="rightArrow">
+              <a:avLst/>
+            </a:prstGeom>
+            <a:solidFill>
+              <a:schemeClr val="bg1"/>
+            </a:solidFill>
+            <a:ln>
+              <a:noFill/>
+            </a:ln>
+          </p:spPr>
+          <p:style>
+            <a:lnRef idx="2">
+              <a:schemeClr val="accent1">
+                <a:shade val="50000"/>
+              </a:schemeClr>
+            </a:lnRef>
+            <a:fillRef idx="1">
+              <a:schemeClr val="accent1"/>
+            </a:fillRef>
+            <a:effectRef idx="0">
+              <a:schemeClr val="accent1"/>
+            </a:effectRef>
+            <a:fontRef idx="minor">
+              <a:schemeClr val="lt1"/>
+            </a:fontRef>
+          </p:style>
+          <p:txBody>
+            <a:bodyPr rtlCol="0" anchor="ctr"/>
+            <a:lstStyle/>
+            <a:p>
+              <a:pPr algn="ctr"/>
+              <a:endParaRPr lang="en-US"/>
+            </a:p>
+          </p:txBody>
+        </p:sp>
+      </p:grpSp>
+      <p:grpSp>
+        <p:nvGrpSpPr>
+          <p:cNvPr id="85" name="Group 84">
+            <a:extLst>
+              <a:ext uri="{FF2B5EF4-FFF2-40B4-BE49-F238E27FC236}">
+                <a16:creationId xmlns:a16="http://schemas.microsoft.com/office/drawing/2014/main" id="{8F44F24E-B078-48B3-8A46-C3C9C82368B3}"/>
+              </a:ext>
+            </a:extLst>
+          </p:cNvPr>
+          <p:cNvGrpSpPr/>
+          <p:nvPr/>
+        </p:nvGrpSpPr>
+        <p:grpSpPr>
+          <a:xfrm>
+            <a:off x="717300" y="4841967"/>
+            <a:ext cx="4150097" cy="1285087"/>
+            <a:chOff x="451689" y="3605349"/>
+            <a:chExt cx="4150097" cy="1285087"/>
+          </a:xfrm>
+        </p:grpSpPr>
+        <p:sp>
+          <p:nvSpPr>
+            <p:cNvPr id="63" name="Arrow: Right 62">
+              <a:extLst>
+                <a:ext uri="{FF2B5EF4-FFF2-40B4-BE49-F238E27FC236}">
+                  <a16:creationId xmlns:a16="http://schemas.microsoft.com/office/drawing/2014/main" id="{46777022-DC7D-462A-8309-C7A42F1B6AE9}"/>
+                </a:ext>
+              </a:extLst>
+            </p:cNvPr>
+            <p:cNvSpPr/>
+            <p:nvPr/>
+          </p:nvSpPr>
+          <p:spPr>
+            <a:xfrm>
+              <a:off x="1933447" y="4447942"/>
+              <a:ext cx="899448" cy="150354"/>
+            </a:xfrm>
+            <a:prstGeom prst="rightArrow">
+              <a:avLst/>
+            </a:prstGeom>
+            <a:ln>
+              <a:noFill/>
+            </a:ln>
+          </p:spPr>
+          <p:style>
+            <a:lnRef idx="2">
+              <a:schemeClr val="accent1">
+                <a:shade val="50000"/>
+              </a:schemeClr>
+            </a:lnRef>
+            <a:fillRef idx="1">
+              <a:schemeClr val="accent1"/>
+            </a:fillRef>
+            <a:effectRef idx="0">
+              <a:schemeClr val="accent1"/>
+            </a:effectRef>
+            <a:fontRef idx="minor">
+              <a:schemeClr val="lt1"/>
+            </a:fontRef>
+          </p:style>
+          <p:txBody>
+            <a:bodyPr rtlCol="0" anchor="ctr"/>
+            <a:lstStyle/>
+            <a:p>
+              <a:pPr algn="ctr"/>
+              <a:endParaRPr lang="en-US"/>
+            </a:p>
+          </p:txBody>
+        </p:sp>
+        <p:grpSp>
+          <p:nvGrpSpPr>
+            <p:cNvPr id="4" name="Group 3">
+              <a:extLst>
+                <a:ext uri="{FF2B5EF4-FFF2-40B4-BE49-F238E27FC236}">
+                  <a16:creationId xmlns:a16="http://schemas.microsoft.com/office/drawing/2014/main" id="{5AA354EB-6867-459D-9F4E-891CB5792A87}"/>
+                </a:ext>
+              </a:extLst>
+            </p:cNvPr>
+            <p:cNvGrpSpPr/>
+            <p:nvPr/>
+          </p:nvGrpSpPr>
+          <p:grpSpPr>
+            <a:xfrm>
+              <a:off x="1174487" y="4186084"/>
+              <a:ext cx="2540937" cy="654548"/>
+              <a:chOff x="1150374" y="4175900"/>
+              <a:chExt cx="2540937" cy="654548"/>
+            </a:xfrm>
+          </p:grpSpPr>
+          <p:cxnSp>
+            <p:nvCxnSpPr>
+              <p:cNvPr id="5" name="Straight Connector 4">
+                <a:extLst>
+                  <a:ext uri="{FF2B5EF4-FFF2-40B4-BE49-F238E27FC236}">
+                    <a16:creationId xmlns:a16="http://schemas.microsoft.com/office/drawing/2014/main" id="{95068124-8403-492B-996D-DDC464CF546E}"/>
+                  </a:ext>
+                </a:extLst>
+              </p:cNvPr>
+              <p:cNvCxnSpPr/>
+              <p:nvPr/>
+            </p:nvCxnSpPr>
+            <p:spPr>
+              <a:xfrm>
+                <a:off x="1150374" y="4175900"/>
+                <a:ext cx="2532509" cy="0"/>
+              </a:xfrm>
+              <a:prstGeom prst="line">
+                <a:avLst/>
+              </a:prstGeom>
+              <a:ln>
+                <a:solidFill>
+                  <a:schemeClr val="accent2"/>
+                </a:solidFill>
+              </a:ln>
+            </p:spPr>
+            <p:style>
+              <a:lnRef idx="3">
+                <a:schemeClr val="dk1"/>
+              </a:lnRef>
+              <a:fillRef idx="0">
+                <a:schemeClr val="dk1"/>
+              </a:fillRef>
+              <a:effectRef idx="2">
+                <a:schemeClr val="dk1"/>
+              </a:effectRef>
+              <a:fontRef idx="minor">
+                <a:schemeClr val="tx1"/>
+              </a:fontRef>
+            </p:style>
+          </p:cxnSp>
+          <p:cxnSp>
+            <p:nvCxnSpPr>
+              <p:cNvPr id="6" name="Straight Connector 5">
+                <a:extLst>
+                  <a:ext uri="{FF2B5EF4-FFF2-40B4-BE49-F238E27FC236}">
+                    <a16:creationId xmlns:a16="http://schemas.microsoft.com/office/drawing/2014/main" id="{71CBD769-10FF-47AA-95B3-1BE3CF7818A4}"/>
+                  </a:ext>
+                </a:extLst>
+              </p:cNvPr>
+              <p:cNvCxnSpPr/>
+              <p:nvPr/>
+            </p:nvCxnSpPr>
+            <p:spPr>
+              <a:xfrm>
+                <a:off x="1154588" y="4403447"/>
+                <a:ext cx="2536723" cy="0"/>
+              </a:xfrm>
+              <a:prstGeom prst="line">
+                <a:avLst/>
+              </a:prstGeom>
+            </p:spPr>
+            <p:style>
+              <a:lnRef idx="1">
+                <a:schemeClr val="accent1"/>
+              </a:lnRef>
+              <a:fillRef idx="0">
+                <a:schemeClr val="accent1"/>
+              </a:fillRef>
+              <a:effectRef idx="0">
+                <a:schemeClr val="accent1"/>
+              </a:effectRef>
+              <a:fontRef idx="minor">
+                <a:schemeClr val="tx1"/>
+              </a:fontRef>
+            </p:style>
+          </p:cxnSp>
+          <p:cxnSp>
+            <p:nvCxnSpPr>
+              <p:cNvPr id="7" name="Straight Connector 6">
+                <a:extLst>
+                  <a:ext uri="{FF2B5EF4-FFF2-40B4-BE49-F238E27FC236}">
+                    <a16:creationId xmlns:a16="http://schemas.microsoft.com/office/drawing/2014/main" id="{93BCD143-7353-4B50-89B0-C04D8AA5F02C}"/>
+                  </a:ext>
+                </a:extLst>
+              </p:cNvPr>
+              <p:cNvCxnSpPr/>
+              <p:nvPr/>
+            </p:nvCxnSpPr>
+            <p:spPr>
+              <a:xfrm>
+                <a:off x="1154588" y="4619054"/>
+                <a:ext cx="2536723" cy="0"/>
+              </a:xfrm>
+              <a:prstGeom prst="line">
+                <a:avLst/>
+              </a:prstGeom>
+            </p:spPr>
+            <p:style>
+              <a:lnRef idx="1">
+                <a:schemeClr val="accent1"/>
+              </a:lnRef>
+              <a:fillRef idx="0">
+                <a:schemeClr val="accent1"/>
+              </a:fillRef>
+              <a:effectRef idx="0">
+                <a:schemeClr val="accent1"/>
+              </a:effectRef>
+              <a:fontRef idx="minor">
+                <a:schemeClr val="tx1"/>
+              </a:fontRef>
+            </p:style>
+          </p:cxnSp>
+          <p:cxnSp>
+            <p:nvCxnSpPr>
+              <p:cNvPr id="8" name="Straight Connector 7">
+                <a:extLst>
+                  <a:ext uri="{FF2B5EF4-FFF2-40B4-BE49-F238E27FC236}">
+                    <a16:creationId xmlns:a16="http://schemas.microsoft.com/office/drawing/2014/main" id="{0FC97A25-B00D-4D17-ADAB-91334F2C3DFD}"/>
+                  </a:ext>
+                </a:extLst>
+              </p:cNvPr>
+              <p:cNvCxnSpPr/>
+              <p:nvPr/>
+            </p:nvCxnSpPr>
+            <p:spPr>
+              <a:xfrm>
+                <a:off x="1154588" y="4830448"/>
+                <a:ext cx="2536723" cy="0"/>
+              </a:xfrm>
+              <a:prstGeom prst="line">
+                <a:avLst/>
+              </a:prstGeom>
+            </p:spPr>
+            <p:style>
+              <a:lnRef idx="1">
+                <a:schemeClr val="accent1"/>
+              </a:lnRef>
+              <a:fillRef idx="0">
+                <a:schemeClr val="accent1"/>
+              </a:fillRef>
+              <a:effectRef idx="0">
+                <a:schemeClr val="accent1"/>
+              </a:effectRef>
+              <a:fontRef idx="minor">
+                <a:schemeClr val="tx1"/>
+              </a:fontRef>
+            </p:style>
+          </p:cxnSp>
+        </p:grpSp>
+        <p:sp>
+          <p:nvSpPr>
+            <p:cNvPr id="9" name="Rectangle 8">
+              <a:extLst>
+                <a:ext uri="{FF2B5EF4-FFF2-40B4-BE49-F238E27FC236}">
+                  <a16:creationId xmlns:a16="http://schemas.microsoft.com/office/drawing/2014/main" id="{30845118-2AD2-4FB3-BF03-53210CB3424F}"/>
+                </a:ext>
+              </a:extLst>
+            </p:cNvPr>
+            <p:cNvSpPr/>
+            <p:nvPr/>
+          </p:nvSpPr>
+          <p:spPr>
+            <a:xfrm>
+              <a:off x="1174487" y="3605349"/>
+              <a:ext cx="2508429" cy="442505"/>
+            </a:xfrm>
+            <a:prstGeom prst="rect">
+              <a:avLst/>
+            </a:prstGeom>
+            <a:solidFill>
+              <a:schemeClr val="accent4">
+                <a:lumMod val="60000"/>
+                <a:lumOff val="40000"/>
+              </a:schemeClr>
+            </a:solidFill>
+            <a:ln>
+              <a:noFill/>
+            </a:ln>
+          </p:spPr>
+          <p:style>
+            <a:lnRef idx="2">
+              <a:schemeClr val="accent1">
+                <a:shade val="50000"/>
+              </a:schemeClr>
+            </a:lnRef>
+            <a:fillRef idx="1">
+              <a:schemeClr val="accent1"/>
+            </a:fillRef>
+            <a:effectRef idx="0">
+              <a:schemeClr val="accent1"/>
+            </a:effectRef>
+            <a:fontRef idx="minor">
+              <a:schemeClr val="lt1"/>
+            </a:fontRef>
+          </p:style>
+          <p:txBody>
+            <a:bodyPr rtlCol="0" anchor="ctr"/>
+            <a:lstStyle/>
+            <a:p>
+              <a:pPr algn="ctr"/>
+              <a:r>
+                <a:rPr lang="en-US" dirty="0"/>
+                <a:t>L</a:t>
+              </a:r>
+            </a:p>
+          </p:txBody>
+        </p:sp>
+        <p:sp>
+          <p:nvSpPr>
+            <p:cNvPr id="10" name="TextBox 9">
+              <a:extLst>
+                <a:ext uri="{FF2B5EF4-FFF2-40B4-BE49-F238E27FC236}">
+                  <a16:creationId xmlns:a16="http://schemas.microsoft.com/office/drawing/2014/main" id="{D6E3B139-0EEA-4E42-853C-4D40BF4A99EC}"/>
+                </a:ext>
+              </a:extLst>
+            </p:cNvPr>
+            <p:cNvSpPr txBox="1"/>
+            <p:nvPr/>
+          </p:nvSpPr>
+          <p:spPr>
+            <a:xfrm>
+              <a:off x="451689" y="4047854"/>
+              <a:ext cx="773021" cy="369332"/>
+            </a:xfrm>
+            <a:prstGeom prst="rect">
+              <a:avLst/>
+            </a:prstGeom>
+            <a:noFill/>
+          </p:spPr>
+          <p:txBody>
+            <a:bodyPr wrap="square" rtlCol="0">
+              <a:spAutoFit/>
+            </a:bodyPr>
+            <a:lstStyle/>
+            <a:p>
+              <a:r>
+                <a:rPr lang="en-US" dirty="0"/>
+                <a:t>Start</a:t>
+              </a:r>
+            </a:p>
+          </p:txBody>
+        </p:sp>
+        <p:sp>
+          <p:nvSpPr>
+            <p:cNvPr id="11" name="TextBox 10">
+              <a:extLst>
+                <a:ext uri="{FF2B5EF4-FFF2-40B4-BE49-F238E27FC236}">
+                  <a16:creationId xmlns:a16="http://schemas.microsoft.com/office/drawing/2014/main" id="{457CFC83-B323-4FC5-B86B-01547B91557B}"/>
+                </a:ext>
+              </a:extLst>
+            </p:cNvPr>
+            <p:cNvSpPr txBox="1"/>
+            <p:nvPr/>
+          </p:nvSpPr>
+          <p:spPr>
+            <a:xfrm>
+              <a:off x="3828765" y="4001418"/>
+              <a:ext cx="773021" cy="369332"/>
+            </a:xfrm>
+            <a:prstGeom prst="rect">
+              <a:avLst/>
+            </a:prstGeom>
+            <a:noFill/>
+          </p:spPr>
+          <p:txBody>
+            <a:bodyPr wrap="square" rtlCol="0">
+              <a:spAutoFit/>
+            </a:bodyPr>
+            <a:lstStyle/>
+            <a:p>
+              <a:r>
+                <a:rPr lang="en-US" dirty="0"/>
+                <a:t>End</a:t>
+              </a:r>
+            </a:p>
+          </p:txBody>
+        </p:sp>
+        <p:sp>
+          <p:nvSpPr>
+            <p:cNvPr id="21" name="TextBox 20">
+              <a:extLst>
+                <a:ext uri="{FF2B5EF4-FFF2-40B4-BE49-F238E27FC236}">
+                  <a16:creationId xmlns:a16="http://schemas.microsoft.com/office/drawing/2014/main" id="{383FFAB3-B4B1-4848-8990-FCEA37B6DF0F}"/>
+                </a:ext>
+              </a:extLst>
+            </p:cNvPr>
+            <p:cNvSpPr txBox="1"/>
+            <p:nvPr/>
+          </p:nvSpPr>
+          <p:spPr>
+            <a:xfrm>
+              <a:off x="3228069" y="4151772"/>
+              <a:ext cx="516922" cy="738664"/>
+            </a:xfrm>
+            <a:prstGeom prst="rect">
+              <a:avLst/>
+            </a:prstGeom>
+            <a:noFill/>
+          </p:spPr>
+          <p:txBody>
+            <a:bodyPr wrap="square" rtlCol="0">
+              <a:spAutoFit/>
+            </a:bodyPr>
+            <a:lstStyle/>
+            <a:p>
+              <a:r>
+                <a:rPr lang="en-US" sz="1400" dirty="0"/>
+                <a:t>-1</a:t>
+              </a:r>
+            </a:p>
+            <a:p>
+              <a:r>
+                <a:rPr lang="en-US" sz="1400" dirty="0"/>
+                <a:t>-2</a:t>
+              </a:r>
+            </a:p>
+            <a:p>
+              <a:r>
+                <a:rPr lang="en-US" sz="1400" dirty="0"/>
+                <a:t>-3</a:t>
+              </a:r>
+            </a:p>
+          </p:txBody>
+        </p:sp>
+        <p:sp>
+          <p:nvSpPr>
+            <p:cNvPr id="66" name="Arrow: Right 65">
+              <a:extLst>
+                <a:ext uri="{FF2B5EF4-FFF2-40B4-BE49-F238E27FC236}">
+                  <a16:creationId xmlns:a16="http://schemas.microsoft.com/office/drawing/2014/main" id="{25DA572B-67BA-4A7C-AF58-2E6EC911EE5D}"/>
+                </a:ext>
+              </a:extLst>
+            </p:cNvPr>
+            <p:cNvSpPr/>
+            <p:nvPr/>
+          </p:nvSpPr>
+          <p:spPr>
+            <a:xfrm rot="10800000">
+              <a:off x="1481373" y="3757039"/>
+              <a:ext cx="899448" cy="150354"/>
+            </a:xfrm>
+            <a:prstGeom prst="rightArrow">
+              <a:avLst/>
+            </a:prstGeom>
+            <a:solidFill>
+              <a:schemeClr val="bg1"/>
+            </a:solidFill>
+            <a:ln>
+              <a:noFill/>
+            </a:ln>
+          </p:spPr>
+          <p:style>
+            <a:lnRef idx="2">
+              <a:schemeClr val="accent1">
+                <a:shade val="50000"/>
+              </a:schemeClr>
+            </a:lnRef>
+            <a:fillRef idx="1">
+              <a:schemeClr val="accent1"/>
+            </a:fillRef>
+            <a:effectRef idx="0">
+              <a:schemeClr val="accent1"/>
+            </a:effectRef>
+            <a:fontRef idx="minor">
+              <a:schemeClr val="lt1"/>
+            </a:fontRef>
+          </p:style>
+          <p:txBody>
+            <a:bodyPr rtlCol="0" anchor="ctr"/>
+            <a:lstStyle/>
+            <a:p>
+              <a:pPr algn="ctr"/>
+              <a:endParaRPr lang="en-US"/>
+            </a:p>
+          </p:txBody>
+        </p:sp>
+      </p:grpSp>
+      <p:grpSp>
+        <p:nvGrpSpPr>
+          <p:cNvPr id="68" name="Group 67">
+            <a:extLst>
+              <a:ext uri="{FF2B5EF4-FFF2-40B4-BE49-F238E27FC236}">
+                <a16:creationId xmlns:a16="http://schemas.microsoft.com/office/drawing/2014/main" id="{81EF8BC6-F566-4650-94E9-F3C55C972E21}"/>
+              </a:ext>
+            </a:extLst>
+          </p:cNvPr>
+          <p:cNvGrpSpPr/>
+          <p:nvPr/>
+        </p:nvGrpSpPr>
+        <p:grpSpPr>
+          <a:xfrm rot="18000000">
+            <a:off x="4444907" y="2267583"/>
+            <a:ext cx="3734602" cy="1798247"/>
+            <a:chOff x="6953560" y="2830991"/>
+            <a:chExt cx="3734602" cy="1798247"/>
+          </a:xfrm>
+        </p:grpSpPr>
+        <p:grpSp>
+          <p:nvGrpSpPr>
+            <p:cNvPr id="69" name="Group 68">
+              <a:extLst>
+                <a:ext uri="{FF2B5EF4-FFF2-40B4-BE49-F238E27FC236}">
+                  <a16:creationId xmlns:a16="http://schemas.microsoft.com/office/drawing/2014/main" id="{DEC92819-6FAF-4A7F-9A98-1A8F1380F4C2}"/>
+                </a:ext>
+              </a:extLst>
+            </p:cNvPr>
+            <p:cNvGrpSpPr/>
+            <p:nvPr/>
+          </p:nvGrpSpPr>
+          <p:grpSpPr>
+            <a:xfrm>
+              <a:off x="6953560" y="2830991"/>
+              <a:ext cx="3734602" cy="1798247"/>
+              <a:chOff x="6953560" y="2830991"/>
+              <a:chExt cx="3734602" cy="1798247"/>
+            </a:xfrm>
+          </p:grpSpPr>
+          <p:sp>
+            <p:nvSpPr>
+              <p:cNvPr id="72" name="TextBox 71">
+                <a:extLst>
+                  <a:ext uri="{FF2B5EF4-FFF2-40B4-BE49-F238E27FC236}">
+                    <a16:creationId xmlns:a16="http://schemas.microsoft.com/office/drawing/2014/main" id="{C2498B59-0404-40BA-B499-1509E037AA2E}"/>
+                  </a:ext>
+                </a:extLst>
+              </p:cNvPr>
+              <p:cNvSpPr txBox="1"/>
+              <p:nvPr/>
+            </p:nvSpPr>
+            <p:spPr>
+              <a:xfrm rot="20403980">
+                <a:off x="6953560" y="3929210"/>
+                <a:ext cx="773021" cy="369332"/>
+              </a:xfrm>
+              <a:prstGeom prst="rect">
+                <a:avLst/>
+              </a:prstGeom>
+              <a:noFill/>
+            </p:spPr>
+            <p:txBody>
+              <a:bodyPr wrap="square" rtlCol="0">
+                <a:spAutoFit/>
+              </a:bodyPr>
+              <a:lstStyle/>
+              <a:p>
+                <a:r>
+                  <a:rPr lang="en-US" dirty="0"/>
+                  <a:t>Start</a:t>
+                </a:r>
+              </a:p>
+            </p:txBody>
+          </p:sp>
+          <p:grpSp>
+            <p:nvGrpSpPr>
+              <p:cNvPr id="73" name="Group 72">
+                <a:extLst>
+                  <a:ext uri="{FF2B5EF4-FFF2-40B4-BE49-F238E27FC236}">
+                    <a16:creationId xmlns:a16="http://schemas.microsoft.com/office/drawing/2014/main" id="{81E38EBA-CC78-492A-B2BB-867316B7ED62}"/>
+                  </a:ext>
+                </a:extLst>
+              </p:cNvPr>
+              <p:cNvGrpSpPr/>
+              <p:nvPr/>
+            </p:nvGrpSpPr>
+            <p:grpSpPr>
+              <a:xfrm>
+                <a:off x="7616505" y="3599209"/>
+                <a:ext cx="2540937" cy="1030029"/>
+                <a:chOff x="5731897" y="3363935"/>
+                <a:chExt cx="2540937" cy="1030029"/>
+              </a:xfrm>
+            </p:grpSpPr>
+            <p:grpSp>
+              <p:nvGrpSpPr>
+                <p:cNvPr id="76" name="Group 75">
+                  <a:extLst>
+                    <a:ext uri="{FF2B5EF4-FFF2-40B4-BE49-F238E27FC236}">
+                      <a16:creationId xmlns:a16="http://schemas.microsoft.com/office/drawing/2014/main" id="{E3F95322-69E5-45F5-B36F-9BF68CFCF13E}"/>
+                    </a:ext>
+                  </a:extLst>
+                </p:cNvPr>
+                <p:cNvGrpSpPr/>
+                <p:nvPr/>
+              </p:nvGrpSpPr>
+              <p:grpSpPr>
+                <a:xfrm rot="20412698">
+                  <a:off x="5731897" y="3363935"/>
+                  <a:ext cx="2540937" cy="654548"/>
+                  <a:chOff x="1150374" y="4175900"/>
+                  <a:chExt cx="2540937" cy="654548"/>
+                </a:xfrm>
+              </p:grpSpPr>
+              <p:cxnSp>
+                <p:nvCxnSpPr>
+                  <p:cNvPr id="78" name="Straight Connector 77">
+                    <a:extLst>
+                      <a:ext uri="{FF2B5EF4-FFF2-40B4-BE49-F238E27FC236}">
+                        <a16:creationId xmlns:a16="http://schemas.microsoft.com/office/drawing/2014/main" id="{98662FA7-ED95-4C5A-AAD7-D7ECCE4902A5}"/>
+                      </a:ext>
+                    </a:extLst>
+                  </p:cNvPr>
+                  <p:cNvCxnSpPr/>
+                  <p:nvPr/>
+                </p:nvCxnSpPr>
+                <p:spPr>
+                  <a:xfrm>
+                    <a:off x="1150374" y="4175900"/>
+                    <a:ext cx="2532509" cy="0"/>
+                  </a:xfrm>
+                  <a:prstGeom prst="line">
+                    <a:avLst/>
+                  </a:prstGeom>
+                  <a:ln>
+                    <a:solidFill>
+                      <a:schemeClr val="accent2"/>
+                    </a:solidFill>
+                  </a:ln>
+                </p:spPr>
+                <p:style>
+                  <a:lnRef idx="3">
+                    <a:schemeClr val="dk1"/>
+                  </a:lnRef>
+                  <a:fillRef idx="0">
+                    <a:schemeClr val="dk1"/>
+                  </a:fillRef>
+                  <a:effectRef idx="2">
+                    <a:schemeClr val="dk1"/>
+                  </a:effectRef>
+                  <a:fontRef idx="minor">
+                    <a:schemeClr val="tx1"/>
+                  </a:fontRef>
+                </p:style>
+              </p:cxnSp>
+              <p:cxnSp>
+                <p:nvCxnSpPr>
+                  <p:cNvPr id="79" name="Straight Connector 78">
+                    <a:extLst>
+                      <a:ext uri="{FF2B5EF4-FFF2-40B4-BE49-F238E27FC236}">
+                        <a16:creationId xmlns:a16="http://schemas.microsoft.com/office/drawing/2014/main" id="{E17F5131-DB6B-495A-BDEA-FC4F67548A92}"/>
+                      </a:ext>
+                    </a:extLst>
+                  </p:cNvPr>
+                  <p:cNvCxnSpPr/>
+                  <p:nvPr/>
+                </p:nvCxnSpPr>
+                <p:spPr>
+                  <a:xfrm>
+                    <a:off x="1154588" y="4403447"/>
+                    <a:ext cx="2536723" cy="0"/>
+                  </a:xfrm>
+                  <a:prstGeom prst="line">
+                    <a:avLst/>
+                  </a:prstGeom>
+                </p:spPr>
+                <p:style>
+                  <a:lnRef idx="1">
+                    <a:schemeClr val="accent1"/>
+                  </a:lnRef>
+                  <a:fillRef idx="0">
+                    <a:schemeClr val="accent1"/>
+                  </a:fillRef>
+                  <a:effectRef idx="0">
+                    <a:schemeClr val="accent1"/>
+                  </a:effectRef>
+                  <a:fontRef idx="minor">
+                    <a:schemeClr val="tx1"/>
+                  </a:fontRef>
+                </p:style>
+              </p:cxnSp>
+              <p:cxnSp>
+                <p:nvCxnSpPr>
+                  <p:cNvPr id="80" name="Straight Connector 79">
+                    <a:extLst>
+                      <a:ext uri="{FF2B5EF4-FFF2-40B4-BE49-F238E27FC236}">
+                        <a16:creationId xmlns:a16="http://schemas.microsoft.com/office/drawing/2014/main" id="{6B50A54D-EB87-4903-99CD-9D40FF035B70}"/>
+                      </a:ext>
+                    </a:extLst>
+                  </p:cNvPr>
+                  <p:cNvCxnSpPr/>
+                  <p:nvPr/>
+                </p:nvCxnSpPr>
+                <p:spPr>
+                  <a:xfrm>
+                    <a:off x="1154588" y="4619054"/>
+                    <a:ext cx="2536723" cy="0"/>
+                  </a:xfrm>
+                  <a:prstGeom prst="line">
+                    <a:avLst/>
+                  </a:prstGeom>
+                </p:spPr>
+                <p:style>
+                  <a:lnRef idx="1">
+                    <a:schemeClr val="accent1"/>
+                  </a:lnRef>
+                  <a:fillRef idx="0">
+                    <a:schemeClr val="accent1"/>
+                  </a:fillRef>
+                  <a:effectRef idx="0">
+                    <a:schemeClr val="accent1"/>
+                  </a:effectRef>
+                  <a:fontRef idx="minor">
+                    <a:schemeClr val="tx1"/>
+                  </a:fontRef>
+                </p:style>
+              </p:cxnSp>
+              <p:cxnSp>
+                <p:nvCxnSpPr>
+                  <p:cNvPr id="81" name="Straight Connector 80">
+                    <a:extLst>
+                      <a:ext uri="{FF2B5EF4-FFF2-40B4-BE49-F238E27FC236}">
+                        <a16:creationId xmlns:a16="http://schemas.microsoft.com/office/drawing/2014/main" id="{ED708103-564B-4C28-B1BC-F82D9614E6C9}"/>
+                      </a:ext>
+                    </a:extLst>
+                  </p:cNvPr>
+                  <p:cNvCxnSpPr/>
+                  <p:nvPr/>
+                </p:nvCxnSpPr>
+                <p:spPr>
+                  <a:xfrm>
+                    <a:off x="1154588" y="4830448"/>
+                    <a:ext cx="2536723" cy="0"/>
+                  </a:xfrm>
+                  <a:prstGeom prst="line">
+                    <a:avLst/>
+                  </a:prstGeom>
+                </p:spPr>
+                <p:style>
+                  <a:lnRef idx="1">
+                    <a:schemeClr val="accent1"/>
+                  </a:lnRef>
+                  <a:fillRef idx="0">
+                    <a:schemeClr val="accent1"/>
+                  </a:fillRef>
+                  <a:effectRef idx="0">
+                    <a:schemeClr val="accent1"/>
+                  </a:effectRef>
+                  <a:fontRef idx="minor">
+                    <a:schemeClr val="tx1"/>
+                  </a:fontRef>
+                </p:style>
+              </p:cxnSp>
+            </p:grpSp>
+            <p:sp>
+              <p:nvSpPr>
+                <p:cNvPr id="77" name="TextBox 76">
+                  <a:extLst>
+                    <a:ext uri="{FF2B5EF4-FFF2-40B4-BE49-F238E27FC236}">
+                      <a16:creationId xmlns:a16="http://schemas.microsoft.com/office/drawing/2014/main" id="{45A9E78B-4B1A-4A11-BEFE-140A93ADFABD}"/>
+                    </a:ext>
+                  </a:extLst>
+                </p:cNvPr>
+                <p:cNvSpPr txBox="1"/>
+                <p:nvPr/>
+              </p:nvSpPr>
+              <p:spPr>
+                <a:xfrm>
+                  <a:off x="5911996" y="3655300"/>
+                  <a:ext cx="516922" cy="738664"/>
+                </a:xfrm>
+                <a:prstGeom prst="rect">
+                  <a:avLst/>
+                </a:prstGeom>
+                <a:noFill/>
+              </p:spPr>
+              <p:txBody>
+                <a:bodyPr wrap="square" rtlCol="0">
+                  <a:spAutoFit/>
+                </a:bodyPr>
+                <a:lstStyle/>
+                <a:p>
+                  <a:r>
+                    <a:rPr lang="en-US" sz="1400" dirty="0"/>
+                    <a:t>-1</a:t>
+                  </a:r>
+                </a:p>
+                <a:p>
+                  <a:r>
+                    <a:rPr lang="en-US" sz="1400" dirty="0"/>
+                    <a:t>-2</a:t>
+                  </a:r>
+                </a:p>
+                <a:p>
+                  <a:r>
+                    <a:rPr lang="en-US" sz="1400" dirty="0"/>
+                    <a:t>-3</a:t>
+                  </a:r>
+                </a:p>
+              </p:txBody>
+            </p:sp>
+          </p:grpSp>
+          <p:sp>
+            <p:nvSpPr>
+              <p:cNvPr id="74" name="TextBox 73">
+                <a:extLst>
+                  <a:ext uri="{FF2B5EF4-FFF2-40B4-BE49-F238E27FC236}">
+                    <a16:creationId xmlns:a16="http://schemas.microsoft.com/office/drawing/2014/main" id="{21A9C007-AD86-4337-AF7F-22FE85999BE0}"/>
+                  </a:ext>
+                </a:extLst>
+              </p:cNvPr>
+              <p:cNvSpPr txBox="1"/>
+              <p:nvPr/>
+            </p:nvSpPr>
+            <p:spPr>
+              <a:xfrm rot="20169058">
+                <a:off x="9915141" y="2830991"/>
+                <a:ext cx="773021" cy="369332"/>
+              </a:xfrm>
+              <a:prstGeom prst="rect">
+                <a:avLst/>
+              </a:prstGeom>
+              <a:noFill/>
+            </p:spPr>
+            <p:txBody>
+              <a:bodyPr wrap="square" rtlCol="0">
+                <a:spAutoFit/>
+              </a:bodyPr>
+              <a:lstStyle/>
+              <a:p>
+                <a:r>
+                  <a:rPr lang="en-US" dirty="0"/>
+                  <a:t>End</a:t>
+                </a:r>
+              </a:p>
+            </p:txBody>
+          </p:sp>
+          <p:sp>
+            <p:nvSpPr>
+              <p:cNvPr id="75" name="Rectangle 74">
+                <a:extLst>
+                  <a:ext uri="{FF2B5EF4-FFF2-40B4-BE49-F238E27FC236}">
+                    <a16:creationId xmlns:a16="http://schemas.microsoft.com/office/drawing/2014/main" id="{77896562-49D2-425E-A506-213B599214E5}"/>
+                  </a:ext>
+                </a:extLst>
+              </p:cNvPr>
+              <p:cNvSpPr/>
+              <p:nvPr/>
+            </p:nvSpPr>
+            <p:spPr>
+              <a:xfrm rot="20435386">
+                <a:off x="7396556" y="3091430"/>
+                <a:ext cx="2508429" cy="442505"/>
+              </a:xfrm>
+              <a:prstGeom prst="rect">
+                <a:avLst/>
+              </a:prstGeom>
+              <a:solidFill>
+                <a:schemeClr val="accent4">
+                  <a:lumMod val="60000"/>
+                  <a:lumOff val="40000"/>
+                </a:schemeClr>
+              </a:solidFill>
+              <a:ln>
+                <a:noFill/>
+              </a:ln>
+            </p:spPr>
+            <p:style>
+              <a:lnRef idx="2">
+                <a:schemeClr val="accent1">
+                  <a:shade val="50000"/>
+                </a:schemeClr>
+              </a:lnRef>
+              <a:fillRef idx="1">
+                <a:schemeClr val="accent1"/>
+              </a:fillRef>
+              <a:effectRef idx="0">
+                <a:schemeClr val="accent1"/>
+              </a:effectRef>
+              <a:fontRef idx="minor">
+                <a:schemeClr val="lt1"/>
+              </a:fontRef>
+            </p:style>
+            <p:txBody>
+              <a:bodyPr rtlCol="0" anchor="ctr"/>
+              <a:lstStyle/>
+              <a:p>
+                <a:pPr algn="ctr"/>
+                <a:r>
+                  <a:rPr lang="en-US" dirty="0"/>
+                  <a:t>L</a:t>
+                </a:r>
+              </a:p>
+            </p:txBody>
+          </p:sp>
+        </p:grpSp>
+        <p:sp>
+          <p:nvSpPr>
+            <p:cNvPr id="70" name="Arrow: Right 69">
+              <a:extLst>
+                <a:ext uri="{FF2B5EF4-FFF2-40B4-BE49-F238E27FC236}">
+                  <a16:creationId xmlns:a16="http://schemas.microsoft.com/office/drawing/2014/main" id="{61DAB066-E166-4028-BD93-53214729CA5C}"/>
+                </a:ext>
+              </a:extLst>
+            </p:cNvPr>
+            <p:cNvSpPr/>
+            <p:nvPr/>
+          </p:nvSpPr>
+          <p:spPr>
+            <a:xfrm rot="20391773">
+              <a:off x="8514354" y="3833334"/>
+              <a:ext cx="899448" cy="150354"/>
+            </a:xfrm>
+            <a:prstGeom prst="rightArrow">
+              <a:avLst/>
+            </a:prstGeom>
+            <a:ln>
+              <a:noFill/>
+            </a:ln>
+          </p:spPr>
+          <p:style>
+            <a:lnRef idx="2">
+              <a:schemeClr val="accent1">
+                <a:shade val="50000"/>
+              </a:schemeClr>
+            </a:lnRef>
+            <a:fillRef idx="1">
+              <a:schemeClr val="accent1"/>
+            </a:fillRef>
+            <a:effectRef idx="0">
+              <a:schemeClr val="accent1"/>
+            </a:effectRef>
+            <a:fontRef idx="minor">
+              <a:schemeClr val="lt1"/>
+            </a:fontRef>
+          </p:style>
+          <p:txBody>
+            <a:bodyPr rtlCol="0" anchor="ctr"/>
+            <a:lstStyle/>
+            <a:p>
+              <a:pPr algn="ctr"/>
+              <a:endParaRPr lang="en-US"/>
+            </a:p>
+          </p:txBody>
+        </p:sp>
+        <p:sp>
+          <p:nvSpPr>
+            <p:cNvPr id="71" name="Arrow: Right 70">
+              <a:extLst>
+                <a:ext uri="{FF2B5EF4-FFF2-40B4-BE49-F238E27FC236}">
+                  <a16:creationId xmlns:a16="http://schemas.microsoft.com/office/drawing/2014/main" id="{74CEC5C0-5340-45C5-B99C-5B6A1DFE5102}"/>
+                </a:ext>
+              </a:extLst>
+            </p:cNvPr>
+            <p:cNvSpPr/>
+            <p:nvPr/>
+          </p:nvSpPr>
+          <p:spPr>
+            <a:xfrm rot="9585822">
+              <a:off x="7669761" y="3436114"/>
+              <a:ext cx="899448" cy="150354"/>
+            </a:xfrm>
+            <a:prstGeom prst="rightArrow">
+              <a:avLst/>
+            </a:prstGeom>
+            <a:solidFill>
+              <a:schemeClr val="bg1"/>
+            </a:solidFill>
+            <a:ln>
+              <a:noFill/>
+            </a:ln>
+          </p:spPr>
+          <p:style>
+            <a:lnRef idx="2">
+              <a:schemeClr val="accent1">
+                <a:shade val="50000"/>
+              </a:schemeClr>
+            </a:lnRef>
+            <a:fillRef idx="1">
+              <a:schemeClr val="accent1"/>
+            </a:fillRef>
+            <a:effectRef idx="0">
+              <a:schemeClr val="accent1"/>
+            </a:effectRef>
+            <a:fontRef idx="minor">
+              <a:schemeClr val="lt1"/>
+            </a:fontRef>
+          </p:style>
+          <p:txBody>
+            <a:bodyPr rtlCol="0" anchor="ctr"/>
+            <a:lstStyle/>
+            <a:p>
+              <a:pPr algn="ctr"/>
+              <a:endParaRPr lang="en-US"/>
+            </a:p>
+          </p:txBody>
+        </p:sp>
+      </p:grpSp>
+      <p:sp>
+        <p:nvSpPr>
+          <p:cNvPr id="82" name="Freeform: Shape 81">
+            <a:extLst>
+              <a:ext uri="{FF2B5EF4-FFF2-40B4-BE49-F238E27FC236}">
+                <a16:creationId xmlns:a16="http://schemas.microsoft.com/office/drawing/2014/main" id="{EF3CE46C-3D27-448E-9ED5-FD9DF7CB3B0D}"/>
+              </a:ext>
+            </a:extLst>
+          </p:cNvPr>
+          <p:cNvSpPr/>
+          <p:nvPr/>
+        </p:nvSpPr>
+        <p:spPr>
+          <a:xfrm>
+            <a:off x="5566167" y="4368236"/>
+            <a:ext cx="2220991" cy="1278541"/>
+          </a:xfrm>
+          <a:custGeom>
+            <a:avLst/>
+            <a:gdLst>
+              <a:gd name="connsiteX0" fmla="*/ 28049 w 2220991"/>
+              <a:gd name="connsiteY0" fmla="*/ 0 h 1278541"/>
+              <a:gd name="connsiteX1" fmla="*/ 307225 w 2220991"/>
+              <a:gd name="connsiteY1" fmla="*/ 971044 h 1278541"/>
+              <a:gd name="connsiteX2" fmla="*/ 2220991 w 2220991"/>
+              <a:gd name="connsiteY2" fmla="*/ 1278541 h 1278541"/>
+            </a:gdLst>
+            <a:ahLst/>
+            <a:cxnLst>
+              <a:cxn ang="0">
+                <a:pos x="connsiteX0" y="connsiteY0"/>
+              </a:cxn>
+              <a:cxn ang="0">
+                <a:pos x="connsiteX1" y="connsiteY1"/>
+              </a:cxn>
+              <a:cxn ang="0">
+                <a:pos x="connsiteX2" y="connsiteY2"/>
+              </a:cxn>
+            </a:cxnLst>
+            <a:rect l="l" t="t" r="r" b="b"/>
+            <a:pathLst>
+              <a:path w="2220991" h="1278541">
+                <a:moveTo>
+                  <a:pt x="28049" y="0"/>
+                </a:moveTo>
+                <a:cubicBezTo>
+                  <a:pt x="-15108" y="378977"/>
+                  <a:pt x="-58265" y="757954"/>
+                  <a:pt x="307225" y="971044"/>
+                </a:cubicBezTo>
+                <a:cubicBezTo>
+                  <a:pt x="672715" y="1184134"/>
+                  <a:pt x="1903379" y="1238081"/>
+                  <a:pt x="2220991" y="1278541"/>
+                </a:cubicBezTo>
+              </a:path>
+            </a:pathLst>
+          </a:custGeom>
+          <a:ln w="28575">
+            <a:solidFill>
+              <a:schemeClr val="accent4">
+                <a:lumMod val="60000"/>
+                <a:lumOff val="40000"/>
+              </a:schemeClr>
+            </a:solidFill>
+            <a:tailEnd type="triangle"/>
+          </a:ln>
+        </p:spPr>
+        <p:style>
+          <a:lnRef idx="3">
+            <a:schemeClr val="accent4"/>
+          </a:lnRef>
+          <a:fillRef idx="0">
+            <a:schemeClr val="accent4"/>
+          </a:fillRef>
+          <a:effectRef idx="2">
+            <a:schemeClr val="accent4"/>
+          </a:effectRef>
+          <a:fontRef idx="minor">
+            <a:schemeClr val="tx1"/>
+          </a:fontRef>
+        </p:style>
+        <p:txBody>
+          <a:bodyPr rtlCol="0" anchor="ctr"/>
+          <a:lstStyle/>
+          <a:p>
+            <a:pPr algn="ctr"/>
+            <a:endParaRPr lang="en-US"/>
+          </a:p>
+        </p:txBody>
+      </p:sp>
+      <p:sp>
+        <p:nvSpPr>
+          <p:cNvPr id="83" name="Freeform: Shape 82">
+            <a:extLst>
+              <a:ext uri="{FF2B5EF4-FFF2-40B4-BE49-F238E27FC236}">
+                <a16:creationId xmlns:a16="http://schemas.microsoft.com/office/drawing/2014/main" id="{7D5ED777-AE79-4F1A-847E-CF87F663E010}"/>
+              </a:ext>
+            </a:extLst>
+          </p:cNvPr>
+          <p:cNvSpPr/>
+          <p:nvPr/>
+        </p:nvSpPr>
+        <p:spPr>
+          <a:xfrm>
+            <a:off x="4005942" y="5721532"/>
+            <a:ext cx="3762103" cy="326577"/>
+          </a:xfrm>
+          <a:custGeom>
+            <a:avLst/>
+            <a:gdLst>
+              <a:gd name="connsiteX0" fmla="*/ 0 w 3762103"/>
+              <a:gd name="connsiteY0" fmla="*/ 0 h 326577"/>
+              <a:gd name="connsiteX1" fmla="*/ 1933303 w 3762103"/>
+              <a:gd name="connsiteY1" fmla="*/ 326572 h 326577"/>
+              <a:gd name="connsiteX2" fmla="*/ 3762103 w 3762103"/>
+              <a:gd name="connsiteY2" fmla="*/ 8709 h 326577"/>
+            </a:gdLst>
+            <a:ahLst/>
+            <a:cxnLst>
+              <a:cxn ang="0">
+                <a:pos x="connsiteX0" y="connsiteY0"/>
+              </a:cxn>
+              <a:cxn ang="0">
+                <a:pos x="connsiteX1" y="connsiteY1"/>
+              </a:cxn>
+              <a:cxn ang="0">
+                <a:pos x="connsiteX2" y="connsiteY2"/>
+              </a:cxn>
+            </a:cxnLst>
+            <a:rect l="l" t="t" r="r" b="b"/>
+            <a:pathLst>
+              <a:path w="3762103" h="326577">
+                <a:moveTo>
+                  <a:pt x="0" y="0"/>
+                </a:moveTo>
+                <a:cubicBezTo>
+                  <a:pt x="653143" y="162560"/>
+                  <a:pt x="1306286" y="325121"/>
+                  <a:pt x="1933303" y="326572"/>
+                </a:cubicBezTo>
+                <a:cubicBezTo>
+                  <a:pt x="2560320" y="328023"/>
+                  <a:pt x="3455852" y="63863"/>
+                  <a:pt x="3762103" y="8709"/>
+                </a:cubicBezTo>
+              </a:path>
+            </a:pathLst>
+          </a:custGeom>
+          <a:noFill/>
+          <a:ln w="25400">
+            <a:tailEnd type="triangle"/>
+          </a:ln>
+        </p:spPr>
+        <p:style>
+          <a:lnRef idx="2">
+            <a:schemeClr val="accent1">
+              <a:shade val="50000"/>
+            </a:schemeClr>
+          </a:lnRef>
+          <a:fillRef idx="1">
+            <a:schemeClr val="accent1"/>
+          </a:fillRef>
+          <a:effectRef idx="0">
+            <a:schemeClr val="accent1"/>
+          </a:effectRef>
+          <a:fontRef idx="minor">
+            <a:schemeClr val="lt1"/>
+          </a:fontRef>
+        </p:style>
+        <p:txBody>
+          <a:bodyPr rtlCol="0" anchor="ctr"/>
+          <a:lstStyle/>
+          <a:p>
+            <a:pPr algn="ctr"/>
+            <a:endParaRPr lang="en-US"/>
+          </a:p>
+        </p:txBody>
+      </p:sp>
+      <p:sp>
+        <p:nvSpPr>
+          <p:cNvPr id="84" name="TextBox 83">
+            <a:extLst>
+              <a:ext uri="{FF2B5EF4-FFF2-40B4-BE49-F238E27FC236}">
+                <a16:creationId xmlns:a16="http://schemas.microsoft.com/office/drawing/2014/main" id="{170E4FF2-8E7D-4C86-8301-FF54E79B5D4D}"/>
+              </a:ext>
+            </a:extLst>
+          </p:cNvPr>
+          <p:cNvSpPr txBox="1"/>
+          <p:nvPr/>
+        </p:nvSpPr>
+        <p:spPr>
+          <a:xfrm>
+            <a:off x="815524" y="1540740"/>
+            <a:ext cx="2722776" cy="1200329"/>
+          </a:xfrm>
+          <a:prstGeom prst="rect">
+            <a:avLst/>
+          </a:prstGeom>
+          <a:noFill/>
+        </p:spPr>
+        <p:txBody>
+          <a:bodyPr wrap="square" rtlCol="0">
+            <a:spAutoFit/>
+          </a:bodyPr>
+          <a:lstStyle/>
+          <a:p>
+            <a:r>
+              <a:rPr lang="en-US" dirty="0"/>
+              <a:t>Traffic comes out of the right lanes at “END” and out of left lanes at “START” of the road</a:t>
+            </a:r>
+          </a:p>
+        </p:txBody>
+      </p:sp>
+    </p:spTree>
+    <p:extLst>
+      <p:ext uri="{BB962C8B-B14F-4D97-AF65-F5344CB8AC3E}">
+        <p14:creationId xmlns:p14="http://schemas.microsoft.com/office/powerpoint/2010/main" val="3136285433"/>
+      </p:ext>
+    </p:extLst>
+  </p:cSld>
+  <p:clrMapOvr>
+    <a:masterClrMapping/>
+  </p:clrMapOvr>
+</p:sld>
+</file>
+
+<file path=ppt/slides/slide28.xml><?xml version="1.0" encoding="utf-8"?>
+<p:sld xmlns:a="http://schemas.openxmlformats.org/drawingml/2006/main" xmlns:r="http://schemas.openxmlformats.org/officeDocument/2006/relationships" xmlns:p="http://schemas.openxmlformats.org/presentationml/2006/main">
+  <p:cSld>
+    <p:spTree>
+      <p:nvGrpSpPr>
+        <p:cNvPr id="1" name=""/>
+        <p:cNvGrpSpPr/>
+        <p:nvPr/>
+      </p:nvGrpSpPr>
+      <p:grpSpPr>
+        <a:xfrm>
+          <a:off x="0" y="0"/>
+          <a:ext cx="0" cy="0"/>
+          <a:chOff x="0" y="0"/>
+          <a:chExt cx="0" cy="0"/>
+        </a:xfrm>
+      </p:grpSpPr>
+      <p:sp>
+        <p:nvSpPr>
+          <p:cNvPr id="2" name="Title 1">
+            <a:extLst>
+              <a:ext uri="{FF2B5EF4-FFF2-40B4-BE49-F238E27FC236}">
+                <a16:creationId xmlns:a16="http://schemas.microsoft.com/office/drawing/2014/main" id="{66DEB391-322F-471C-BDFC-81E754DA4463}"/>
+              </a:ext>
+            </a:extLst>
+          </p:cNvPr>
+          <p:cNvSpPr>
+            <a:spLocks noGrp="1"/>
+          </p:cNvSpPr>
+          <p:nvPr>
+            <p:ph type="title"/>
+          </p:nvPr>
+        </p:nvSpPr>
+        <p:spPr>
+          <a:xfrm>
+            <a:off x="304730" y="119217"/>
+            <a:ext cx="10515600" cy="1325563"/>
+          </a:xfrm>
+        </p:spPr>
+        <p:txBody>
+          <a:bodyPr/>
+          <a:lstStyle/>
+          <a:p>
+            <a:r>
+              <a:rPr lang="en-US" dirty="0"/>
+              <a:t>Lane configuration</a:t>
+            </a:r>
+          </a:p>
+        </p:txBody>
+      </p:sp>
+      <p:grpSp>
+        <p:nvGrpSpPr>
+          <p:cNvPr id="67" name="Group 66">
+            <a:extLst>
+              <a:ext uri="{FF2B5EF4-FFF2-40B4-BE49-F238E27FC236}">
+                <a16:creationId xmlns:a16="http://schemas.microsoft.com/office/drawing/2014/main" id="{38E451A3-5B1E-4F19-93C6-70D32D8A2432}"/>
+              </a:ext>
+            </a:extLst>
+          </p:cNvPr>
+          <p:cNvGrpSpPr/>
+          <p:nvPr/>
+        </p:nvGrpSpPr>
+        <p:grpSpPr>
+          <a:xfrm>
+            <a:off x="6953560" y="2830991"/>
+            <a:ext cx="3734602" cy="1798247"/>
+            <a:chOff x="6953560" y="2830991"/>
+            <a:chExt cx="3734602" cy="1798247"/>
+          </a:xfrm>
+        </p:grpSpPr>
+        <p:grpSp>
+          <p:nvGrpSpPr>
+            <p:cNvPr id="51" name="Group 50">
+              <a:extLst>
+                <a:ext uri="{FF2B5EF4-FFF2-40B4-BE49-F238E27FC236}">
+                  <a16:creationId xmlns:a16="http://schemas.microsoft.com/office/drawing/2014/main" id="{38CA4543-F674-4DC5-9D88-EC0F3FE7C073}"/>
+                </a:ext>
+              </a:extLst>
+            </p:cNvPr>
+            <p:cNvGrpSpPr/>
+            <p:nvPr/>
+          </p:nvGrpSpPr>
+          <p:grpSpPr>
+            <a:xfrm>
+              <a:off x="6953560" y="2830991"/>
+              <a:ext cx="3734602" cy="1798247"/>
+              <a:chOff x="6953560" y="2830991"/>
+              <a:chExt cx="3734602" cy="1798247"/>
+            </a:xfrm>
+          </p:grpSpPr>
+          <p:sp>
+            <p:nvSpPr>
+              <p:cNvPr id="38" name="TextBox 37">
+                <a:extLst>
+                  <a:ext uri="{FF2B5EF4-FFF2-40B4-BE49-F238E27FC236}">
+                    <a16:creationId xmlns:a16="http://schemas.microsoft.com/office/drawing/2014/main" id="{2692A617-B8DC-4023-B58E-A89A02F2A206}"/>
+                  </a:ext>
+                </a:extLst>
+              </p:cNvPr>
+              <p:cNvSpPr txBox="1"/>
+              <p:nvPr/>
+            </p:nvSpPr>
+            <p:spPr>
+              <a:xfrm rot="20403980">
+                <a:off x="6953560" y="3929210"/>
+                <a:ext cx="773021" cy="369332"/>
+              </a:xfrm>
+              <a:prstGeom prst="rect">
+                <a:avLst/>
+              </a:prstGeom>
+              <a:noFill/>
+            </p:spPr>
+            <p:txBody>
+              <a:bodyPr wrap="square" rtlCol="0">
+                <a:spAutoFit/>
+              </a:bodyPr>
+              <a:lstStyle/>
+              <a:p>
+                <a:r>
+                  <a:rPr lang="en-US" dirty="0"/>
+                  <a:t>Start</a:t>
+                </a:r>
+              </a:p>
+            </p:txBody>
+          </p:sp>
+          <p:grpSp>
+            <p:nvGrpSpPr>
+              <p:cNvPr id="41" name="Group 40">
+                <a:extLst>
+                  <a:ext uri="{FF2B5EF4-FFF2-40B4-BE49-F238E27FC236}">
+                    <a16:creationId xmlns:a16="http://schemas.microsoft.com/office/drawing/2014/main" id="{D4158673-7AAA-43CB-93FB-7397F42FC937}"/>
+                  </a:ext>
+                </a:extLst>
+              </p:cNvPr>
+              <p:cNvGrpSpPr/>
+              <p:nvPr/>
+            </p:nvGrpSpPr>
+            <p:grpSpPr>
+              <a:xfrm>
+                <a:off x="7616505" y="3599209"/>
+                <a:ext cx="2540937" cy="1030029"/>
+                <a:chOff x="5731897" y="3363935"/>
+                <a:chExt cx="2540937" cy="1030029"/>
+              </a:xfrm>
+            </p:grpSpPr>
+            <p:grpSp>
+              <p:nvGrpSpPr>
+                <p:cNvPr id="43" name="Group 42">
+                  <a:extLst>
+                    <a:ext uri="{FF2B5EF4-FFF2-40B4-BE49-F238E27FC236}">
+                      <a16:creationId xmlns:a16="http://schemas.microsoft.com/office/drawing/2014/main" id="{FE988ACE-A9D1-4938-A9A5-869F3ACFCB53}"/>
+                    </a:ext>
+                  </a:extLst>
+                </p:cNvPr>
+                <p:cNvGrpSpPr/>
+                <p:nvPr/>
+              </p:nvGrpSpPr>
+              <p:grpSpPr>
+                <a:xfrm rot="20412698">
+                  <a:off x="5731897" y="3363935"/>
+                  <a:ext cx="2540937" cy="654548"/>
+                  <a:chOff x="1150374" y="4175900"/>
+                  <a:chExt cx="2540937" cy="654548"/>
+                </a:xfrm>
+              </p:grpSpPr>
+              <p:cxnSp>
+                <p:nvCxnSpPr>
+                  <p:cNvPr id="46" name="Straight Connector 45">
+                    <a:extLst>
+                      <a:ext uri="{FF2B5EF4-FFF2-40B4-BE49-F238E27FC236}">
+                        <a16:creationId xmlns:a16="http://schemas.microsoft.com/office/drawing/2014/main" id="{6A4B1403-5B2B-4AF6-8BCB-AC1AE7F87592}"/>
+                      </a:ext>
+                    </a:extLst>
+                  </p:cNvPr>
+                  <p:cNvCxnSpPr/>
+                  <p:nvPr/>
+                </p:nvCxnSpPr>
+                <p:spPr>
+                  <a:xfrm>
+                    <a:off x="1150374" y="4175900"/>
+                    <a:ext cx="2532509" cy="0"/>
+                  </a:xfrm>
+                  <a:prstGeom prst="line">
+                    <a:avLst/>
+                  </a:prstGeom>
+                  <a:ln>
+                    <a:solidFill>
+                      <a:schemeClr val="accent2"/>
+                    </a:solidFill>
+                  </a:ln>
+                </p:spPr>
+                <p:style>
+                  <a:lnRef idx="3">
+                    <a:schemeClr val="dk1"/>
+                  </a:lnRef>
+                  <a:fillRef idx="0">
+                    <a:schemeClr val="dk1"/>
+                  </a:fillRef>
+                  <a:effectRef idx="2">
+                    <a:schemeClr val="dk1"/>
+                  </a:effectRef>
+                  <a:fontRef idx="minor">
+                    <a:schemeClr val="tx1"/>
+                  </a:fontRef>
+                </p:style>
+              </p:cxnSp>
+              <p:cxnSp>
+                <p:nvCxnSpPr>
+                  <p:cNvPr id="47" name="Straight Connector 46">
+                    <a:extLst>
+                      <a:ext uri="{FF2B5EF4-FFF2-40B4-BE49-F238E27FC236}">
+                        <a16:creationId xmlns:a16="http://schemas.microsoft.com/office/drawing/2014/main" id="{9767D72A-D3DD-49C2-9E57-469CB604025D}"/>
+                      </a:ext>
+                    </a:extLst>
+                  </p:cNvPr>
+                  <p:cNvCxnSpPr/>
+                  <p:nvPr/>
+                </p:nvCxnSpPr>
+                <p:spPr>
+                  <a:xfrm>
+                    <a:off x="1154588" y="4403447"/>
+                    <a:ext cx="2536723" cy="0"/>
+                  </a:xfrm>
+                  <a:prstGeom prst="line">
+                    <a:avLst/>
+                  </a:prstGeom>
+                </p:spPr>
+                <p:style>
+                  <a:lnRef idx="1">
+                    <a:schemeClr val="accent1"/>
+                  </a:lnRef>
+                  <a:fillRef idx="0">
+                    <a:schemeClr val="accent1"/>
+                  </a:fillRef>
+                  <a:effectRef idx="0">
+                    <a:schemeClr val="accent1"/>
+                  </a:effectRef>
+                  <a:fontRef idx="minor">
+                    <a:schemeClr val="tx1"/>
+                  </a:fontRef>
+                </p:style>
+              </p:cxnSp>
+              <p:cxnSp>
+                <p:nvCxnSpPr>
+                  <p:cNvPr id="48" name="Straight Connector 47">
+                    <a:extLst>
+                      <a:ext uri="{FF2B5EF4-FFF2-40B4-BE49-F238E27FC236}">
+                        <a16:creationId xmlns:a16="http://schemas.microsoft.com/office/drawing/2014/main" id="{303B24CD-498E-4DF4-89BA-AD49DCD4D80F}"/>
+                      </a:ext>
+                    </a:extLst>
+                  </p:cNvPr>
+                  <p:cNvCxnSpPr/>
+                  <p:nvPr/>
+                </p:nvCxnSpPr>
+                <p:spPr>
+                  <a:xfrm>
+                    <a:off x="1154588" y="4619054"/>
+                    <a:ext cx="2536723" cy="0"/>
+                  </a:xfrm>
+                  <a:prstGeom prst="line">
+                    <a:avLst/>
+                  </a:prstGeom>
+                </p:spPr>
+                <p:style>
+                  <a:lnRef idx="1">
+                    <a:schemeClr val="accent1"/>
+                  </a:lnRef>
+                  <a:fillRef idx="0">
+                    <a:schemeClr val="accent1"/>
+                  </a:fillRef>
+                  <a:effectRef idx="0">
+                    <a:schemeClr val="accent1"/>
+                  </a:effectRef>
+                  <a:fontRef idx="minor">
+                    <a:schemeClr val="tx1"/>
+                  </a:fontRef>
+                </p:style>
+              </p:cxnSp>
+              <p:cxnSp>
+                <p:nvCxnSpPr>
+                  <p:cNvPr id="49" name="Straight Connector 48">
+                    <a:extLst>
+                      <a:ext uri="{FF2B5EF4-FFF2-40B4-BE49-F238E27FC236}">
+                        <a16:creationId xmlns:a16="http://schemas.microsoft.com/office/drawing/2014/main" id="{AA47B3C0-1501-4395-86A8-9425103A3782}"/>
+                      </a:ext>
+                    </a:extLst>
+                  </p:cNvPr>
+                  <p:cNvCxnSpPr/>
+                  <p:nvPr/>
+                </p:nvCxnSpPr>
+                <p:spPr>
+                  <a:xfrm>
+                    <a:off x="1154588" y="4830448"/>
+                    <a:ext cx="2536723" cy="0"/>
+                  </a:xfrm>
+                  <a:prstGeom prst="line">
+                    <a:avLst/>
+                  </a:prstGeom>
+                </p:spPr>
+                <p:style>
+                  <a:lnRef idx="1">
+                    <a:schemeClr val="accent1"/>
+                  </a:lnRef>
+                  <a:fillRef idx="0">
+                    <a:schemeClr val="accent1"/>
+                  </a:fillRef>
+                  <a:effectRef idx="0">
+                    <a:schemeClr val="accent1"/>
+                  </a:effectRef>
+                  <a:fontRef idx="minor">
+                    <a:schemeClr val="tx1"/>
+                  </a:fontRef>
+                </p:style>
+              </p:cxnSp>
+            </p:grpSp>
+            <p:sp>
+              <p:nvSpPr>
+                <p:cNvPr id="44" name="TextBox 43">
+                  <a:extLst>
+                    <a:ext uri="{FF2B5EF4-FFF2-40B4-BE49-F238E27FC236}">
+                      <a16:creationId xmlns:a16="http://schemas.microsoft.com/office/drawing/2014/main" id="{D8611C1F-1542-4DF9-BA84-0717A9A5A2A8}"/>
+                    </a:ext>
+                  </a:extLst>
+                </p:cNvPr>
+                <p:cNvSpPr txBox="1"/>
+                <p:nvPr/>
+              </p:nvSpPr>
+              <p:spPr>
+                <a:xfrm>
+                  <a:off x="5911996" y="3655300"/>
+                  <a:ext cx="516922" cy="738664"/>
+                </a:xfrm>
+                <a:prstGeom prst="rect">
+                  <a:avLst/>
+                </a:prstGeom>
+                <a:noFill/>
+              </p:spPr>
+              <p:txBody>
+                <a:bodyPr wrap="square" rtlCol="0">
+                  <a:spAutoFit/>
+                </a:bodyPr>
+                <a:lstStyle/>
+                <a:p>
+                  <a:r>
+                    <a:rPr lang="en-US" sz="1400" dirty="0"/>
+                    <a:t>-1</a:t>
+                  </a:r>
+                </a:p>
+                <a:p>
+                  <a:r>
+                    <a:rPr lang="en-US" sz="1400" dirty="0"/>
+                    <a:t>-2</a:t>
+                  </a:r>
+                </a:p>
+                <a:p>
+                  <a:r>
+                    <a:rPr lang="en-US" sz="1400" dirty="0"/>
+                    <a:t>-3</a:t>
+                  </a:r>
+                </a:p>
+              </p:txBody>
+            </p:sp>
+          </p:grpSp>
+          <p:sp>
+            <p:nvSpPr>
+              <p:cNvPr id="42" name="TextBox 41">
+                <a:extLst>
+                  <a:ext uri="{FF2B5EF4-FFF2-40B4-BE49-F238E27FC236}">
+                    <a16:creationId xmlns:a16="http://schemas.microsoft.com/office/drawing/2014/main" id="{7E69A1F4-9485-4233-BE28-19347ACB5E1C}"/>
+                  </a:ext>
+                </a:extLst>
+              </p:cNvPr>
+              <p:cNvSpPr txBox="1"/>
+              <p:nvPr/>
+            </p:nvSpPr>
+            <p:spPr>
+              <a:xfrm rot="20169058">
+                <a:off x="9915141" y="2830991"/>
+                <a:ext cx="773021" cy="369332"/>
+              </a:xfrm>
+              <a:prstGeom prst="rect">
+                <a:avLst/>
+              </a:prstGeom>
+              <a:noFill/>
+            </p:spPr>
+            <p:txBody>
+              <a:bodyPr wrap="square" rtlCol="0">
+                <a:spAutoFit/>
+              </a:bodyPr>
+              <a:lstStyle/>
+              <a:p>
+                <a:r>
+                  <a:rPr lang="en-US" dirty="0"/>
+                  <a:t>End</a:t>
+                </a:r>
+              </a:p>
+            </p:txBody>
+          </p:sp>
+          <p:sp>
+            <p:nvSpPr>
+              <p:cNvPr id="50" name="Rectangle 49">
+                <a:extLst>
+                  <a:ext uri="{FF2B5EF4-FFF2-40B4-BE49-F238E27FC236}">
+                    <a16:creationId xmlns:a16="http://schemas.microsoft.com/office/drawing/2014/main" id="{BD13DA5E-36C7-4639-A07F-577BCB536B91}"/>
+                  </a:ext>
+                </a:extLst>
+              </p:cNvPr>
+              <p:cNvSpPr/>
+              <p:nvPr/>
+            </p:nvSpPr>
+            <p:spPr>
+              <a:xfrm rot="20435386">
+                <a:off x="7396556" y="3091430"/>
+                <a:ext cx="2508429" cy="442505"/>
+              </a:xfrm>
+              <a:prstGeom prst="rect">
+                <a:avLst/>
+              </a:prstGeom>
+              <a:solidFill>
+                <a:schemeClr val="accent4">
+                  <a:lumMod val="60000"/>
+                  <a:lumOff val="40000"/>
+                </a:schemeClr>
+              </a:solidFill>
+              <a:ln>
+                <a:noFill/>
+              </a:ln>
+            </p:spPr>
+            <p:style>
+              <a:lnRef idx="2">
+                <a:schemeClr val="accent1">
+                  <a:shade val="50000"/>
+                </a:schemeClr>
+              </a:lnRef>
+              <a:fillRef idx="1">
+                <a:schemeClr val="accent1"/>
+              </a:fillRef>
+              <a:effectRef idx="0">
+                <a:schemeClr val="accent1"/>
+              </a:effectRef>
+              <a:fontRef idx="minor">
+                <a:schemeClr val="lt1"/>
+              </a:fontRef>
+            </p:style>
+            <p:txBody>
+              <a:bodyPr rtlCol="0" anchor="ctr"/>
+              <a:lstStyle/>
+              <a:p>
+                <a:pPr algn="ctr"/>
+                <a:r>
+                  <a:rPr lang="en-US" dirty="0"/>
+                  <a:t>L</a:t>
+                </a:r>
+              </a:p>
+            </p:txBody>
+          </p:sp>
+        </p:grpSp>
+        <p:sp>
+          <p:nvSpPr>
+            <p:cNvPr id="64" name="Arrow: Right 63">
+              <a:extLst>
+                <a:ext uri="{FF2B5EF4-FFF2-40B4-BE49-F238E27FC236}">
+                  <a16:creationId xmlns:a16="http://schemas.microsoft.com/office/drawing/2014/main" id="{B6AD17E1-06C7-4619-A824-4A635FA58F11}"/>
+                </a:ext>
+              </a:extLst>
+            </p:cNvPr>
+            <p:cNvSpPr/>
+            <p:nvPr/>
+          </p:nvSpPr>
+          <p:spPr>
+            <a:xfrm rot="20391773">
+              <a:off x="8514354" y="3833334"/>
+              <a:ext cx="899448" cy="150354"/>
+            </a:xfrm>
+            <a:prstGeom prst="rightArrow">
+              <a:avLst/>
+            </a:prstGeom>
+            <a:ln>
+              <a:noFill/>
+            </a:ln>
+          </p:spPr>
+          <p:style>
+            <a:lnRef idx="2">
+              <a:schemeClr val="accent1">
+                <a:shade val="50000"/>
+              </a:schemeClr>
+            </a:lnRef>
+            <a:fillRef idx="1">
+              <a:schemeClr val="accent1"/>
+            </a:fillRef>
+            <a:effectRef idx="0">
+              <a:schemeClr val="accent1"/>
+            </a:effectRef>
+            <a:fontRef idx="minor">
+              <a:schemeClr val="lt1"/>
+            </a:fontRef>
+          </p:style>
+          <p:txBody>
+            <a:bodyPr rtlCol="0" anchor="ctr"/>
+            <a:lstStyle/>
+            <a:p>
+              <a:pPr algn="ctr"/>
+              <a:endParaRPr lang="en-US"/>
+            </a:p>
+          </p:txBody>
+        </p:sp>
+        <p:sp>
+          <p:nvSpPr>
+            <p:cNvPr id="65" name="Arrow: Right 64">
+              <a:extLst>
+                <a:ext uri="{FF2B5EF4-FFF2-40B4-BE49-F238E27FC236}">
+                  <a16:creationId xmlns:a16="http://schemas.microsoft.com/office/drawing/2014/main" id="{C4DEDDED-BF5E-41B2-B00E-9FE2E5981860}"/>
+                </a:ext>
+              </a:extLst>
+            </p:cNvPr>
+            <p:cNvSpPr/>
+            <p:nvPr/>
+          </p:nvSpPr>
+          <p:spPr>
+            <a:xfrm rot="9585822">
+              <a:off x="7669761" y="3436114"/>
+              <a:ext cx="899448" cy="150354"/>
+            </a:xfrm>
+            <a:prstGeom prst="rightArrow">
+              <a:avLst/>
+            </a:prstGeom>
+            <a:solidFill>
+              <a:schemeClr val="bg1"/>
+            </a:solidFill>
+            <a:ln>
+              <a:noFill/>
+            </a:ln>
+          </p:spPr>
+          <p:style>
+            <a:lnRef idx="2">
+              <a:schemeClr val="accent1">
+                <a:shade val="50000"/>
+              </a:schemeClr>
+            </a:lnRef>
+            <a:fillRef idx="1">
+              <a:schemeClr val="accent1"/>
+            </a:fillRef>
+            <a:effectRef idx="0">
+              <a:schemeClr val="accent1"/>
+            </a:effectRef>
+            <a:fontRef idx="minor">
+              <a:schemeClr val="lt1"/>
+            </a:fontRef>
+          </p:style>
+          <p:txBody>
+            <a:bodyPr rtlCol="0" anchor="ctr"/>
+            <a:lstStyle/>
+            <a:p>
+              <a:pPr algn="ctr"/>
+              <a:endParaRPr lang="en-US"/>
+            </a:p>
+          </p:txBody>
+        </p:sp>
+      </p:grpSp>
+      <p:grpSp>
+        <p:nvGrpSpPr>
+          <p:cNvPr id="68" name="Group 67">
+            <a:extLst>
+              <a:ext uri="{FF2B5EF4-FFF2-40B4-BE49-F238E27FC236}">
+                <a16:creationId xmlns:a16="http://schemas.microsoft.com/office/drawing/2014/main" id="{81EF8BC6-F566-4650-94E9-F3C55C972E21}"/>
+              </a:ext>
+            </a:extLst>
+          </p:cNvPr>
+          <p:cNvGrpSpPr/>
+          <p:nvPr/>
+        </p:nvGrpSpPr>
+        <p:grpSpPr>
+          <a:xfrm rot="12108862">
+            <a:off x="2134013" y="3039050"/>
+            <a:ext cx="3734602" cy="1798247"/>
+            <a:chOff x="6953560" y="2830991"/>
+            <a:chExt cx="3734602" cy="1798247"/>
+          </a:xfrm>
+        </p:grpSpPr>
+        <p:grpSp>
+          <p:nvGrpSpPr>
+            <p:cNvPr id="69" name="Group 68">
+              <a:extLst>
+                <a:ext uri="{FF2B5EF4-FFF2-40B4-BE49-F238E27FC236}">
+                  <a16:creationId xmlns:a16="http://schemas.microsoft.com/office/drawing/2014/main" id="{DEC92819-6FAF-4A7F-9A98-1A8F1380F4C2}"/>
+                </a:ext>
+              </a:extLst>
+            </p:cNvPr>
+            <p:cNvGrpSpPr/>
+            <p:nvPr/>
+          </p:nvGrpSpPr>
+          <p:grpSpPr>
+            <a:xfrm>
+              <a:off x="6953560" y="2830991"/>
+              <a:ext cx="3734602" cy="1798247"/>
+              <a:chOff x="6953560" y="2830991"/>
+              <a:chExt cx="3734602" cy="1798247"/>
+            </a:xfrm>
+          </p:grpSpPr>
+          <p:sp>
+            <p:nvSpPr>
+              <p:cNvPr id="72" name="TextBox 71">
+                <a:extLst>
+                  <a:ext uri="{FF2B5EF4-FFF2-40B4-BE49-F238E27FC236}">
+                    <a16:creationId xmlns:a16="http://schemas.microsoft.com/office/drawing/2014/main" id="{C2498B59-0404-40BA-B499-1509E037AA2E}"/>
+                  </a:ext>
+                </a:extLst>
+              </p:cNvPr>
+              <p:cNvSpPr txBox="1"/>
+              <p:nvPr/>
+            </p:nvSpPr>
+            <p:spPr>
+              <a:xfrm rot="20403980">
+                <a:off x="6953560" y="3929210"/>
+                <a:ext cx="773021" cy="369332"/>
+              </a:xfrm>
+              <a:prstGeom prst="rect">
+                <a:avLst/>
+              </a:prstGeom>
+              <a:noFill/>
+            </p:spPr>
+            <p:txBody>
+              <a:bodyPr wrap="square" rtlCol="0">
+                <a:spAutoFit/>
+              </a:bodyPr>
+              <a:lstStyle/>
+              <a:p>
+                <a:r>
+                  <a:rPr lang="en-US" dirty="0"/>
+                  <a:t>Start</a:t>
+                </a:r>
+              </a:p>
+            </p:txBody>
+          </p:sp>
+          <p:grpSp>
+            <p:nvGrpSpPr>
+              <p:cNvPr id="73" name="Group 72">
+                <a:extLst>
+                  <a:ext uri="{FF2B5EF4-FFF2-40B4-BE49-F238E27FC236}">
+                    <a16:creationId xmlns:a16="http://schemas.microsoft.com/office/drawing/2014/main" id="{81E38EBA-CC78-492A-B2BB-867316B7ED62}"/>
+                  </a:ext>
+                </a:extLst>
+              </p:cNvPr>
+              <p:cNvGrpSpPr/>
+              <p:nvPr/>
+            </p:nvGrpSpPr>
+            <p:grpSpPr>
+              <a:xfrm>
+                <a:off x="7616505" y="3599209"/>
+                <a:ext cx="2540937" cy="1030029"/>
+                <a:chOff x="5731897" y="3363935"/>
+                <a:chExt cx="2540937" cy="1030029"/>
+              </a:xfrm>
+            </p:grpSpPr>
+            <p:grpSp>
+              <p:nvGrpSpPr>
+                <p:cNvPr id="76" name="Group 75">
+                  <a:extLst>
+                    <a:ext uri="{FF2B5EF4-FFF2-40B4-BE49-F238E27FC236}">
+                      <a16:creationId xmlns:a16="http://schemas.microsoft.com/office/drawing/2014/main" id="{E3F95322-69E5-45F5-B36F-9BF68CFCF13E}"/>
+                    </a:ext>
+                  </a:extLst>
+                </p:cNvPr>
+                <p:cNvGrpSpPr/>
+                <p:nvPr/>
+              </p:nvGrpSpPr>
+              <p:grpSpPr>
+                <a:xfrm rot="20412698">
+                  <a:off x="5731897" y="3363935"/>
+                  <a:ext cx="2540937" cy="654548"/>
+                  <a:chOff x="1150374" y="4175900"/>
+                  <a:chExt cx="2540937" cy="654548"/>
+                </a:xfrm>
+              </p:grpSpPr>
+              <p:cxnSp>
+                <p:nvCxnSpPr>
+                  <p:cNvPr id="78" name="Straight Connector 77">
+                    <a:extLst>
+                      <a:ext uri="{FF2B5EF4-FFF2-40B4-BE49-F238E27FC236}">
+                        <a16:creationId xmlns:a16="http://schemas.microsoft.com/office/drawing/2014/main" id="{98662FA7-ED95-4C5A-AAD7-D7ECCE4902A5}"/>
+                      </a:ext>
+                    </a:extLst>
+                  </p:cNvPr>
+                  <p:cNvCxnSpPr/>
+                  <p:nvPr/>
+                </p:nvCxnSpPr>
+                <p:spPr>
+                  <a:xfrm>
+                    <a:off x="1150374" y="4175900"/>
+                    <a:ext cx="2532509" cy="0"/>
+                  </a:xfrm>
+                  <a:prstGeom prst="line">
+                    <a:avLst/>
+                  </a:prstGeom>
+                  <a:ln>
+                    <a:solidFill>
+                      <a:schemeClr val="accent2"/>
+                    </a:solidFill>
+                  </a:ln>
+                </p:spPr>
+                <p:style>
+                  <a:lnRef idx="3">
+                    <a:schemeClr val="dk1"/>
+                  </a:lnRef>
+                  <a:fillRef idx="0">
+                    <a:schemeClr val="dk1"/>
+                  </a:fillRef>
+                  <a:effectRef idx="2">
+                    <a:schemeClr val="dk1"/>
+                  </a:effectRef>
+                  <a:fontRef idx="minor">
+                    <a:schemeClr val="tx1"/>
+                  </a:fontRef>
+                </p:style>
+              </p:cxnSp>
+              <p:cxnSp>
+                <p:nvCxnSpPr>
+                  <p:cNvPr id="79" name="Straight Connector 78">
+                    <a:extLst>
+                      <a:ext uri="{FF2B5EF4-FFF2-40B4-BE49-F238E27FC236}">
+                        <a16:creationId xmlns:a16="http://schemas.microsoft.com/office/drawing/2014/main" id="{E17F5131-DB6B-495A-BDEA-FC4F67548A92}"/>
+                      </a:ext>
+                    </a:extLst>
+                  </p:cNvPr>
+                  <p:cNvCxnSpPr/>
+                  <p:nvPr/>
+                </p:nvCxnSpPr>
+                <p:spPr>
+                  <a:xfrm>
+                    <a:off x="1154588" y="4403447"/>
+                    <a:ext cx="2536723" cy="0"/>
+                  </a:xfrm>
+                  <a:prstGeom prst="line">
+                    <a:avLst/>
+                  </a:prstGeom>
+                </p:spPr>
+                <p:style>
+                  <a:lnRef idx="1">
+                    <a:schemeClr val="accent1"/>
+                  </a:lnRef>
+                  <a:fillRef idx="0">
+                    <a:schemeClr val="accent1"/>
+                  </a:fillRef>
+                  <a:effectRef idx="0">
+                    <a:schemeClr val="accent1"/>
+                  </a:effectRef>
+                  <a:fontRef idx="minor">
+                    <a:schemeClr val="tx1"/>
+                  </a:fontRef>
+                </p:style>
+              </p:cxnSp>
+              <p:cxnSp>
+                <p:nvCxnSpPr>
+                  <p:cNvPr id="80" name="Straight Connector 79">
+                    <a:extLst>
+                      <a:ext uri="{FF2B5EF4-FFF2-40B4-BE49-F238E27FC236}">
+                        <a16:creationId xmlns:a16="http://schemas.microsoft.com/office/drawing/2014/main" id="{6B50A54D-EB87-4903-99CD-9D40FF035B70}"/>
+                      </a:ext>
+                    </a:extLst>
+                  </p:cNvPr>
+                  <p:cNvCxnSpPr/>
+                  <p:nvPr/>
+                </p:nvCxnSpPr>
+                <p:spPr>
+                  <a:xfrm>
+                    <a:off x="1154588" y="4619054"/>
+                    <a:ext cx="2536723" cy="0"/>
+                  </a:xfrm>
+                  <a:prstGeom prst="line">
+                    <a:avLst/>
+                  </a:prstGeom>
+                </p:spPr>
+                <p:style>
+                  <a:lnRef idx="1">
+                    <a:schemeClr val="accent1"/>
+                  </a:lnRef>
+                  <a:fillRef idx="0">
+                    <a:schemeClr val="accent1"/>
+                  </a:fillRef>
+                  <a:effectRef idx="0">
+                    <a:schemeClr val="accent1"/>
+                  </a:effectRef>
+                  <a:fontRef idx="minor">
+                    <a:schemeClr val="tx1"/>
+                  </a:fontRef>
+                </p:style>
+              </p:cxnSp>
+              <p:cxnSp>
+                <p:nvCxnSpPr>
+                  <p:cNvPr id="81" name="Straight Connector 80">
+                    <a:extLst>
+                      <a:ext uri="{FF2B5EF4-FFF2-40B4-BE49-F238E27FC236}">
+                        <a16:creationId xmlns:a16="http://schemas.microsoft.com/office/drawing/2014/main" id="{ED708103-564B-4C28-B1BC-F82D9614E6C9}"/>
+                      </a:ext>
+                    </a:extLst>
+                  </p:cNvPr>
+                  <p:cNvCxnSpPr/>
+                  <p:nvPr/>
+                </p:nvCxnSpPr>
+                <p:spPr>
+                  <a:xfrm>
+                    <a:off x="1154588" y="4830448"/>
+                    <a:ext cx="2536723" cy="0"/>
+                  </a:xfrm>
+                  <a:prstGeom prst="line">
+                    <a:avLst/>
+                  </a:prstGeom>
+                </p:spPr>
+                <p:style>
+                  <a:lnRef idx="1">
+                    <a:schemeClr val="accent1"/>
+                  </a:lnRef>
+                  <a:fillRef idx="0">
+                    <a:schemeClr val="accent1"/>
+                  </a:fillRef>
+                  <a:effectRef idx="0">
+                    <a:schemeClr val="accent1"/>
+                  </a:effectRef>
+                  <a:fontRef idx="minor">
+                    <a:schemeClr val="tx1"/>
+                  </a:fontRef>
+                </p:style>
+              </p:cxnSp>
+            </p:grpSp>
+            <p:sp>
+              <p:nvSpPr>
+                <p:cNvPr id="77" name="TextBox 76">
+                  <a:extLst>
+                    <a:ext uri="{FF2B5EF4-FFF2-40B4-BE49-F238E27FC236}">
+                      <a16:creationId xmlns:a16="http://schemas.microsoft.com/office/drawing/2014/main" id="{45A9E78B-4B1A-4A11-BEFE-140A93ADFABD}"/>
+                    </a:ext>
+                  </a:extLst>
+                </p:cNvPr>
+                <p:cNvSpPr txBox="1"/>
+                <p:nvPr/>
+              </p:nvSpPr>
+              <p:spPr>
+                <a:xfrm>
+                  <a:off x="5911996" y="3655300"/>
+                  <a:ext cx="516922" cy="738664"/>
+                </a:xfrm>
+                <a:prstGeom prst="rect">
+                  <a:avLst/>
+                </a:prstGeom>
+                <a:noFill/>
+              </p:spPr>
+              <p:txBody>
+                <a:bodyPr wrap="square" rtlCol="0">
+                  <a:spAutoFit/>
+                </a:bodyPr>
+                <a:lstStyle/>
+                <a:p>
+                  <a:r>
+                    <a:rPr lang="en-US" sz="1400" dirty="0"/>
+                    <a:t>-1</a:t>
+                  </a:r>
+                </a:p>
+                <a:p>
+                  <a:r>
+                    <a:rPr lang="en-US" sz="1400" dirty="0"/>
+                    <a:t>-2</a:t>
+                  </a:r>
+                </a:p>
+                <a:p>
+                  <a:r>
+                    <a:rPr lang="en-US" sz="1400" dirty="0"/>
+                    <a:t>-3</a:t>
+                  </a:r>
+                </a:p>
+              </p:txBody>
+            </p:sp>
+          </p:grpSp>
+          <p:sp>
+            <p:nvSpPr>
+              <p:cNvPr id="74" name="TextBox 73">
+                <a:extLst>
+                  <a:ext uri="{FF2B5EF4-FFF2-40B4-BE49-F238E27FC236}">
+                    <a16:creationId xmlns:a16="http://schemas.microsoft.com/office/drawing/2014/main" id="{21A9C007-AD86-4337-AF7F-22FE85999BE0}"/>
+                  </a:ext>
+                </a:extLst>
+              </p:cNvPr>
+              <p:cNvSpPr txBox="1"/>
+              <p:nvPr/>
+            </p:nvSpPr>
+            <p:spPr>
+              <a:xfrm rot="20169058">
+                <a:off x="9915141" y="2830991"/>
+                <a:ext cx="773021" cy="369332"/>
+              </a:xfrm>
+              <a:prstGeom prst="rect">
+                <a:avLst/>
+              </a:prstGeom>
+              <a:noFill/>
+            </p:spPr>
+            <p:txBody>
+              <a:bodyPr wrap="square" rtlCol="0">
+                <a:spAutoFit/>
+              </a:bodyPr>
+              <a:lstStyle/>
+              <a:p>
+                <a:r>
+                  <a:rPr lang="en-US" dirty="0"/>
+                  <a:t>End</a:t>
+                </a:r>
+              </a:p>
+            </p:txBody>
+          </p:sp>
+          <p:sp>
+            <p:nvSpPr>
+              <p:cNvPr id="75" name="Rectangle 74">
+                <a:extLst>
+                  <a:ext uri="{FF2B5EF4-FFF2-40B4-BE49-F238E27FC236}">
+                    <a16:creationId xmlns:a16="http://schemas.microsoft.com/office/drawing/2014/main" id="{77896562-49D2-425E-A506-213B599214E5}"/>
+                  </a:ext>
+                </a:extLst>
+              </p:cNvPr>
+              <p:cNvSpPr/>
+              <p:nvPr/>
+            </p:nvSpPr>
+            <p:spPr>
+              <a:xfrm rot="20435386">
+                <a:off x="7396556" y="3091430"/>
+                <a:ext cx="2508429" cy="442505"/>
+              </a:xfrm>
+              <a:prstGeom prst="rect">
+                <a:avLst/>
+              </a:prstGeom>
+              <a:solidFill>
+                <a:schemeClr val="accent4">
+                  <a:lumMod val="60000"/>
+                  <a:lumOff val="40000"/>
+                </a:schemeClr>
+              </a:solidFill>
+              <a:ln>
+                <a:noFill/>
+              </a:ln>
+            </p:spPr>
+            <p:style>
+              <a:lnRef idx="2">
+                <a:schemeClr val="accent1">
+                  <a:shade val="50000"/>
+                </a:schemeClr>
+              </a:lnRef>
+              <a:fillRef idx="1">
+                <a:schemeClr val="accent1"/>
+              </a:fillRef>
+              <a:effectRef idx="0">
+                <a:schemeClr val="accent1"/>
+              </a:effectRef>
+              <a:fontRef idx="minor">
+                <a:schemeClr val="lt1"/>
+              </a:fontRef>
+            </p:style>
+            <p:txBody>
+              <a:bodyPr rtlCol="0" anchor="ctr"/>
+              <a:lstStyle/>
+              <a:p>
+                <a:pPr algn="ctr"/>
+                <a:r>
+                  <a:rPr lang="en-US" dirty="0"/>
+                  <a:t>L</a:t>
+                </a:r>
+              </a:p>
+            </p:txBody>
+          </p:sp>
+        </p:grpSp>
+        <p:sp>
+          <p:nvSpPr>
+            <p:cNvPr id="70" name="Arrow: Right 69">
+              <a:extLst>
+                <a:ext uri="{FF2B5EF4-FFF2-40B4-BE49-F238E27FC236}">
+                  <a16:creationId xmlns:a16="http://schemas.microsoft.com/office/drawing/2014/main" id="{61DAB066-E166-4028-BD93-53214729CA5C}"/>
+                </a:ext>
+              </a:extLst>
+            </p:cNvPr>
+            <p:cNvSpPr/>
+            <p:nvPr/>
+          </p:nvSpPr>
+          <p:spPr>
+            <a:xfrm rot="20391773">
+              <a:off x="8514354" y="3833334"/>
+              <a:ext cx="899448" cy="150354"/>
+            </a:xfrm>
+            <a:prstGeom prst="rightArrow">
+              <a:avLst/>
+            </a:prstGeom>
+            <a:ln>
+              <a:noFill/>
+            </a:ln>
+          </p:spPr>
+          <p:style>
+            <a:lnRef idx="2">
+              <a:schemeClr val="accent1">
+                <a:shade val="50000"/>
+              </a:schemeClr>
+            </a:lnRef>
+            <a:fillRef idx="1">
+              <a:schemeClr val="accent1"/>
+            </a:fillRef>
+            <a:effectRef idx="0">
+              <a:schemeClr val="accent1"/>
+            </a:effectRef>
+            <a:fontRef idx="minor">
+              <a:schemeClr val="lt1"/>
+            </a:fontRef>
+          </p:style>
+          <p:txBody>
+            <a:bodyPr rtlCol="0" anchor="ctr"/>
+            <a:lstStyle/>
+            <a:p>
+              <a:pPr algn="ctr"/>
+              <a:endParaRPr lang="en-US"/>
+            </a:p>
+          </p:txBody>
+        </p:sp>
+        <p:sp>
+          <p:nvSpPr>
+            <p:cNvPr id="71" name="Arrow: Right 70">
+              <a:extLst>
+                <a:ext uri="{FF2B5EF4-FFF2-40B4-BE49-F238E27FC236}">
+                  <a16:creationId xmlns:a16="http://schemas.microsoft.com/office/drawing/2014/main" id="{74CEC5C0-5340-45C5-B99C-5B6A1DFE5102}"/>
+                </a:ext>
+              </a:extLst>
+            </p:cNvPr>
+            <p:cNvSpPr/>
+            <p:nvPr/>
+          </p:nvSpPr>
+          <p:spPr>
+            <a:xfrm rot="9585822">
+              <a:off x="7669761" y="3436114"/>
+              <a:ext cx="899448" cy="150354"/>
+            </a:xfrm>
+            <a:prstGeom prst="rightArrow">
+              <a:avLst/>
+            </a:prstGeom>
+            <a:solidFill>
+              <a:schemeClr val="bg1"/>
+            </a:solidFill>
+            <a:ln>
+              <a:noFill/>
+            </a:ln>
+          </p:spPr>
+          <p:style>
+            <a:lnRef idx="2">
+              <a:schemeClr val="accent1">
+                <a:shade val="50000"/>
+              </a:schemeClr>
+            </a:lnRef>
+            <a:fillRef idx="1">
+              <a:schemeClr val="accent1"/>
+            </a:fillRef>
+            <a:effectRef idx="0">
+              <a:schemeClr val="accent1"/>
+            </a:effectRef>
+            <a:fontRef idx="minor">
+              <a:schemeClr val="lt1"/>
+            </a:fontRef>
+          </p:style>
+          <p:txBody>
+            <a:bodyPr rtlCol="0" anchor="ctr"/>
+            <a:lstStyle/>
+            <a:p>
+              <a:pPr algn="ctr"/>
+              <a:endParaRPr lang="en-US" dirty="0"/>
+            </a:p>
+          </p:txBody>
+        </p:sp>
+      </p:grpSp>
+      <p:sp>
+        <p:nvSpPr>
+          <p:cNvPr id="82" name="Freeform: Shape 81">
+            <a:extLst>
+              <a:ext uri="{FF2B5EF4-FFF2-40B4-BE49-F238E27FC236}">
+                <a16:creationId xmlns:a16="http://schemas.microsoft.com/office/drawing/2014/main" id="{EF3CE46C-3D27-448E-9ED5-FD9DF7CB3B0D}"/>
+              </a:ext>
+            </a:extLst>
+          </p:cNvPr>
+          <p:cNvSpPr/>
+          <p:nvPr/>
+        </p:nvSpPr>
+        <p:spPr>
+          <a:xfrm flipV="1">
+            <a:off x="5229498" y="4410159"/>
+            <a:ext cx="2292050" cy="45719"/>
+          </a:xfrm>
+          <a:custGeom>
+            <a:avLst/>
+            <a:gdLst>
+              <a:gd name="connsiteX0" fmla="*/ 28049 w 2220991"/>
+              <a:gd name="connsiteY0" fmla="*/ 0 h 1278541"/>
+              <a:gd name="connsiteX1" fmla="*/ 307225 w 2220991"/>
+              <a:gd name="connsiteY1" fmla="*/ 971044 h 1278541"/>
+              <a:gd name="connsiteX2" fmla="*/ 2220991 w 2220991"/>
+              <a:gd name="connsiteY2" fmla="*/ 1278541 h 1278541"/>
+            </a:gdLst>
+            <a:ahLst/>
+            <a:cxnLst>
+              <a:cxn ang="0">
+                <a:pos x="connsiteX0" y="connsiteY0"/>
+              </a:cxn>
+              <a:cxn ang="0">
+                <a:pos x="connsiteX1" y="connsiteY1"/>
+              </a:cxn>
+              <a:cxn ang="0">
+                <a:pos x="connsiteX2" y="connsiteY2"/>
+              </a:cxn>
+            </a:cxnLst>
+            <a:rect l="l" t="t" r="r" b="b"/>
+            <a:pathLst>
+              <a:path w="2220991" h="1278541">
+                <a:moveTo>
+                  <a:pt x="28049" y="0"/>
+                </a:moveTo>
+                <a:cubicBezTo>
+                  <a:pt x="-15108" y="378977"/>
+                  <a:pt x="-58265" y="757954"/>
+                  <a:pt x="307225" y="971044"/>
+                </a:cubicBezTo>
+                <a:cubicBezTo>
+                  <a:pt x="672715" y="1184134"/>
+                  <a:pt x="1903379" y="1238081"/>
+                  <a:pt x="2220991" y="1278541"/>
+                </a:cubicBezTo>
+              </a:path>
+            </a:pathLst>
+          </a:custGeom>
+          <a:ln w="28575">
+            <a:solidFill>
+              <a:schemeClr val="accent4">
+                <a:lumMod val="60000"/>
+                <a:lumOff val="40000"/>
+              </a:schemeClr>
+            </a:solidFill>
+            <a:tailEnd type="triangle"/>
+          </a:ln>
+        </p:spPr>
+        <p:style>
+          <a:lnRef idx="3">
+            <a:schemeClr val="accent4"/>
+          </a:lnRef>
+          <a:fillRef idx="0">
+            <a:schemeClr val="accent4"/>
+          </a:fillRef>
+          <a:effectRef idx="2">
+            <a:schemeClr val="accent4"/>
+          </a:effectRef>
+          <a:fontRef idx="minor">
+            <a:schemeClr val="tx1"/>
+          </a:fontRef>
+        </p:style>
+        <p:txBody>
+          <a:bodyPr rtlCol="0" anchor="ctr"/>
+          <a:lstStyle/>
+          <a:p>
+            <a:pPr algn="ctr"/>
+            <a:endParaRPr lang="en-US"/>
+          </a:p>
+        </p:txBody>
+      </p:sp>
+      <p:sp>
+        <p:nvSpPr>
+          <p:cNvPr id="84" name="TextBox 83">
+            <a:extLst>
+              <a:ext uri="{FF2B5EF4-FFF2-40B4-BE49-F238E27FC236}">
+                <a16:creationId xmlns:a16="http://schemas.microsoft.com/office/drawing/2014/main" id="{170E4FF2-8E7D-4C86-8301-FF54E79B5D4D}"/>
+              </a:ext>
+            </a:extLst>
+          </p:cNvPr>
+          <p:cNvSpPr txBox="1"/>
+          <p:nvPr/>
+        </p:nvSpPr>
+        <p:spPr>
+          <a:xfrm>
+            <a:off x="1105989" y="5159829"/>
+            <a:ext cx="2722776" cy="1200329"/>
+          </a:xfrm>
+          <a:prstGeom prst="rect">
+            <a:avLst/>
+          </a:prstGeom>
+          <a:noFill/>
+        </p:spPr>
+        <p:txBody>
+          <a:bodyPr wrap="square" rtlCol="0">
+            <a:spAutoFit/>
+          </a:bodyPr>
+          <a:lstStyle/>
+          <a:p>
+            <a:r>
+              <a:rPr lang="en-US" dirty="0"/>
+              <a:t>Traffic comes out of the right lanes at “END” and out of left lanes at “START” of the road</a:t>
+            </a:r>
+          </a:p>
+        </p:txBody>
+      </p:sp>
+    </p:spTree>
+    <p:extLst>
+      <p:ext uri="{BB962C8B-B14F-4D97-AF65-F5344CB8AC3E}">
+        <p14:creationId xmlns:p14="http://schemas.microsoft.com/office/powerpoint/2010/main" val="2948483478"/>
+      </p:ext>
+    </p:extLst>
+  </p:cSld>
+  <p:clrMapOvr>
+    <a:masterClrMapping/>
+  </p:clrMapOvr>
+</p:sld>
+</file>
+
 <file path=ppt/slides/slide3.xml><?xml version="1.0" encoding="utf-8"?>
 <p:sld xmlns:a="http://schemas.openxmlformats.org/drawingml/2006/main" xmlns:r="http://schemas.openxmlformats.org/officeDocument/2006/relationships" xmlns:p="http://schemas.openxmlformats.org/presentationml/2006/main">
   <p:cSld>

</xml_diff>

<commit_message>
strategies to generate diff lane configurations in junctions
</commit_message>
<xml_diff>
--- a/plan/challenges.pptx
+++ b/plan/challenges.pptx
@@ -33,6 +33,12 @@
     <p:sldId id="281" r:id="rId27"/>
     <p:sldId id="282" r:id="rId28"/>
     <p:sldId id="283" r:id="rId29"/>
+    <p:sldId id="284" r:id="rId30"/>
+    <p:sldId id="285" r:id="rId31"/>
+    <p:sldId id="286" r:id="rId32"/>
+    <p:sldId id="287" r:id="rId33"/>
+    <p:sldId id="289" r:id="rId34"/>
+    <p:sldId id="288" r:id="rId35"/>
   </p:sldIdLst>
   <p:sldSz cx="12192000" cy="6858000"/>
   <p:notesSz cx="6858000" cy="9144000"/>
@@ -286,7 +292,7 @@
           <a:p>
             <a:fld id="{76031F30-5868-4F85-A273-006B44ACFCE8}" type="datetimeFigureOut">
               <a:rPr lang="en-US" smtClean="0"/>
-              <a:t>12/21/2020</a:t>
+              <a:t>12/26/2020</a:t>
             </a:fld>
             <a:endParaRPr lang="en-US"/>
           </a:p>
@@ -484,7 +490,7 @@
           <a:p>
             <a:fld id="{76031F30-5868-4F85-A273-006B44ACFCE8}" type="datetimeFigureOut">
               <a:rPr lang="en-US" smtClean="0"/>
-              <a:t>12/21/2020</a:t>
+              <a:t>12/26/2020</a:t>
             </a:fld>
             <a:endParaRPr lang="en-US"/>
           </a:p>
@@ -692,7 +698,7 @@
           <a:p>
             <a:fld id="{76031F30-5868-4F85-A273-006B44ACFCE8}" type="datetimeFigureOut">
               <a:rPr lang="en-US" smtClean="0"/>
-              <a:t>12/21/2020</a:t>
+              <a:t>12/26/2020</a:t>
             </a:fld>
             <a:endParaRPr lang="en-US"/>
           </a:p>
@@ -890,7 +896,7 @@
           <a:p>
             <a:fld id="{76031F30-5868-4F85-A273-006B44ACFCE8}" type="datetimeFigureOut">
               <a:rPr lang="en-US" smtClean="0"/>
-              <a:t>12/21/2020</a:t>
+              <a:t>12/26/2020</a:t>
             </a:fld>
             <a:endParaRPr lang="en-US"/>
           </a:p>
@@ -1165,7 +1171,7 @@
           <a:p>
             <a:fld id="{76031F30-5868-4F85-A273-006B44ACFCE8}" type="datetimeFigureOut">
               <a:rPr lang="en-US" smtClean="0"/>
-              <a:t>12/21/2020</a:t>
+              <a:t>12/26/2020</a:t>
             </a:fld>
             <a:endParaRPr lang="en-US"/>
           </a:p>
@@ -1430,7 +1436,7 @@
           <a:p>
             <a:fld id="{76031F30-5868-4F85-A273-006B44ACFCE8}" type="datetimeFigureOut">
               <a:rPr lang="en-US" smtClean="0"/>
-              <a:t>12/21/2020</a:t>
+              <a:t>12/26/2020</a:t>
             </a:fld>
             <a:endParaRPr lang="en-US"/>
           </a:p>
@@ -1842,7 +1848,7 @@
           <a:p>
             <a:fld id="{76031F30-5868-4F85-A273-006B44ACFCE8}" type="datetimeFigureOut">
               <a:rPr lang="en-US" smtClean="0"/>
-              <a:t>12/21/2020</a:t>
+              <a:t>12/26/2020</a:t>
             </a:fld>
             <a:endParaRPr lang="en-US"/>
           </a:p>
@@ -1983,7 +1989,7 @@
           <a:p>
             <a:fld id="{76031F30-5868-4F85-A273-006B44ACFCE8}" type="datetimeFigureOut">
               <a:rPr lang="en-US" smtClean="0"/>
-              <a:t>12/21/2020</a:t>
+              <a:t>12/26/2020</a:t>
             </a:fld>
             <a:endParaRPr lang="en-US"/>
           </a:p>
@@ -2096,7 +2102,7 @@
           <a:p>
             <a:fld id="{76031F30-5868-4F85-A273-006B44ACFCE8}" type="datetimeFigureOut">
               <a:rPr lang="en-US" smtClean="0"/>
-              <a:t>12/21/2020</a:t>
+              <a:t>12/26/2020</a:t>
             </a:fld>
             <a:endParaRPr lang="en-US"/>
           </a:p>
@@ -2407,7 +2413,7 @@
           <a:p>
             <a:fld id="{76031F30-5868-4F85-A273-006B44ACFCE8}" type="datetimeFigureOut">
               <a:rPr lang="en-US" smtClean="0"/>
-              <a:t>12/21/2020</a:t>
+              <a:t>12/26/2020</a:t>
             </a:fld>
             <a:endParaRPr lang="en-US"/>
           </a:p>
@@ -2695,7 +2701,7 @@
           <a:p>
             <a:fld id="{76031F30-5868-4F85-A273-006B44ACFCE8}" type="datetimeFigureOut">
               <a:rPr lang="en-US" smtClean="0"/>
-              <a:t>12/21/2020</a:t>
+              <a:t>12/26/2020</a:t>
             </a:fld>
             <a:endParaRPr lang="en-US"/>
           </a:p>
@@ -2936,7 +2942,7 @@
           <a:p>
             <a:fld id="{76031F30-5868-4F85-A273-006B44ACFCE8}" type="datetimeFigureOut">
               <a:rPr lang="en-US" smtClean="0"/>
-              <a:t>12/21/2020</a:t>
+              <a:t>12/26/2020</a:t>
             </a:fld>
             <a:endParaRPr lang="en-US"/>
           </a:p>
@@ -12041,6 +12047,113 @@
 </p:sld>
 </file>
 
+<file path=ppt/slides/slide29.xml><?xml version="1.0" encoding="utf-8"?>
+<p:sld xmlns:a="http://schemas.openxmlformats.org/drawingml/2006/main" xmlns:r="http://schemas.openxmlformats.org/officeDocument/2006/relationships" xmlns:p="http://schemas.openxmlformats.org/presentationml/2006/main">
+  <p:cSld>
+    <p:spTree>
+      <p:nvGrpSpPr>
+        <p:cNvPr id="1" name=""/>
+        <p:cNvGrpSpPr/>
+        <p:nvPr/>
+      </p:nvGrpSpPr>
+      <p:grpSpPr>
+        <a:xfrm>
+          <a:off x="0" y="0"/>
+          <a:ext cx="0" cy="0"/>
+          <a:chOff x="0" y="0"/>
+          <a:chExt cx="0" cy="0"/>
+        </a:xfrm>
+      </p:grpSpPr>
+      <p:sp>
+        <p:nvSpPr>
+          <p:cNvPr id="2" name="Title 1">
+            <a:extLst>
+              <a:ext uri="{FF2B5EF4-FFF2-40B4-BE49-F238E27FC236}">
+                <a16:creationId xmlns:a16="http://schemas.microsoft.com/office/drawing/2014/main" id="{50BE8112-7439-42CE-B0C2-74150D9DDAF9}"/>
+              </a:ext>
+            </a:extLst>
+          </p:cNvPr>
+          <p:cNvSpPr>
+            <a:spLocks noGrp="1"/>
+          </p:cNvSpPr>
+          <p:nvPr>
+            <p:ph type="title"/>
+          </p:nvPr>
+        </p:nvSpPr>
+        <p:spPr/>
+        <p:txBody>
+          <a:bodyPr/>
+          <a:lstStyle/>
+          <a:p>
+            <a:r>
+              <a:rPr lang="en-US" dirty="0"/>
+              <a:t>25. Possible strategies for junction generation with different lane connections</a:t>
+            </a:r>
+          </a:p>
+        </p:txBody>
+      </p:sp>
+      <p:sp>
+        <p:nvSpPr>
+          <p:cNvPr id="3" name="Content Placeholder 2">
+            <a:extLst>
+              <a:ext uri="{FF2B5EF4-FFF2-40B4-BE49-F238E27FC236}">
+                <a16:creationId xmlns:a16="http://schemas.microsoft.com/office/drawing/2014/main" id="{2048C19F-100D-40B4-B490-4F66D21951C2}"/>
+              </a:ext>
+            </a:extLst>
+          </p:cNvPr>
+          <p:cNvSpPr>
+            <a:spLocks noGrp="1"/>
+          </p:cNvSpPr>
+          <p:nvPr>
+            <p:ph idx="1"/>
+          </p:nvPr>
+        </p:nvSpPr>
+        <p:spPr/>
+        <p:txBody>
+          <a:bodyPr/>
+          <a:lstStyle/>
+          <a:p>
+            <a:r>
+              <a:rPr lang="en-US" dirty="0"/>
+              <a:t>Turns depend on signals</a:t>
+            </a:r>
+          </a:p>
+          <a:p>
+            <a:r>
+              <a:rPr lang="en-US" dirty="0"/>
+              <a:t>Signals depend on turns</a:t>
+            </a:r>
+          </a:p>
+          <a:p>
+            <a:r>
+              <a:rPr lang="en-US" dirty="0"/>
+              <a:t>Turn-first strategy vs signal first strategy vs deletion strategy</a:t>
+            </a:r>
+          </a:p>
+          <a:p>
+            <a:r>
+              <a:rPr lang="en-US" dirty="0"/>
+              <a:t>Don’t allow merges inside junctions, but allow extensions. </a:t>
+            </a:r>
+          </a:p>
+          <a:p>
+            <a:endParaRPr lang="en-US" dirty="0"/>
+          </a:p>
+        </p:txBody>
+      </p:sp>
+    </p:spTree>
+    <p:extLst>
+      <p:ext uri="{BB962C8B-B14F-4D97-AF65-F5344CB8AC3E}">
+        <p14:creationId xmlns:p14="http://schemas.microsoft.com/office/powerpoint/2010/main" val="288755931"/>
+      </p:ext>
+    </p:extLst>
+  </p:cSld>
+  <p:clrMapOvr>
+    <a:masterClrMapping/>
+  </p:clrMapOvr>
+</p:sld>
+</file>
+
 <file path=ppt/slides/slide3.xml><?xml version="1.0" encoding="utf-8"?>
 <p:sld xmlns:a="http://schemas.openxmlformats.org/drawingml/2006/main" xmlns:r="http://schemas.openxmlformats.org/officeDocument/2006/relationships" xmlns:p="http://schemas.openxmlformats.org/presentationml/2006/main">
   <p:cSld>
@@ -12125,6 +12238,489 @@
     <p:extLst>
       <p:ext uri="{BB962C8B-B14F-4D97-AF65-F5344CB8AC3E}">
         <p14:creationId xmlns:p14="http://schemas.microsoft.com/office/powerpoint/2010/main" val="352550685"/>
+      </p:ext>
+    </p:extLst>
+  </p:cSld>
+  <p:clrMapOvr>
+    <a:masterClrMapping/>
+  </p:clrMapOvr>
+</p:sld>
+</file>
+
+<file path=ppt/slides/slide30.xml><?xml version="1.0" encoding="utf-8"?>
+<p:sld xmlns:a="http://schemas.openxmlformats.org/drawingml/2006/main" xmlns:r="http://schemas.openxmlformats.org/officeDocument/2006/relationships" xmlns:p="http://schemas.openxmlformats.org/presentationml/2006/main">
+  <p:cSld>
+    <p:spTree>
+      <p:nvGrpSpPr>
+        <p:cNvPr id="1" name=""/>
+        <p:cNvGrpSpPr/>
+        <p:nvPr/>
+      </p:nvGrpSpPr>
+      <p:grpSpPr>
+        <a:xfrm>
+          <a:off x="0" y="0"/>
+          <a:ext cx="0" cy="0"/>
+          <a:chOff x="0" y="0"/>
+          <a:chExt cx="0" cy="0"/>
+        </a:xfrm>
+      </p:grpSpPr>
+      <p:sp>
+        <p:nvSpPr>
+          <p:cNvPr id="2" name="Title 1">
+            <a:extLst>
+              <a:ext uri="{FF2B5EF4-FFF2-40B4-BE49-F238E27FC236}">
+                <a16:creationId xmlns:a16="http://schemas.microsoft.com/office/drawing/2014/main" id="{A602C7AB-5E01-4D42-A972-AE9BAFC2952B}"/>
+              </a:ext>
+            </a:extLst>
+          </p:cNvPr>
+          <p:cNvSpPr>
+            <a:spLocks noGrp="1"/>
+          </p:cNvSpPr>
+          <p:nvPr>
+            <p:ph type="title"/>
+          </p:nvPr>
+        </p:nvSpPr>
+        <p:spPr/>
+        <p:txBody>
+          <a:bodyPr/>
+          <a:lstStyle/>
+          <a:p>
+            <a:r>
+              <a:rPr lang="en-US" dirty="0"/>
+              <a:t>25.1 Deletion strategy</a:t>
+            </a:r>
+          </a:p>
+        </p:txBody>
+      </p:sp>
+      <p:sp>
+        <p:nvSpPr>
+          <p:cNvPr id="3" name="Content Placeholder 2">
+            <a:extLst>
+              <a:ext uri="{FF2B5EF4-FFF2-40B4-BE49-F238E27FC236}">
+                <a16:creationId xmlns:a16="http://schemas.microsoft.com/office/drawing/2014/main" id="{84E100EB-8E6B-4EFD-9EA1-586A00794CFD}"/>
+              </a:ext>
+            </a:extLst>
+          </p:cNvPr>
+          <p:cNvSpPr>
+            <a:spLocks noGrp="1"/>
+          </p:cNvSpPr>
+          <p:nvPr>
+            <p:ph idx="1"/>
+          </p:nvPr>
+        </p:nvSpPr>
+        <p:spPr/>
+        <p:txBody>
+          <a:bodyPr/>
+          <a:lstStyle/>
+          <a:p>
+            <a:r>
+              <a:rPr lang="en-US" dirty="0"/>
+              <a:t>Connect all lanes with each other with 1-lane connection roads. Based on signal rules or agent simulation, delete connection roads</a:t>
+            </a:r>
+          </a:p>
+          <a:p>
+            <a:r>
+              <a:rPr lang="en-US" dirty="0"/>
+              <a:t>Detect lane crossings for a given direction of traffic.</a:t>
+            </a:r>
+          </a:p>
+        </p:txBody>
+      </p:sp>
+    </p:spTree>
+    <p:extLst>
+      <p:ext uri="{BB962C8B-B14F-4D97-AF65-F5344CB8AC3E}">
+        <p14:creationId xmlns:p14="http://schemas.microsoft.com/office/powerpoint/2010/main" val="2785169395"/>
+      </p:ext>
+    </p:extLst>
+  </p:cSld>
+  <p:clrMapOvr>
+    <a:masterClrMapping/>
+  </p:clrMapOvr>
+</p:sld>
+</file>
+
+<file path=ppt/slides/slide31.xml><?xml version="1.0" encoding="utf-8"?>
+<p:sld xmlns:a="http://schemas.openxmlformats.org/drawingml/2006/main" xmlns:r="http://schemas.openxmlformats.org/officeDocument/2006/relationships" xmlns:p="http://schemas.openxmlformats.org/presentationml/2006/main">
+  <p:cSld>
+    <p:spTree>
+      <p:nvGrpSpPr>
+        <p:cNvPr id="1" name=""/>
+        <p:cNvGrpSpPr/>
+        <p:nvPr/>
+      </p:nvGrpSpPr>
+      <p:grpSpPr>
+        <a:xfrm>
+          <a:off x="0" y="0"/>
+          <a:ext cx="0" cy="0"/>
+          <a:chOff x="0" y="0"/>
+          <a:chExt cx="0" cy="0"/>
+        </a:xfrm>
+      </p:grpSpPr>
+      <p:sp>
+        <p:nvSpPr>
+          <p:cNvPr id="2" name="Title 1">
+            <a:extLst>
+              <a:ext uri="{FF2B5EF4-FFF2-40B4-BE49-F238E27FC236}">
+                <a16:creationId xmlns:a16="http://schemas.microsoft.com/office/drawing/2014/main" id="{0BFF6BE7-3F09-4580-9A21-2A0E4FE82527}"/>
+              </a:ext>
+            </a:extLst>
+          </p:cNvPr>
+          <p:cNvSpPr>
+            <a:spLocks noGrp="1"/>
+          </p:cNvSpPr>
+          <p:nvPr>
+            <p:ph type="title"/>
+          </p:nvPr>
+        </p:nvSpPr>
+        <p:spPr/>
+        <p:txBody>
+          <a:bodyPr/>
+          <a:lstStyle/>
+          <a:p>
+            <a:r>
+              <a:rPr lang="en-US" dirty="0"/>
+              <a:t>25.2 Turn first strategy</a:t>
+            </a:r>
+          </a:p>
+        </p:txBody>
+      </p:sp>
+      <p:sp>
+        <p:nvSpPr>
+          <p:cNvPr id="3" name="Content Placeholder 2">
+            <a:extLst>
+              <a:ext uri="{FF2B5EF4-FFF2-40B4-BE49-F238E27FC236}">
+                <a16:creationId xmlns:a16="http://schemas.microsoft.com/office/drawing/2014/main" id="{EEE91578-EC5B-4024-BCDD-A08044AA2A01}"/>
+              </a:ext>
+            </a:extLst>
+          </p:cNvPr>
+          <p:cNvSpPr>
+            <a:spLocks noGrp="1"/>
+          </p:cNvSpPr>
+          <p:nvPr>
+            <p:ph idx="1"/>
+          </p:nvPr>
+        </p:nvSpPr>
+        <p:spPr/>
+        <p:txBody>
+          <a:bodyPr/>
+          <a:lstStyle/>
+          <a:p>
+            <a:r>
+              <a:rPr lang="en-US" dirty="0"/>
+              <a:t>Harvest roads with different types of turns</a:t>
+            </a:r>
+          </a:p>
+          <a:p>
+            <a:r>
+              <a:rPr lang="en-US" dirty="0"/>
+              <a:t>Connect without crossings (all possible valid junctions given a set of roads with different types of turns)</a:t>
+            </a:r>
+          </a:p>
+          <a:p>
+            <a:endParaRPr lang="en-US" dirty="0"/>
+          </a:p>
+        </p:txBody>
+      </p:sp>
+    </p:spTree>
+    <p:extLst>
+      <p:ext uri="{BB962C8B-B14F-4D97-AF65-F5344CB8AC3E}">
+        <p14:creationId xmlns:p14="http://schemas.microsoft.com/office/powerpoint/2010/main" val="854367423"/>
+      </p:ext>
+    </p:extLst>
+  </p:cSld>
+  <p:clrMapOvr>
+    <a:masterClrMapping/>
+  </p:clrMapOvr>
+</p:sld>
+</file>
+
+<file path=ppt/slides/slide32.xml><?xml version="1.0" encoding="utf-8"?>
+<p:sld xmlns:a="http://schemas.openxmlformats.org/drawingml/2006/main" xmlns:r="http://schemas.openxmlformats.org/officeDocument/2006/relationships" xmlns:p="http://schemas.openxmlformats.org/presentationml/2006/main">
+  <p:cSld>
+    <p:spTree>
+      <p:nvGrpSpPr>
+        <p:cNvPr id="1" name=""/>
+        <p:cNvGrpSpPr/>
+        <p:nvPr/>
+      </p:nvGrpSpPr>
+      <p:grpSpPr>
+        <a:xfrm>
+          <a:off x="0" y="0"/>
+          <a:ext cx="0" cy="0"/>
+          <a:chOff x="0" y="0"/>
+          <a:chExt cx="0" cy="0"/>
+        </a:xfrm>
+      </p:grpSpPr>
+      <p:sp>
+        <p:nvSpPr>
+          <p:cNvPr id="2" name="Title 1">
+            <a:extLst>
+              <a:ext uri="{FF2B5EF4-FFF2-40B4-BE49-F238E27FC236}">
+                <a16:creationId xmlns:a16="http://schemas.microsoft.com/office/drawing/2014/main" id="{7E7CEA86-94C1-48E8-8D00-A643F1F9AD2A}"/>
+              </a:ext>
+            </a:extLst>
+          </p:cNvPr>
+          <p:cNvSpPr>
+            <a:spLocks noGrp="1"/>
+          </p:cNvSpPr>
+          <p:nvPr>
+            <p:ph type="title"/>
+          </p:nvPr>
+        </p:nvSpPr>
+        <p:spPr/>
+        <p:txBody>
+          <a:bodyPr/>
+          <a:lstStyle/>
+          <a:p>
+            <a:r>
+              <a:rPr lang="en-US" dirty="0"/>
+              <a:t>25.3 Signal first strategy</a:t>
+            </a:r>
+          </a:p>
+        </p:txBody>
+      </p:sp>
+      <p:sp>
+        <p:nvSpPr>
+          <p:cNvPr id="3" name="Content Placeholder 2">
+            <a:extLst>
+              <a:ext uri="{FF2B5EF4-FFF2-40B4-BE49-F238E27FC236}">
+                <a16:creationId xmlns:a16="http://schemas.microsoft.com/office/drawing/2014/main" id="{FDACD2EF-2EE4-4515-903B-6C5952C9100D}"/>
+              </a:ext>
+            </a:extLst>
+          </p:cNvPr>
+          <p:cNvSpPr>
+            <a:spLocks noGrp="1"/>
+          </p:cNvSpPr>
+          <p:nvPr>
+            <p:ph idx="1"/>
+          </p:nvPr>
+        </p:nvSpPr>
+        <p:spPr/>
+        <p:txBody>
+          <a:bodyPr/>
+          <a:lstStyle/>
+          <a:p>
+            <a:r>
+              <a:rPr lang="en-US" dirty="0"/>
+              <a:t>Based on road positions, signals, and direction of traffic, select pairs of roads to be connected</a:t>
+            </a:r>
+          </a:p>
+          <a:p>
+            <a:r>
+              <a:rPr lang="en-US" dirty="0"/>
+              <a:t>Create required lanes on the roads</a:t>
+            </a:r>
+          </a:p>
+          <a:p>
+            <a:r>
+              <a:rPr lang="en-US" dirty="0"/>
+              <a:t>Create connection roads.</a:t>
+            </a:r>
+          </a:p>
+        </p:txBody>
+      </p:sp>
+    </p:spTree>
+    <p:extLst>
+      <p:ext uri="{BB962C8B-B14F-4D97-AF65-F5344CB8AC3E}">
+        <p14:creationId xmlns:p14="http://schemas.microsoft.com/office/powerpoint/2010/main" val="3537106230"/>
+      </p:ext>
+    </p:extLst>
+  </p:cSld>
+  <p:clrMapOvr>
+    <a:masterClrMapping/>
+  </p:clrMapOvr>
+</p:sld>
+</file>
+
+<file path=ppt/slides/slide33.xml><?xml version="1.0" encoding="utf-8"?>
+<p:sld xmlns:a="http://schemas.openxmlformats.org/drawingml/2006/main" xmlns:r="http://schemas.openxmlformats.org/officeDocument/2006/relationships" xmlns:p="http://schemas.openxmlformats.org/presentationml/2006/main">
+  <p:cSld>
+    <p:spTree>
+      <p:nvGrpSpPr>
+        <p:cNvPr id="1" name=""/>
+        <p:cNvGrpSpPr/>
+        <p:nvPr/>
+      </p:nvGrpSpPr>
+      <p:grpSpPr>
+        <a:xfrm>
+          <a:off x="0" y="0"/>
+          <a:ext cx="0" cy="0"/>
+          <a:chOff x="0" y="0"/>
+          <a:chExt cx="0" cy="0"/>
+        </a:xfrm>
+      </p:grpSpPr>
+      <p:sp>
+        <p:nvSpPr>
+          <p:cNvPr id="2" name="Title 1">
+            <a:extLst>
+              <a:ext uri="{FF2B5EF4-FFF2-40B4-BE49-F238E27FC236}">
+                <a16:creationId xmlns:a16="http://schemas.microsoft.com/office/drawing/2014/main" id="{F97DA4AB-0AEF-4A78-83F0-BCD5B9262B1E}"/>
+              </a:ext>
+            </a:extLst>
+          </p:cNvPr>
+          <p:cNvSpPr>
+            <a:spLocks noGrp="1"/>
+          </p:cNvSpPr>
+          <p:nvPr>
+            <p:ph type="title"/>
+          </p:nvPr>
+        </p:nvSpPr>
+        <p:spPr/>
+        <p:txBody>
+          <a:bodyPr/>
+          <a:lstStyle/>
+          <a:p>
+            <a:r>
+              <a:rPr lang="en-US" dirty="0"/>
+              <a:t>25.4 Basic rules</a:t>
+            </a:r>
+          </a:p>
+        </p:txBody>
+      </p:sp>
+      <p:sp>
+        <p:nvSpPr>
+          <p:cNvPr id="3" name="Content Placeholder 2">
+            <a:extLst>
+              <a:ext uri="{FF2B5EF4-FFF2-40B4-BE49-F238E27FC236}">
+                <a16:creationId xmlns:a16="http://schemas.microsoft.com/office/drawing/2014/main" id="{C60DAFF6-21A2-415E-A1AC-96B754B20A61}"/>
+              </a:ext>
+            </a:extLst>
+          </p:cNvPr>
+          <p:cNvSpPr>
+            <a:spLocks noGrp="1"/>
+          </p:cNvSpPr>
+          <p:nvPr>
+            <p:ph idx="1"/>
+          </p:nvPr>
+        </p:nvSpPr>
+        <p:spPr/>
+        <p:txBody>
+          <a:bodyPr/>
+          <a:lstStyle/>
+          <a:p>
+            <a:r>
+              <a:rPr lang="en-US" dirty="0"/>
+              <a:t>A straight lane cannot exist on the left of a left</a:t>
+            </a:r>
+            <a:r>
+              <a:rPr lang="en-US"/>
+              <a:t>/left-straight </a:t>
+            </a:r>
+            <a:r>
+              <a:rPr lang="en-US" dirty="0"/>
+              <a:t>turn lane (lane crossing). Same for right.</a:t>
+            </a:r>
+          </a:p>
+          <a:p>
+            <a:r>
+              <a:rPr lang="en-US" dirty="0"/>
+              <a:t>No merge in a connection road inside junctions</a:t>
+            </a:r>
+          </a:p>
+          <a:p>
+            <a:r>
+              <a:rPr lang="en-US" dirty="0"/>
+              <a:t>2 separate connection roads can cross because they can be controlled by signaling.</a:t>
+            </a:r>
+          </a:p>
+          <a:p>
+            <a:endParaRPr lang="en-US" dirty="0"/>
+          </a:p>
+          <a:p>
+            <a:endParaRPr lang="en-US" dirty="0"/>
+          </a:p>
+        </p:txBody>
+      </p:sp>
+    </p:spTree>
+    <p:extLst>
+      <p:ext uri="{BB962C8B-B14F-4D97-AF65-F5344CB8AC3E}">
+        <p14:creationId xmlns:p14="http://schemas.microsoft.com/office/powerpoint/2010/main" val="1683857763"/>
+      </p:ext>
+    </p:extLst>
+  </p:cSld>
+  <p:clrMapOvr>
+    <a:masterClrMapping/>
+  </p:clrMapOvr>
+</p:sld>
+</file>
+
+<file path=ppt/slides/slide34.xml><?xml version="1.0" encoding="utf-8"?>
+<p:sld xmlns:a="http://schemas.openxmlformats.org/drawingml/2006/main" xmlns:r="http://schemas.openxmlformats.org/officeDocument/2006/relationships" xmlns:p="http://schemas.openxmlformats.org/presentationml/2006/main">
+  <p:cSld>
+    <p:spTree>
+      <p:nvGrpSpPr>
+        <p:cNvPr id="1" name=""/>
+        <p:cNvGrpSpPr/>
+        <p:nvPr/>
+      </p:nvGrpSpPr>
+      <p:grpSpPr>
+        <a:xfrm>
+          <a:off x="0" y="0"/>
+          <a:ext cx="0" cy="0"/>
+          <a:chOff x="0" y="0"/>
+          <a:chExt cx="0" cy="0"/>
+        </a:xfrm>
+      </p:grpSpPr>
+      <p:sp>
+        <p:nvSpPr>
+          <p:cNvPr id="2" name="Title 1">
+            <a:extLst>
+              <a:ext uri="{FF2B5EF4-FFF2-40B4-BE49-F238E27FC236}">
+                <a16:creationId xmlns:a16="http://schemas.microsoft.com/office/drawing/2014/main" id="{14C6F3AF-F629-4E2A-A7F0-DCDCABB2EB93}"/>
+              </a:ext>
+            </a:extLst>
+          </p:cNvPr>
+          <p:cNvSpPr>
+            <a:spLocks noGrp="1"/>
+          </p:cNvSpPr>
+          <p:nvPr>
+            <p:ph type="title"/>
+          </p:nvPr>
+        </p:nvSpPr>
+        <p:spPr/>
+        <p:txBody>
+          <a:bodyPr/>
+          <a:lstStyle/>
+          <a:p>
+            <a:r>
+              <a:rPr lang="en-US" dirty="0"/>
+              <a:t>26. Geometric variations of existing junctions</a:t>
+            </a:r>
+          </a:p>
+        </p:txBody>
+      </p:sp>
+      <p:sp>
+        <p:nvSpPr>
+          <p:cNvPr id="3" name="Content Placeholder 2">
+            <a:extLst>
+              <a:ext uri="{FF2B5EF4-FFF2-40B4-BE49-F238E27FC236}">
+                <a16:creationId xmlns:a16="http://schemas.microsoft.com/office/drawing/2014/main" id="{1C5611D8-D9F8-4501-BA07-135A83A40632}"/>
+              </a:ext>
+            </a:extLst>
+          </p:cNvPr>
+          <p:cNvSpPr>
+            <a:spLocks noGrp="1"/>
+          </p:cNvSpPr>
+          <p:nvPr>
+            <p:ph idx="1"/>
+          </p:nvPr>
+        </p:nvSpPr>
+        <p:spPr/>
+        <p:txBody>
+          <a:bodyPr/>
+          <a:lstStyle/>
+          <a:p>
+            <a:r>
+              <a:rPr lang="en-US" dirty="0"/>
+              <a:t>Without changing the lane configurations, find variations by changing the reference line geometries.</a:t>
+            </a:r>
+          </a:p>
+        </p:txBody>
+      </p:sp>
+    </p:spTree>
+    <p:extLst>
+      <p:ext uri="{BB962C8B-B14F-4D97-AF65-F5344CB8AC3E}">
+        <p14:creationId xmlns:p14="http://schemas.microsoft.com/office/powerpoint/2010/main" val="2802181580"/>
       </p:ext>
     </p:extLst>
   </p:cSld>

</xml_diff>

<commit_message>
adding linking incoming lanes to outgoing
</commit_message>
<xml_diff>
--- a/plan/challenges.pptx
+++ b/plan/challenges.pptx
@@ -45,6 +45,7 @@
     <p:sldId id="287" r:id="rId39"/>
     <p:sldId id="289" r:id="rId40"/>
     <p:sldId id="288" r:id="rId41"/>
+    <p:sldId id="296" r:id="rId42"/>
   </p:sldIdLst>
   <p:sldSz cx="12192000" cy="6858000"/>
   <p:notesSz cx="6858000" cy="9144000"/>
@@ -298,7 +299,7 @@
           <a:p>
             <a:fld id="{76031F30-5868-4F85-A273-006B44ACFCE8}" type="datetimeFigureOut">
               <a:rPr lang="en-US" smtClean="0"/>
-              <a:t>1/25/2021</a:t>
+              <a:t>2/22/2021</a:t>
             </a:fld>
             <a:endParaRPr lang="en-US"/>
           </a:p>
@@ -496,7 +497,7 @@
           <a:p>
             <a:fld id="{76031F30-5868-4F85-A273-006B44ACFCE8}" type="datetimeFigureOut">
               <a:rPr lang="en-US" smtClean="0"/>
-              <a:t>1/25/2021</a:t>
+              <a:t>2/22/2021</a:t>
             </a:fld>
             <a:endParaRPr lang="en-US"/>
           </a:p>
@@ -704,7 +705,7 @@
           <a:p>
             <a:fld id="{76031F30-5868-4F85-A273-006B44ACFCE8}" type="datetimeFigureOut">
               <a:rPr lang="en-US" smtClean="0"/>
-              <a:t>1/25/2021</a:t>
+              <a:t>2/22/2021</a:t>
             </a:fld>
             <a:endParaRPr lang="en-US"/>
           </a:p>
@@ -902,7 +903,7 @@
           <a:p>
             <a:fld id="{76031F30-5868-4F85-A273-006B44ACFCE8}" type="datetimeFigureOut">
               <a:rPr lang="en-US" smtClean="0"/>
-              <a:t>1/25/2021</a:t>
+              <a:t>2/22/2021</a:t>
             </a:fld>
             <a:endParaRPr lang="en-US"/>
           </a:p>
@@ -1177,7 +1178,7 @@
           <a:p>
             <a:fld id="{76031F30-5868-4F85-A273-006B44ACFCE8}" type="datetimeFigureOut">
               <a:rPr lang="en-US" smtClean="0"/>
-              <a:t>1/25/2021</a:t>
+              <a:t>2/22/2021</a:t>
             </a:fld>
             <a:endParaRPr lang="en-US"/>
           </a:p>
@@ -1442,7 +1443,7 @@
           <a:p>
             <a:fld id="{76031F30-5868-4F85-A273-006B44ACFCE8}" type="datetimeFigureOut">
               <a:rPr lang="en-US" smtClean="0"/>
-              <a:t>1/25/2021</a:t>
+              <a:t>2/22/2021</a:t>
             </a:fld>
             <a:endParaRPr lang="en-US"/>
           </a:p>
@@ -1854,7 +1855,7 @@
           <a:p>
             <a:fld id="{76031F30-5868-4F85-A273-006B44ACFCE8}" type="datetimeFigureOut">
               <a:rPr lang="en-US" smtClean="0"/>
-              <a:t>1/25/2021</a:t>
+              <a:t>2/22/2021</a:t>
             </a:fld>
             <a:endParaRPr lang="en-US"/>
           </a:p>
@@ -1995,7 +1996,7 @@
           <a:p>
             <a:fld id="{76031F30-5868-4F85-A273-006B44ACFCE8}" type="datetimeFigureOut">
               <a:rPr lang="en-US" smtClean="0"/>
-              <a:t>1/25/2021</a:t>
+              <a:t>2/22/2021</a:t>
             </a:fld>
             <a:endParaRPr lang="en-US"/>
           </a:p>
@@ -2108,7 +2109,7 @@
           <a:p>
             <a:fld id="{76031F30-5868-4F85-A273-006B44ACFCE8}" type="datetimeFigureOut">
               <a:rPr lang="en-US" smtClean="0"/>
-              <a:t>1/25/2021</a:t>
+              <a:t>2/22/2021</a:t>
             </a:fld>
             <a:endParaRPr lang="en-US"/>
           </a:p>
@@ -2419,7 +2420,7 @@
           <a:p>
             <a:fld id="{76031F30-5868-4F85-A273-006B44ACFCE8}" type="datetimeFigureOut">
               <a:rPr lang="en-US" smtClean="0"/>
-              <a:t>1/25/2021</a:t>
+              <a:t>2/22/2021</a:t>
             </a:fld>
             <a:endParaRPr lang="en-US"/>
           </a:p>
@@ -2707,7 +2708,7 @@
           <a:p>
             <a:fld id="{76031F30-5868-4F85-A273-006B44ACFCE8}" type="datetimeFigureOut">
               <a:rPr lang="en-US" smtClean="0"/>
-              <a:t>1/25/2021</a:t>
+              <a:t>2/22/2021</a:t>
             </a:fld>
             <a:endParaRPr lang="en-US"/>
           </a:p>
@@ -2948,7 +2949,7 @@
           <a:p>
             <a:fld id="{76031F30-5868-4F85-A273-006B44ACFCE8}" type="datetimeFigureOut">
               <a:rPr lang="en-US" smtClean="0"/>
-              <a:t>1/25/2021</a:t>
+              <a:t>2/22/2021</a:t>
             </a:fld>
             <a:endParaRPr lang="en-US"/>
           </a:p>
@@ -20261,6 +20262,458 @@
 </p:sld>
 </file>
 
+<file path=ppt/slides/slide41.xml><?xml version="1.0" encoding="utf-8"?>
+<p:sld xmlns:a="http://schemas.openxmlformats.org/drawingml/2006/main" xmlns:r="http://schemas.openxmlformats.org/officeDocument/2006/relationships" xmlns:p="http://schemas.openxmlformats.org/presentationml/2006/main">
+  <p:cSld>
+    <p:spTree>
+      <p:nvGrpSpPr>
+        <p:cNvPr id="1" name=""/>
+        <p:cNvGrpSpPr/>
+        <p:nvPr/>
+      </p:nvGrpSpPr>
+      <p:grpSpPr>
+        <a:xfrm>
+          <a:off x="0" y="0"/>
+          <a:ext cx="0" cy="0"/>
+          <a:chOff x="0" y="0"/>
+          <a:chExt cx="0" cy="0"/>
+        </a:xfrm>
+      </p:grpSpPr>
+      <p:sp>
+        <p:nvSpPr>
+          <p:cNvPr id="2" name="Title 1">
+            <a:extLst>
+              <a:ext uri="{FF2B5EF4-FFF2-40B4-BE49-F238E27FC236}">
+                <a16:creationId xmlns:a16="http://schemas.microsoft.com/office/drawing/2014/main" id="{884C41FC-B87D-4CB0-885D-4BD9A8C2C7DB}"/>
+              </a:ext>
+            </a:extLst>
+          </p:cNvPr>
+          <p:cNvSpPr>
+            <a:spLocks noGrp="1"/>
+          </p:cNvSpPr>
+          <p:nvPr>
+            <p:ph type="title"/>
+          </p:nvPr>
+        </p:nvSpPr>
+        <p:spPr/>
+        <p:txBody>
+          <a:bodyPr/>
+          <a:lstStyle/>
+          <a:p>
+            <a:r>
+              <a:rPr lang="en-US" dirty="0"/>
+              <a:t>Link Configurations Part 2</a:t>
+            </a:r>
+          </a:p>
+        </p:txBody>
+      </p:sp>
+      <p:cxnSp>
+        <p:nvCxnSpPr>
+          <p:cNvPr id="5" name="Straight Connector 4">
+            <a:extLst>
+              <a:ext uri="{FF2B5EF4-FFF2-40B4-BE49-F238E27FC236}">
+                <a16:creationId xmlns:a16="http://schemas.microsoft.com/office/drawing/2014/main" id="{C05A112C-C73E-455A-9114-7FAA133F32DD}"/>
+              </a:ext>
+            </a:extLst>
+          </p:cNvPr>
+          <p:cNvCxnSpPr/>
+          <p:nvPr/>
+        </p:nvCxnSpPr>
+        <p:spPr>
+          <a:xfrm>
+            <a:off x="1849869" y="3948354"/>
+            <a:ext cx="2081630" cy="0"/>
+          </a:xfrm>
+          <a:prstGeom prst="line">
+            <a:avLst/>
+          </a:prstGeom>
+        </p:spPr>
+        <p:style>
+          <a:lnRef idx="1">
+            <a:schemeClr val="accent1"/>
+          </a:lnRef>
+          <a:fillRef idx="0">
+            <a:schemeClr val="accent1"/>
+          </a:fillRef>
+          <a:effectRef idx="0">
+            <a:schemeClr val="accent1"/>
+          </a:effectRef>
+          <a:fontRef idx="minor">
+            <a:schemeClr val="tx1"/>
+          </a:fontRef>
+        </p:style>
+      </p:cxnSp>
+      <p:cxnSp>
+        <p:nvCxnSpPr>
+          <p:cNvPr id="6" name="Straight Connector 5">
+            <a:extLst>
+              <a:ext uri="{FF2B5EF4-FFF2-40B4-BE49-F238E27FC236}">
+                <a16:creationId xmlns:a16="http://schemas.microsoft.com/office/drawing/2014/main" id="{E89307D2-D1BC-4064-AE76-CFD2EC07A5FD}"/>
+              </a:ext>
+            </a:extLst>
+          </p:cNvPr>
+          <p:cNvCxnSpPr/>
+          <p:nvPr/>
+        </p:nvCxnSpPr>
+        <p:spPr>
+          <a:xfrm>
+            <a:off x="1849869" y="4189244"/>
+            <a:ext cx="2081630" cy="0"/>
+          </a:xfrm>
+          <a:prstGeom prst="line">
+            <a:avLst/>
+          </a:prstGeom>
+        </p:spPr>
+        <p:style>
+          <a:lnRef idx="1">
+            <a:schemeClr val="accent1"/>
+          </a:lnRef>
+          <a:fillRef idx="0">
+            <a:schemeClr val="accent1"/>
+          </a:fillRef>
+          <a:effectRef idx="0">
+            <a:schemeClr val="accent1"/>
+          </a:effectRef>
+          <a:fontRef idx="minor">
+            <a:schemeClr val="tx1"/>
+          </a:fontRef>
+        </p:style>
+      </p:cxnSp>
+      <p:cxnSp>
+        <p:nvCxnSpPr>
+          <p:cNvPr id="7" name="Straight Connector 6">
+            <a:extLst>
+              <a:ext uri="{FF2B5EF4-FFF2-40B4-BE49-F238E27FC236}">
+                <a16:creationId xmlns:a16="http://schemas.microsoft.com/office/drawing/2014/main" id="{11C484E9-4F8A-4C24-A6F4-ABA57DAF8EB5}"/>
+              </a:ext>
+            </a:extLst>
+          </p:cNvPr>
+          <p:cNvCxnSpPr/>
+          <p:nvPr/>
+        </p:nvCxnSpPr>
+        <p:spPr>
+          <a:xfrm>
+            <a:off x="6237163" y="3026228"/>
+            <a:ext cx="2081630" cy="0"/>
+          </a:xfrm>
+          <a:prstGeom prst="line">
+            <a:avLst/>
+          </a:prstGeom>
+          <a:ln>
+            <a:solidFill>
+              <a:srgbClr val="00B050"/>
+            </a:solidFill>
+          </a:ln>
+        </p:spPr>
+        <p:style>
+          <a:lnRef idx="1">
+            <a:schemeClr val="accent1"/>
+          </a:lnRef>
+          <a:fillRef idx="0">
+            <a:schemeClr val="accent1"/>
+          </a:fillRef>
+          <a:effectRef idx="0">
+            <a:schemeClr val="accent1"/>
+          </a:effectRef>
+          <a:fontRef idx="minor">
+            <a:schemeClr val="tx1"/>
+          </a:fontRef>
+        </p:style>
+      </p:cxnSp>
+      <p:cxnSp>
+        <p:nvCxnSpPr>
+          <p:cNvPr id="8" name="Straight Connector 7">
+            <a:extLst>
+              <a:ext uri="{FF2B5EF4-FFF2-40B4-BE49-F238E27FC236}">
+                <a16:creationId xmlns:a16="http://schemas.microsoft.com/office/drawing/2014/main" id="{AFAA4061-4802-4D97-8723-F6941AFE9C22}"/>
+              </a:ext>
+            </a:extLst>
+          </p:cNvPr>
+          <p:cNvCxnSpPr/>
+          <p:nvPr/>
+        </p:nvCxnSpPr>
+        <p:spPr>
+          <a:xfrm>
+            <a:off x="6237163" y="3267118"/>
+            <a:ext cx="2081630" cy="0"/>
+          </a:xfrm>
+          <a:prstGeom prst="line">
+            <a:avLst/>
+          </a:prstGeom>
+          <a:ln>
+            <a:solidFill>
+              <a:srgbClr val="00B050"/>
+            </a:solidFill>
+          </a:ln>
+        </p:spPr>
+        <p:style>
+          <a:lnRef idx="1">
+            <a:schemeClr val="accent1"/>
+          </a:lnRef>
+          <a:fillRef idx="0">
+            <a:schemeClr val="accent1"/>
+          </a:fillRef>
+          <a:effectRef idx="0">
+            <a:schemeClr val="accent1"/>
+          </a:effectRef>
+          <a:fontRef idx="minor">
+            <a:schemeClr val="tx1"/>
+          </a:fontRef>
+        </p:style>
+      </p:cxnSp>
+      <p:cxnSp>
+        <p:nvCxnSpPr>
+          <p:cNvPr id="9" name="Straight Connector 8">
+            <a:extLst>
+              <a:ext uri="{FF2B5EF4-FFF2-40B4-BE49-F238E27FC236}">
+                <a16:creationId xmlns:a16="http://schemas.microsoft.com/office/drawing/2014/main" id="{FBB442A0-D39E-4CBE-8D5C-FFE50AE6117A}"/>
+              </a:ext>
+            </a:extLst>
+          </p:cNvPr>
+          <p:cNvCxnSpPr/>
+          <p:nvPr/>
+        </p:nvCxnSpPr>
+        <p:spPr>
+          <a:xfrm>
+            <a:off x="6237163" y="3532589"/>
+            <a:ext cx="2081630" cy="0"/>
+          </a:xfrm>
+          <a:prstGeom prst="line">
+            <a:avLst/>
+          </a:prstGeom>
+          <a:ln>
+            <a:solidFill>
+              <a:srgbClr val="00B050"/>
+            </a:solidFill>
+          </a:ln>
+        </p:spPr>
+        <p:style>
+          <a:lnRef idx="1">
+            <a:schemeClr val="accent1"/>
+          </a:lnRef>
+          <a:fillRef idx="0">
+            <a:schemeClr val="accent1"/>
+          </a:fillRef>
+          <a:effectRef idx="0">
+            <a:schemeClr val="accent1"/>
+          </a:effectRef>
+          <a:fontRef idx="minor">
+            <a:schemeClr val="tx1"/>
+          </a:fontRef>
+        </p:style>
+      </p:cxnSp>
+      <p:cxnSp>
+        <p:nvCxnSpPr>
+          <p:cNvPr id="10" name="Straight Connector 9">
+            <a:extLst>
+              <a:ext uri="{FF2B5EF4-FFF2-40B4-BE49-F238E27FC236}">
+                <a16:creationId xmlns:a16="http://schemas.microsoft.com/office/drawing/2014/main" id="{6D595D23-1438-4DD5-975E-FF0E66284A3D}"/>
+              </a:ext>
+            </a:extLst>
+          </p:cNvPr>
+          <p:cNvCxnSpPr/>
+          <p:nvPr/>
+        </p:nvCxnSpPr>
+        <p:spPr>
+          <a:xfrm>
+            <a:off x="6237163" y="3773479"/>
+            <a:ext cx="2081630" cy="0"/>
+          </a:xfrm>
+          <a:prstGeom prst="line">
+            <a:avLst/>
+          </a:prstGeom>
+          <a:ln>
+            <a:solidFill>
+              <a:srgbClr val="00B050"/>
+            </a:solidFill>
+          </a:ln>
+        </p:spPr>
+        <p:style>
+          <a:lnRef idx="1">
+            <a:schemeClr val="accent1"/>
+          </a:lnRef>
+          <a:fillRef idx="0">
+            <a:schemeClr val="accent1"/>
+          </a:fillRef>
+          <a:effectRef idx="0">
+            <a:schemeClr val="accent1"/>
+          </a:effectRef>
+          <a:fontRef idx="minor">
+            <a:schemeClr val="tx1"/>
+          </a:fontRef>
+        </p:style>
+      </p:cxnSp>
+      <p:cxnSp>
+        <p:nvCxnSpPr>
+          <p:cNvPr id="11" name="Straight Connector 10">
+            <a:extLst>
+              <a:ext uri="{FF2B5EF4-FFF2-40B4-BE49-F238E27FC236}">
+                <a16:creationId xmlns:a16="http://schemas.microsoft.com/office/drawing/2014/main" id="{4445BF6C-6530-494F-9E49-69703A63550B}"/>
+              </a:ext>
+            </a:extLst>
+          </p:cNvPr>
+          <p:cNvCxnSpPr/>
+          <p:nvPr/>
+        </p:nvCxnSpPr>
+        <p:spPr>
+          <a:xfrm>
+            <a:off x="6237163" y="4055806"/>
+            <a:ext cx="2081630" cy="0"/>
+          </a:xfrm>
+          <a:prstGeom prst="line">
+            <a:avLst/>
+          </a:prstGeom>
+          <a:ln>
+            <a:solidFill>
+              <a:srgbClr val="00B050"/>
+            </a:solidFill>
+          </a:ln>
+        </p:spPr>
+        <p:style>
+          <a:lnRef idx="1">
+            <a:schemeClr val="accent1"/>
+          </a:lnRef>
+          <a:fillRef idx="0">
+            <a:schemeClr val="accent1"/>
+          </a:fillRef>
+          <a:effectRef idx="0">
+            <a:schemeClr val="accent1"/>
+          </a:effectRef>
+          <a:fontRef idx="minor">
+            <a:schemeClr val="tx1"/>
+          </a:fontRef>
+        </p:style>
+      </p:cxnSp>
+      <p:cxnSp>
+        <p:nvCxnSpPr>
+          <p:cNvPr id="12" name="Straight Connector 11">
+            <a:extLst>
+              <a:ext uri="{FF2B5EF4-FFF2-40B4-BE49-F238E27FC236}">
+                <a16:creationId xmlns:a16="http://schemas.microsoft.com/office/drawing/2014/main" id="{A83AB4A2-7504-46A2-ADD0-F50C1FFD0811}"/>
+              </a:ext>
+            </a:extLst>
+          </p:cNvPr>
+          <p:cNvCxnSpPr/>
+          <p:nvPr/>
+        </p:nvCxnSpPr>
+        <p:spPr>
+          <a:xfrm>
+            <a:off x="6237163" y="4296696"/>
+            <a:ext cx="2081630" cy="0"/>
+          </a:xfrm>
+          <a:prstGeom prst="line">
+            <a:avLst/>
+          </a:prstGeom>
+          <a:ln>
+            <a:solidFill>
+              <a:srgbClr val="00B050"/>
+            </a:solidFill>
+          </a:ln>
+        </p:spPr>
+        <p:style>
+          <a:lnRef idx="1">
+            <a:schemeClr val="accent1"/>
+          </a:lnRef>
+          <a:fillRef idx="0">
+            <a:schemeClr val="accent1"/>
+          </a:fillRef>
+          <a:effectRef idx="0">
+            <a:schemeClr val="accent1"/>
+          </a:effectRef>
+          <a:fontRef idx="minor">
+            <a:schemeClr val="tx1"/>
+          </a:fontRef>
+        </p:style>
+      </p:cxnSp>
+      <p:cxnSp>
+        <p:nvCxnSpPr>
+          <p:cNvPr id="13" name="Straight Connector 12">
+            <a:extLst>
+              <a:ext uri="{FF2B5EF4-FFF2-40B4-BE49-F238E27FC236}">
+                <a16:creationId xmlns:a16="http://schemas.microsoft.com/office/drawing/2014/main" id="{356ED67D-8CF6-4551-B0C6-952A39CF3EB6}"/>
+              </a:ext>
+            </a:extLst>
+          </p:cNvPr>
+          <p:cNvCxnSpPr/>
+          <p:nvPr/>
+        </p:nvCxnSpPr>
+        <p:spPr>
+          <a:xfrm>
+            <a:off x="1849869" y="3696226"/>
+            <a:ext cx="2081630" cy="0"/>
+          </a:xfrm>
+          <a:prstGeom prst="line">
+            <a:avLst/>
+          </a:prstGeom>
+        </p:spPr>
+        <p:style>
+          <a:lnRef idx="1">
+            <a:schemeClr val="accent1"/>
+          </a:lnRef>
+          <a:fillRef idx="0">
+            <a:schemeClr val="accent1"/>
+          </a:fillRef>
+          <a:effectRef idx="0">
+            <a:schemeClr val="accent1"/>
+          </a:effectRef>
+          <a:fontRef idx="minor">
+            <a:schemeClr val="tx1"/>
+          </a:fontRef>
+        </p:style>
+      </p:cxnSp>
+      <p:sp>
+        <p:nvSpPr>
+          <p:cNvPr id="14" name="TextBox 13">
+            <a:extLst>
+              <a:ext uri="{FF2B5EF4-FFF2-40B4-BE49-F238E27FC236}">
+                <a16:creationId xmlns:a16="http://schemas.microsoft.com/office/drawing/2014/main" id="{4B43F680-93DC-41E4-AF62-C62F13346B2D}"/>
+              </a:ext>
+            </a:extLst>
+          </p:cNvPr>
+          <p:cNvSpPr txBox="1"/>
+          <p:nvPr/>
+        </p:nvSpPr>
+        <p:spPr>
+          <a:xfrm>
+            <a:off x="4395018" y="5098728"/>
+            <a:ext cx="5477973" cy="1477328"/>
+          </a:xfrm>
+          <a:prstGeom prst="rect">
+            <a:avLst/>
+          </a:prstGeom>
+          <a:noFill/>
+        </p:spPr>
+        <p:txBody>
+          <a:bodyPr wrap="square" rtlCol="0">
+            <a:spAutoFit/>
+          </a:bodyPr>
+          <a:lstStyle/>
+          <a:p>
+            <a:r>
+              <a:rPr lang="en-US" dirty="0"/>
+              <a:t>Link configurations for incoming lanes to outgoing lanes can be simplified if we order the outgoing lanes in such a way that leftmost outgoing lane is at the top and rightmost at the bottom. In addition, we can split, but </a:t>
+            </a:r>
+            <a:r>
+              <a:rPr lang="en-US"/>
+              <a:t>cannot merge.</a:t>
+            </a:r>
+            <a:endParaRPr lang="en-US" dirty="0"/>
+          </a:p>
+        </p:txBody>
+      </p:sp>
+    </p:spTree>
+    <p:extLst>
+      <p:ext uri="{BB962C8B-B14F-4D97-AF65-F5344CB8AC3E}">
+        <p14:creationId xmlns:p14="http://schemas.microsoft.com/office/powerpoint/2010/main" val="2691692380"/>
+      </p:ext>
+    </p:extLst>
+  </p:cSld>
+  <p:clrMapOvr>
+    <a:masterClrMapping/>
+  </p:clrMapOvr>
+</p:sld>
+</file>
+
 <file path=ppt/slides/slide5.xml><?xml version="1.0" encoding="utf-8"?>
 <p:sld xmlns:a="http://schemas.openxmlformats.org/drawingml/2006/main" xmlns:r="http://schemas.openxmlformats.org/officeDocument/2006/relationships" xmlns:p="http://schemas.openxmlformats.org/presentationml/2006/main">
   <p:cSld>

</xml_diff>

<commit_message>
split first in lane configurations added
</commit_message>
<xml_diff>
--- a/plan/challenges.pptx
+++ b/plan/challenges.pptx
@@ -303,7 +303,7 @@
           <a:p>
             <a:fld id="{76031F30-5868-4F85-A273-006B44ACFCE8}" type="datetimeFigureOut">
               <a:rPr lang="en-US" smtClean="0"/>
-              <a:t>3/8/2021</a:t>
+              <a:t>3/10/2021</a:t>
             </a:fld>
             <a:endParaRPr lang="en-US"/>
           </a:p>
@@ -501,7 +501,7 @@
           <a:p>
             <a:fld id="{76031F30-5868-4F85-A273-006B44ACFCE8}" type="datetimeFigureOut">
               <a:rPr lang="en-US" smtClean="0"/>
-              <a:t>3/8/2021</a:t>
+              <a:t>3/10/2021</a:t>
             </a:fld>
             <a:endParaRPr lang="en-US"/>
           </a:p>
@@ -709,7 +709,7 @@
           <a:p>
             <a:fld id="{76031F30-5868-4F85-A273-006B44ACFCE8}" type="datetimeFigureOut">
               <a:rPr lang="en-US" smtClean="0"/>
-              <a:t>3/8/2021</a:t>
+              <a:t>3/10/2021</a:t>
             </a:fld>
             <a:endParaRPr lang="en-US"/>
           </a:p>
@@ -907,7 +907,7 @@
           <a:p>
             <a:fld id="{76031F30-5868-4F85-A273-006B44ACFCE8}" type="datetimeFigureOut">
               <a:rPr lang="en-US" smtClean="0"/>
-              <a:t>3/8/2021</a:t>
+              <a:t>3/10/2021</a:t>
             </a:fld>
             <a:endParaRPr lang="en-US"/>
           </a:p>
@@ -1182,7 +1182,7 @@
           <a:p>
             <a:fld id="{76031F30-5868-4F85-A273-006B44ACFCE8}" type="datetimeFigureOut">
               <a:rPr lang="en-US" smtClean="0"/>
-              <a:t>3/8/2021</a:t>
+              <a:t>3/10/2021</a:t>
             </a:fld>
             <a:endParaRPr lang="en-US"/>
           </a:p>
@@ -1447,7 +1447,7 @@
           <a:p>
             <a:fld id="{76031F30-5868-4F85-A273-006B44ACFCE8}" type="datetimeFigureOut">
               <a:rPr lang="en-US" smtClean="0"/>
-              <a:t>3/8/2021</a:t>
+              <a:t>3/10/2021</a:t>
             </a:fld>
             <a:endParaRPr lang="en-US"/>
           </a:p>
@@ -1859,7 +1859,7 @@
           <a:p>
             <a:fld id="{76031F30-5868-4F85-A273-006B44ACFCE8}" type="datetimeFigureOut">
               <a:rPr lang="en-US" smtClean="0"/>
-              <a:t>3/8/2021</a:t>
+              <a:t>3/10/2021</a:t>
             </a:fld>
             <a:endParaRPr lang="en-US"/>
           </a:p>
@@ -2000,7 +2000,7 @@
           <a:p>
             <a:fld id="{76031F30-5868-4F85-A273-006B44ACFCE8}" type="datetimeFigureOut">
               <a:rPr lang="en-US" smtClean="0"/>
-              <a:t>3/8/2021</a:t>
+              <a:t>3/10/2021</a:t>
             </a:fld>
             <a:endParaRPr lang="en-US"/>
           </a:p>
@@ -2113,7 +2113,7 @@
           <a:p>
             <a:fld id="{76031F30-5868-4F85-A273-006B44ACFCE8}" type="datetimeFigureOut">
               <a:rPr lang="en-US" smtClean="0"/>
-              <a:t>3/8/2021</a:t>
+              <a:t>3/10/2021</a:t>
             </a:fld>
             <a:endParaRPr lang="en-US"/>
           </a:p>
@@ -2424,7 +2424,7 @@
           <a:p>
             <a:fld id="{76031F30-5868-4F85-A273-006B44ACFCE8}" type="datetimeFigureOut">
               <a:rPr lang="en-US" smtClean="0"/>
-              <a:t>3/8/2021</a:t>
+              <a:t>3/10/2021</a:t>
             </a:fld>
             <a:endParaRPr lang="en-US"/>
           </a:p>
@@ -2712,7 +2712,7 @@
           <a:p>
             <a:fld id="{76031F30-5868-4F85-A273-006B44ACFCE8}" type="datetimeFigureOut">
               <a:rPr lang="en-US" smtClean="0"/>
-              <a:t>3/8/2021</a:t>
+              <a:t>3/10/2021</a:t>
             </a:fld>
             <a:endParaRPr lang="en-US"/>
           </a:p>
@@ -2953,7 +2953,7 @@
           <a:p>
             <a:fld id="{76031F30-5868-4F85-A273-006B44ACFCE8}" type="datetimeFigureOut">
               <a:rPr lang="en-US" smtClean="0"/>
-              <a:t>3/8/2021</a:t>
+              <a:t>3/10/2021</a:t>
             </a:fld>
             <a:endParaRPr lang="en-US"/>
           </a:p>
@@ -24389,6 +24389,146 @@
           </a:p>
         </p:txBody>
       </p:sp>
+      <p:sp>
+        <p:nvSpPr>
+          <p:cNvPr id="10" name="TextBox 9">
+            <a:extLst>
+              <a:ext uri="{FF2B5EF4-FFF2-40B4-BE49-F238E27FC236}">
+                <a16:creationId xmlns:a16="http://schemas.microsoft.com/office/drawing/2014/main" id="{3FCFF356-0DA7-4F32-94D1-79C5B2F9B6E7}"/>
+              </a:ext>
+            </a:extLst>
+          </p:cNvPr>
+          <p:cNvSpPr txBox="1"/>
+          <p:nvPr/>
+        </p:nvSpPr>
+        <p:spPr>
+          <a:xfrm>
+            <a:off x="134842" y="3961495"/>
+            <a:ext cx="958257" cy="369332"/>
+          </a:xfrm>
+          <a:prstGeom prst="rect">
+            <a:avLst/>
+          </a:prstGeom>
+          <a:noFill/>
+        </p:spPr>
+        <p:txBody>
+          <a:bodyPr wrap="square" rtlCol="0">
+            <a:spAutoFit/>
+          </a:bodyPr>
+          <a:lstStyle/>
+          <a:p>
+            <a:r>
+              <a:rPr lang="en-US" dirty="0"/>
+              <a:t>Road 0</a:t>
+            </a:r>
+          </a:p>
+        </p:txBody>
+      </p:sp>
+      <p:sp>
+        <p:nvSpPr>
+          <p:cNvPr id="47" name="TextBox 46">
+            <a:extLst>
+              <a:ext uri="{FF2B5EF4-FFF2-40B4-BE49-F238E27FC236}">
+                <a16:creationId xmlns:a16="http://schemas.microsoft.com/office/drawing/2014/main" id="{AB9546BC-B446-4B4F-83B9-43077BE3D88C}"/>
+              </a:ext>
+            </a:extLst>
+          </p:cNvPr>
+          <p:cNvSpPr txBox="1"/>
+          <p:nvPr/>
+        </p:nvSpPr>
+        <p:spPr>
+          <a:xfrm>
+            <a:off x="3669678" y="1615403"/>
+            <a:ext cx="958257" cy="369332"/>
+          </a:xfrm>
+          <a:prstGeom prst="rect">
+            <a:avLst/>
+          </a:prstGeom>
+          <a:noFill/>
+        </p:spPr>
+        <p:txBody>
+          <a:bodyPr wrap="square" rtlCol="0">
+            <a:spAutoFit/>
+          </a:bodyPr>
+          <a:lstStyle/>
+          <a:p>
+            <a:r>
+              <a:rPr lang="en-US" dirty="0"/>
+              <a:t>Road 1</a:t>
+            </a:r>
+          </a:p>
+        </p:txBody>
+      </p:sp>
+      <p:sp>
+        <p:nvSpPr>
+          <p:cNvPr id="48" name="TextBox 47">
+            <a:extLst>
+              <a:ext uri="{FF2B5EF4-FFF2-40B4-BE49-F238E27FC236}">
+                <a16:creationId xmlns:a16="http://schemas.microsoft.com/office/drawing/2014/main" id="{035B6126-A2E0-4C80-94C8-FFB2D22F13A6}"/>
+              </a:ext>
+            </a:extLst>
+          </p:cNvPr>
+          <p:cNvSpPr txBox="1"/>
+          <p:nvPr/>
+        </p:nvSpPr>
+        <p:spPr>
+          <a:xfrm>
+            <a:off x="8129408" y="2595051"/>
+            <a:ext cx="958257" cy="369332"/>
+          </a:xfrm>
+          <a:prstGeom prst="rect">
+            <a:avLst/>
+          </a:prstGeom>
+          <a:noFill/>
+        </p:spPr>
+        <p:txBody>
+          <a:bodyPr wrap="square" rtlCol="0">
+            <a:spAutoFit/>
+          </a:bodyPr>
+          <a:lstStyle/>
+          <a:p>
+            <a:r>
+              <a:rPr lang="en-US" dirty="0"/>
+              <a:t>Road 2</a:t>
+            </a:r>
+          </a:p>
+        </p:txBody>
+      </p:sp>
+      <p:sp>
+        <p:nvSpPr>
+          <p:cNvPr id="49" name="TextBox 48">
+            <a:extLst>
+              <a:ext uri="{FF2B5EF4-FFF2-40B4-BE49-F238E27FC236}">
+                <a16:creationId xmlns:a16="http://schemas.microsoft.com/office/drawing/2014/main" id="{99F236D3-78A5-4C49-ABB0-FF255C7DB2D3}"/>
+              </a:ext>
+            </a:extLst>
+          </p:cNvPr>
+          <p:cNvSpPr txBox="1"/>
+          <p:nvPr/>
+        </p:nvSpPr>
+        <p:spPr>
+          <a:xfrm>
+            <a:off x="6461436" y="5589427"/>
+            <a:ext cx="958257" cy="369332"/>
+          </a:xfrm>
+          <a:prstGeom prst="rect">
+            <a:avLst/>
+          </a:prstGeom>
+          <a:noFill/>
+        </p:spPr>
+        <p:txBody>
+          <a:bodyPr wrap="square" rtlCol="0">
+            <a:spAutoFit/>
+          </a:bodyPr>
+          <a:lstStyle/>
+          <a:p>
+            <a:r>
+              <a:rPr lang="en-US" dirty="0"/>
+              <a:t>Road 3</a:t>
+            </a:r>
+          </a:p>
+        </p:txBody>
+      </p:sp>
     </p:spTree>
     <p:extLst>
       <p:ext uri="{BB962C8B-B14F-4D97-AF65-F5344CB8AC3E}">

</xml_diff>

<commit_message>
plan for median islands
</commit_message>
<xml_diff>
--- a/plan/challenges.pptx
+++ b/plan/challenges.pptx
@@ -50,6 +50,7 @@
     <p:sldId id="299" r:id="rId44"/>
     <p:sldId id="297" r:id="rId45"/>
     <p:sldId id="300" r:id="rId46"/>
+    <p:sldId id="301" r:id="rId47"/>
   </p:sldIdLst>
   <p:sldSz cx="12192000" cy="6858000"/>
   <p:notesSz cx="6858000" cy="9144000"/>
@@ -303,7 +304,7 @@
           <a:p>
             <a:fld id="{76031F30-5868-4F85-A273-006B44ACFCE8}" type="datetimeFigureOut">
               <a:rPr lang="en-US" smtClean="0"/>
-              <a:t>3/10/2021</a:t>
+              <a:t>3/16/2021</a:t>
             </a:fld>
             <a:endParaRPr lang="en-US"/>
           </a:p>
@@ -501,7 +502,7 @@
           <a:p>
             <a:fld id="{76031F30-5868-4F85-A273-006B44ACFCE8}" type="datetimeFigureOut">
               <a:rPr lang="en-US" smtClean="0"/>
-              <a:t>3/10/2021</a:t>
+              <a:t>3/16/2021</a:t>
             </a:fld>
             <a:endParaRPr lang="en-US"/>
           </a:p>
@@ -709,7 +710,7 @@
           <a:p>
             <a:fld id="{76031F30-5868-4F85-A273-006B44ACFCE8}" type="datetimeFigureOut">
               <a:rPr lang="en-US" smtClean="0"/>
-              <a:t>3/10/2021</a:t>
+              <a:t>3/16/2021</a:t>
             </a:fld>
             <a:endParaRPr lang="en-US"/>
           </a:p>
@@ -907,7 +908,7 @@
           <a:p>
             <a:fld id="{76031F30-5868-4F85-A273-006B44ACFCE8}" type="datetimeFigureOut">
               <a:rPr lang="en-US" smtClean="0"/>
-              <a:t>3/10/2021</a:t>
+              <a:t>3/16/2021</a:t>
             </a:fld>
             <a:endParaRPr lang="en-US"/>
           </a:p>
@@ -1182,7 +1183,7 @@
           <a:p>
             <a:fld id="{76031F30-5868-4F85-A273-006B44ACFCE8}" type="datetimeFigureOut">
               <a:rPr lang="en-US" smtClean="0"/>
-              <a:t>3/10/2021</a:t>
+              <a:t>3/16/2021</a:t>
             </a:fld>
             <a:endParaRPr lang="en-US"/>
           </a:p>
@@ -1447,7 +1448,7 @@
           <a:p>
             <a:fld id="{76031F30-5868-4F85-A273-006B44ACFCE8}" type="datetimeFigureOut">
               <a:rPr lang="en-US" smtClean="0"/>
-              <a:t>3/10/2021</a:t>
+              <a:t>3/16/2021</a:t>
             </a:fld>
             <a:endParaRPr lang="en-US"/>
           </a:p>
@@ -1859,7 +1860,7 @@
           <a:p>
             <a:fld id="{76031F30-5868-4F85-A273-006B44ACFCE8}" type="datetimeFigureOut">
               <a:rPr lang="en-US" smtClean="0"/>
-              <a:t>3/10/2021</a:t>
+              <a:t>3/16/2021</a:t>
             </a:fld>
             <a:endParaRPr lang="en-US"/>
           </a:p>
@@ -2000,7 +2001,7 @@
           <a:p>
             <a:fld id="{76031F30-5868-4F85-A273-006B44ACFCE8}" type="datetimeFigureOut">
               <a:rPr lang="en-US" smtClean="0"/>
-              <a:t>3/10/2021</a:t>
+              <a:t>3/16/2021</a:t>
             </a:fld>
             <a:endParaRPr lang="en-US"/>
           </a:p>
@@ -2113,7 +2114,7 @@
           <a:p>
             <a:fld id="{76031F30-5868-4F85-A273-006B44ACFCE8}" type="datetimeFigureOut">
               <a:rPr lang="en-US" smtClean="0"/>
-              <a:t>3/10/2021</a:t>
+              <a:t>3/16/2021</a:t>
             </a:fld>
             <a:endParaRPr lang="en-US"/>
           </a:p>
@@ -2424,7 +2425,7 @@
           <a:p>
             <a:fld id="{76031F30-5868-4F85-A273-006B44ACFCE8}" type="datetimeFigureOut">
               <a:rPr lang="en-US" smtClean="0"/>
-              <a:t>3/10/2021</a:t>
+              <a:t>3/16/2021</a:t>
             </a:fld>
             <a:endParaRPr lang="en-US"/>
           </a:p>
@@ -2712,7 +2713,7 @@
           <a:p>
             <a:fld id="{76031F30-5868-4F85-A273-006B44ACFCE8}" type="datetimeFigureOut">
               <a:rPr lang="en-US" smtClean="0"/>
-              <a:t>3/10/2021</a:t>
+              <a:t>3/16/2021</a:t>
             </a:fld>
             <a:endParaRPr lang="en-US"/>
           </a:p>
@@ -2953,7 +2954,7 @@
           <a:p>
             <a:fld id="{76031F30-5868-4F85-A273-006B44ACFCE8}" type="datetimeFigureOut">
               <a:rPr lang="en-US" smtClean="0"/>
-              <a:t>3/10/2021</a:t>
+              <a:t>3/16/2021</a:t>
             </a:fld>
             <a:endParaRPr lang="en-US"/>
           </a:p>
@@ -26114,6 +26115,207 @@
 </p:sld>
 </file>
 
+<file path=ppt/slides/slide46.xml><?xml version="1.0" encoding="utf-8"?>
+<p:sld xmlns:a="http://schemas.openxmlformats.org/drawingml/2006/main" xmlns:r="http://schemas.openxmlformats.org/officeDocument/2006/relationships" xmlns:p="http://schemas.openxmlformats.org/presentationml/2006/main">
+  <p:cSld>
+    <p:spTree>
+      <p:nvGrpSpPr>
+        <p:cNvPr id="1" name=""/>
+        <p:cNvGrpSpPr/>
+        <p:nvPr/>
+      </p:nvGrpSpPr>
+      <p:grpSpPr>
+        <a:xfrm>
+          <a:off x="0" y="0"/>
+          <a:ext cx="0" cy="0"/>
+          <a:chOff x="0" y="0"/>
+          <a:chExt cx="0" cy="0"/>
+        </a:xfrm>
+      </p:grpSpPr>
+      <p:sp>
+        <p:nvSpPr>
+          <p:cNvPr id="2" name="Title 1">
+            <a:extLst>
+              <a:ext uri="{FF2B5EF4-FFF2-40B4-BE49-F238E27FC236}">
+                <a16:creationId xmlns:a16="http://schemas.microsoft.com/office/drawing/2014/main" id="{2377F319-A0F6-4ECD-A343-0716EAD916B9}"/>
+              </a:ext>
+            </a:extLst>
+          </p:cNvPr>
+          <p:cNvSpPr>
+            <a:spLocks noGrp="1"/>
+          </p:cNvSpPr>
+          <p:nvPr>
+            <p:ph type="title"/>
+          </p:nvPr>
+        </p:nvSpPr>
+        <p:spPr/>
+        <p:txBody>
+          <a:bodyPr/>
+          <a:lstStyle/>
+          <a:p>
+            <a:r>
+              <a:rPr lang="en-US" dirty="0"/>
+              <a:t>25. Median Island </a:t>
+            </a:r>
+            <a:r>
+              <a:rPr lang="en-US"/>
+              <a:t>for intersections</a:t>
+            </a:r>
+            <a:endParaRPr lang="en-US" dirty="0"/>
+          </a:p>
+        </p:txBody>
+      </p:sp>
+      <p:sp>
+        <p:nvSpPr>
+          <p:cNvPr id="3" name="Content Placeholder 2">
+            <a:extLst>
+              <a:ext uri="{FF2B5EF4-FFF2-40B4-BE49-F238E27FC236}">
+                <a16:creationId xmlns:a16="http://schemas.microsoft.com/office/drawing/2014/main" id="{563FA17A-FE78-48B8-BE94-7B423CFC3162}"/>
+              </a:ext>
+            </a:extLst>
+          </p:cNvPr>
+          <p:cNvSpPr>
+            <a:spLocks noGrp="1"/>
+          </p:cNvSpPr>
+          <p:nvPr>
+            <p:ph idx="1"/>
+          </p:nvPr>
+        </p:nvSpPr>
+        <p:spPr/>
+        <p:txBody>
+          <a:bodyPr>
+            <a:normAutofit fontScale="92500" lnSpcReduction="20000"/>
+          </a:bodyPr>
+          <a:lstStyle/>
+          <a:p>
+            <a:pPr marL="0" indent="0">
+              <a:buNone/>
+            </a:pPr>
+            <a:r>
+              <a:rPr lang="en-US" dirty="0"/>
+              <a:t>4 Ways to do it:</a:t>
+            </a:r>
+          </a:p>
+          <a:p>
+            <a:pPr marL="514350" indent="-514350">
+              <a:buAutoNum type="arabicPeriod"/>
+            </a:pPr>
+            <a:r>
+              <a:rPr lang="en-US" dirty="0"/>
+              <a:t>Wide median lanes with islands as regular objects</a:t>
+            </a:r>
+          </a:p>
+          <a:p>
+            <a:pPr marL="971550" lvl="1" indent="-514350">
+              <a:buAutoNum type="arabicPeriod"/>
+            </a:pPr>
+            <a:r>
+              <a:rPr lang="en-US" dirty="0"/>
+              <a:t>Tackle lane width variations, way point calculations require object placement adjustments.</a:t>
+            </a:r>
+          </a:p>
+          <a:p>
+            <a:pPr marL="514350" indent="-514350">
+              <a:buAutoNum type="arabicPeriod"/>
+            </a:pPr>
+            <a:r>
+              <a:rPr lang="en-US" dirty="0"/>
+              <a:t>Extra non-driving lanes near median as islands</a:t>
+            </a:r>
+          </a:p>
+          <a:p>
+            <a:pPr marL="971550" lvl="1" indent="-514350">
+              <a:buAutoNum type="arabicPeriod"/>
+            </a:pPr>
+            <a:r>
+              <a:rPr lang="en-US" dirty="0"/>
+              <a:t>Need to identify which lanes are connected to an intersection.</a:t>
+            </a:r>
+          </a:p>
+          <a:p>
+            <a:pPr marL="971550" lvl="1" indent="-514350">
+              <a:buAutoNum type="arabicPeriod"/>
+            </a:pPr>
+            <a:r>
+              <a:rPr lang="en-US" dirty="0"/>
+              <a:t>Easy waypoint calculation</a:t>
+            </a:r>
+          </a:p>
+          <a:p>
+            <a:pPr marL="971550" lvl="1" indent="-514350">
+              <a:buAutoNum type="arabicPeriod"/>
+            </a:pPr>
+            <a:r>
+              <a:rPr lang="en-US" dirty="0"/>
+              <a:t>Don’t need to have variation in width</a:t>
+            </a:r>
+          </a:p>
+          <a:p>
+            <a:pPr marL="514350" indent="-514350">
+              <a:buAutoNum type="arabicPeriod"/>
+            </a:pPr>
+            <a:r>
+              <a:rPr lang="en-US" dirty="0"/>
+              <a:t>Single-way roads positioned arbitrarily.</a:t>
+            </a:r>
+          </a:p>
+          <a:p>
+            <a:pPr marL="971550" lvl="1" indent="-514350">
+              <a:buAutoNum type="arabicPeriod"/>
+            </a:pPr>
+            <a:r>
+              <a:rPr lang="en-US" dirty="0"/>
+              <a:t>Arbitrary separation between left and right lanes.</a:t>
+            </a:r>
+          </a:p>
+          <a:p>
+            <a:pPr marL="971550" lvl="1" indent="-514350">
+              <a:buAutoNum type="arabicPeriod"/>
+            </a:pPr>
+            <a:r>
+              <a:rPr lang="en-US" dirty="0"/>
+              <a:t>Will be hard to connect to a given intersection.</a:t>
+            </a:r>
+          </a:p>
+          <a:p>
+            <a:pPr marL="514350" indent="-514350">
+              <a:buAutoNum type="arabicPeriod"/>
+            </a:pPr>
+            <a:r>
+              <a:rPr lang="en-US" dirty="0"/>
+              <a:t>Forks (left lanes on a leg, right lanes on another). </a:t>
+            </a:r>
+          </a:p>
+          <a:p>
+            <a:pPr marL="971550" lvl="1" indent="-514350">
+              <a:buAutoNum type="arabicPeriod"/>
+            </a:pPr>
+            <a:r>
+              <a:rPr lang="en-US" dirty="0"/>
+              <a:t>Might be the best idea.</a:t>
+            </a:r>
+          </a:p>
+          <a:p>
+            <a:pPr marL="0" indent="0">
+              <a:buNone/>
+            </a:pPr>
+            <a:endParaRPr lang="en-US" dirty="0"/>
+          </a:p>
+        </p:txBody>
+      </p:sp>
+    </p:spTree>
+    <p:extLst>
+      <p:ext uri="{BB962C8B-B14F-4D97-AF65-F5344CB8AC3E}">
+        <p14:creationId xmlns:p14="http://schemas.microsoft.com/office/powerpoint/2010/main" val="1568236061"/>
+      </p:ext>
+    </p:extLst>
+  </p:cSld>
+  <p:clrMapOvr>
+    <a:masterClrMapping/>
+  </p:clrMapOvr>
+</p:sld>
+</file>
+
 <file path=ppt/slides/slide5.xml><?xml version="1.0" encoding="utf-8"?>
 <p:sld xmlns:a="http://schemas.openxmlformats.org/drawingml/2006/main" xmlns:r="http://schemas.openxmlformats.org/officeDocument/2006/relationships" xmlns:p="http://schemas.openxmlformats.org/presentationml/2006/main">
   <p:cSld>

</xml_diff>